<commit_message>
Ajout des numèros de page
</commit_message>
<xml_diff>
--- a/Project/MPI_NPE_Presentation NFE210.pptx
+++ b/Project/MPI_NPE_Presentation NFE210.pptx
@@ -7,6 +7,9 @@
   <p:notesMasterIdLst>
     <p:notesMasterId r:id="rId16"/>
   </p:notesMasterIdLst>
+  <p:handoutMasterIdLst>
+    <p:handoutMasterId r:id="rId17"/>
+  </p:handoutMasterIdLst>
   <p:sldIdLst>
     <p:sldId id="256" r:id="rId2"/>
     <p:sldId id="257" r:id="rId3"/>
@@ -120,7 +123,202 @@
       </a:defRPr>
     </a:lvl9pPr>
   </p:defaultTextStyle>
+  <p:extLst>
+    <p:ext uri="{EFAFB233-063F-42B5-8137-9DF3F51BA10A}">
+      <p15:sldGuideLst xmlns:p15="http://schemas.microsoft.com/office/powerpoint/2012/main"/>
+    </p:ext>
+  </p:extLst>
 </p:presentation>
+</file>
+
+<file path=ppt/handoutMasters/handoutMaster1.xml><?xml version="1.0" encoding="utf-8"?>
+<p:handoutMaster xmlns:a="http://schemas.openxmlformats.org/drawingml/2006/main" xmlns:r="http://schemas.openxmlformats.org/officeDocument/2006/relationships" xmlns:p="http://schemas.openxmlformats.org/presentationml/2006/main">
+  <p:cSld>
+    <p:bg>
+      <p:bgRef idx="1001">
+        <a:schemeClr val="bg1"/>
+      </p:bgRef>
+    </p:bg>
+    <p:spTree>
+      <p:nvGrpSpPr>
+        <p:cNvPr id="1" name=""/>
+        <p:cNvGrpSpPr/>
+        <p:nvPr/>
+      </p:nvGrpSpPr>
+      <p:grpSpPr>
+        <a:xfrm>
+          <a:off x="0" y="0"/>
+          <a:ext cx="0" cy="0"/>
+          <a:chOff x="0" y="0"/>
+          <a:chExt cx="0" cy="0"/>
+        </a:xfrm>
+      </p:grpSpPr>
+      <p:sp>
+        <p:nvSpPr>
+          <p:cNvPr id="2" name="Espace réservé de l'en-tête 1">
+            <a:extLst>
+              <a:ext uri="{FF2B5EF4-FFF2-40B4-BE49-F238E27FC236}">
+                <a16:creationId xmlns:a16="http://schemas.microsoft.com/office/drawing/2014/main" id="{B256A708-5AC1-45D6-99D2-370CDDEC9DD6}"/>
+              </a:ext>
+            </a:extLst>
+          </p:cNvPr>
+          <p:cNvSpPr>
+            <a:spLocks noGrp="1"/>
+          </p:cNvSpPr>
+          <p:nvPr>
+            <p:ph type="hdr" sz="quarter"/>
+          </p:nvPr>
+        </p:nvSpPr>
+        <p:spPr>
+          <a:xfrm>
+            <a:off x="0" y="0"/>
+            <a:ext cx="2971800" cy="458788"/>
+          </a:xfrm>
+          <a:prstGeom prst="rect">
+            <a:avLst/>
+          </a:prstGeom>
+        </p:spPr>
+        <p:txBody>
+          <a:bodyPr vert="horz" lIns="91440" tIns="45720" rIns="91440" bIns="45720" rtlCol="0"/>
+          <a:lstStyle>
+            <a:lvl1pPr algn="l">
+              <a:defRPr sz="1200"/>
+            </a:lvl1pPr>
+          </a:lstStyle>
+          <a:p>
+            <a:endParaRPr lang="en-GB"/>
+          </a:p>
+        </p:txBody>
+      </p:sp>
+      <p:sp>
+        <p:nvSpPr>
+          <p:cNvPr id="3" name="Espace réservé de la date 2">
+            <a:extLst>
+              <a:ext uri="{FF2B5EF4-FFF2-40B4-BE49-F238E27FC236}">
+                <a16:creationId xmlns:a16="http://schemas.microsoft.com/office/drawing/2014/main" id="{51D25BC3-EB04-4D9A-B084-403A0CC00025}"/>
+              </a:ext>
+            </a:extLst>
+          </p:cNvPr>
+          <p:cNvSpPr>
+            <a:spLocks noGrp="1"/>
+          </p:cNvSpPr>
+          <p:nvPr>
+            <p:ph type="dt" sz="quarter" idx="1"/>
+          </p:nvPr>
+        </p:nvSpPr>
+        <p:spPr>
+          <a:xfrm>
+            <a:off x="3884613" y="0"/>
+            <a:ext cx="2971800" cy="458788"/>
+          </a:xfrm>
+          <a:prstGeom prst="rect">
+            <a:avLst/>
+          </a:prstGeom>
+        </p:spPr>
+        <p:txBody>
+          <a:bodyPr vert="horz" lIns="91440" tIns="45720" rIns="91440" bIns="45720" rtlCol="0"/>
+          <a:lstStyle>
+            <a:lvl1pPr algn="r">
+              <a:defRPr sz="1200"/>
+            </a:lvl1pPr>
+          </a:lstStyle>
+          <a:p>
+            <a:fld id="{D67FF10B-49A3-47F0-97A4-40CFA1E6A290}" type="datetimeFigureOut">
+              <a:rPr lang="en-GB" smtClean="0"/>
+              <a:t>05/05/2018</a:t>
+            </a:fld>
+            <a:endParaRPr lang="en-GB"/>
+          </a:p>
+        </p:txBody>
+      </p:sp>
+      <p:sp>
+        <p:nvSpPr>
+          <p:cNvPr id="4" name="Espace réservé du pied de page 3">
+            <a:extLst>
+              <a:ext uri="{FF2B5EF4-FFF2-40B4-BE49-F238E27FC236}">
+                <a16:creationId xmlns:a16="http://schemas.microsoft.com/office/drawing/2014/main" id="{E92170BA-C24F-4AFE-85EC-188150036829}"/>
+              </a:ext>
+            </a:extLst>
+          </p:cNvPr>
+          <p:cNvSpPr>
+            <a:spLocks noGrp="1"/>
+          </p:cNvSpPr>
+          <p:nvPr>
+            <p:ph type="ftr" sz="quarter" idx="2"/>
+          </p:nvPr>
+        </p:nvSpPr>
+        <p:spPr>
+          <a:xfrm>
+            <a:off x="0" y="8685213"/>
+            <a:ext cx="2971800" cy="458787"/>
+          </a:xfrm>
+          <a:prstGeom prst="rect">
+            <a:avLst/>
+          </a:prstGeom>
+        </p:spPr>
+        <p:txBody>
+          <a:bodyPr vert="horz" lIns="91440" tIns="45720" rIns="91440" bIns="45720" rtlCol="0" anchor="b"/>
+          <a:lstStyle>
+            <a:lvl1pPr algn="l">
+              <a:defRPr sz="1200"/>
+            </a:lvl1pPr>
+          </a:lstStyle>
+          <a:p>
+            <a:endParaRPr lang="en-GB"/>
+          </a:p>
+        </p:txBody>
+      </p:sp>
+      <p:sp>
+        <p:nvSpPr>
+          <p:cNvPr id="5" name="Espace réservé du numéro de diapositive 4">
+            <a:extLst>
+              <a:ext uri="{FF2B5EF4-FFF2-40B4-BE49-F238E27FC236}">
+                <a16:creationId xmlns:a16="http://schemas.microsoft.com/office/drawing/2014/main" id="{92592474-78D3-41D7-8930-C77C2E1AD071}"/>
+              </a:ext>
+            </a:extLst>
+          </p:cNvPr>
+          <p:cNvSpPr>
+            <a:spLocks noGrp="1"/>
+          </p:cNvSpPr>
+          <p:nvPr>
+            <p:ph type="sldNum" sz="quarter" idx="3"/>
+          </p:nvPr>
+        </p:nvSpPr>
+        <p:spPr>
+          <a:xfrm>
+            <a:off x="3884613" y="8685213"/>
+            <a:ext cx="2971800" cy="458787"/>
+          </a:xfrm>
+          <a:prstGeom prst="rect">
+            <a:avLst/>
+          </a:prstGeom>
+        </p:spPr>
+        <p:txBody>
+          <a:bodyPr vert="horz" lIns="91440" tIns="45720" rIns="91440" bIns="45720" rtlCol="0" anchor="b"/>
+          <a:lstStyle>
+            <a:lvl1pPr algn="r">
+              <a:defRPr sz="1200"/>
+            </a:lvl1pPr>
+          </a:lstStyle>
+          <a:p>
+            <a:fld id="{F941DE72-356E-496A-B89F-FB250E84DF96}" type="slidenum">
+              <a:rPr lang="en-GB" smtClean="0"/>
+              <a:t>‹N°›</a:t>
+            </a:fld>
+            <a:endParaRPr lang="en-GB"/>
+          </a:p>
+        </p:txBody>
+      </p:sp>
+    </p:spTree>
+    <p:extLst>
+      <p:ext uri="{BB962C8B-B14F-4D97-AF65-F5344CB8AC3E}">
+        <p14:creationId xmlns:p14="http://schemas.microsoft.com/office/powerpoint/2010/main" val="1369875392"/>
+      </p:ext>
+    </p:extLst>
+  </p:cSld>
+  <p:clrMap bg1="lt1" tx1="dk1" bg2="lt2" tx2="dk2" accent1="accent1" accent2="accent2" accent3="accent3" accent4="accent4" accent5="accent5" accent6="accent6" hlink="hlink" folHlink="folHlink"/>
+  <p:hf hdr="0" ftr="0" dt="0"/>
+</p:handoutMaster>
 </file>
 
 <file path=ppt/notesMasters/notesMaster1.xml><?xml version="1.0" encoding="utf-8"?>
@@ -378,6 +576,7 @@
     </p:extLst>
   </p:cSld>
   <p:clrMap bg1="lt1" tx1="dk1" bg2="lt2" tx2="dk2" accent1="accent1" accent2="accent2" accent3="accent3" accent4="accent4" accent5="accent5" accent6="accent6" hlink="hlink" folHlink="folHlink"/>
+  <p:hf hdr="0" ftr="0" dt="0"/>
   <p:notesStyle>
     <a:lvl1pPr marL="0" algn="l" defTabSz="914400" rtl="0" eaLnBrk="1" latinLnBrk="0" hangingPunct="1">
       <a:defRPr sz="1200" kern="1200">
@@ -741,7 +940,7 @@
           <a:bodyPr/>
           <a:lstStyle/>
           <a:p>
-            <a:fld id="{8D3702BB-61BE-4E7E-81F0-181D659F52E7}" type="datetimeFigureOut">
+            <a:fld id="{D3F8A352-7D6F-42CE-8661-E5131235BF66}" type="datetime1">
               <a:rPr lang="en-GB" smtClean="0"/>
               <a:t>05/05/2018</a:t>
             </a:fld>
@@ -1016,7 +1215,7 @@
           <a:bodyPr/>
           <a:lstStyle/>
           <a:p>
-            <a:fld id="{8D3702BB-61BE-4E7E-81F0-181D659F52E7}" type="datetimeFigureOut">
+            <a:fld id="{737DF7A2-D041-4336-AA3E-BC558500F365}" type="datetime1">
               <a:rPr lang="en-GB" smtClean="0"/>
               <a:t>05/05/2018</a:t>
             </a:fld>
@@ -1210,7 +1409,7 @@
           <a:bodyPr/>
           <a:lstStyle/>
           <a:p>
-            <a:fld id="{8D3702BB-61BE-4E7E-81F0-181D659F52E7}" type="datetimeFigureOut">
+            <a:fld id="{2F0FE0E5-BE83-4864-8C9B-04EDD65BD4B6}" type="datetime1">
               <a:rPr lang="en-GB" smtClean="0"/>
               <a:t>05/05/2018</a:t>
             </a:fld>
@@ -1483,7 +1682,7 @@
           <a:bodyPr/>
           <a:lstStyle/>
           <a:p>
-            <a:fld id="{8D3702BB-61BE-4E7E-81F0-181D659F52E7}" type="datetimeFigureOut">
+            <a:fld id="{79FBD189-42AE-47A2-8621-C858C528542C}" type="datetime1">
               <a:rPr lang="en-GB" smtClean="0"/>
               <a:t>05/05/2018</a:t>
             </a:fld>
@@ -1824,7 +2023,7 @@
           <a:bodyPr/>
           <a:lstStyle/>
           <a:p>
-            <a:fld id="{8D3702BB-61BE-4E7E-81F0-181D659F52E7}" type="datetimeFigureOut">
+            <a:fld id="{DAA0C222-6505-498B-99E2-E23C861EC4B0}" type="datetime1">
               <a:rPr lang="en-GB" smtClean="0"/>
               <a:t>05/05/2018</a:t>
             </a:fld>
@@ -2447,7 +2646,7 @@
           <a:bodyPr/>
           <a:lstStyle/>
           <a:p>
-            <a:fld id="{8D3702BB-61BE-4E7E-81F0-181D659F52E7}" type="datetimeFigureOut">
+            <a:fld id="{7C39C3F6-E6AE-4AD4-868E-81687961A7A0}" type="datetime1">
               <a:rPr lang="en-GB" smtClean="0"/>
               <a:t>05/05/2018</a:t>
             </a:fld>
@@ -3307,7 +3506,7 @@
           <a:bodyPr/>
           <a:lstStyle/>
           <a:p>
-            <a:fld id="{8D3702BB-61BE-4E7E-81F0-181D659F52E7}" type="datetimeFigureOut">
+            <a:fld id="{E3F2F273-67B7-4E62-828A-6B2245ABCEF1}" type="datetime1">
               <a:rPr lang="en-GB" smtClean="0"/>
               <a:t>05/05/2018</a:t>
             </a:fld>
@@ -3477,7 +3676,7 @@
           <a:bodyPr/>
           <a:lstStyle/>
           <a:p>
-            <a:fld id="{8D3702BB-61BE-4E7E-81F0-181D659F52E7}" type="datetimeFigureOut">
+            <a:fld id="{978BA116-B39F-46A2-B198-7692611A70E3}" type="datetime1">
               <a:rPr lang="en-GB" smtClean="0"/>
               <a:t>05/05/2018</a:t>
             </a:fld>
@@ -3657,7 +3856,7 @@
           <a:bodyPr/>
           <a:lstStyle/>
           <a:p>
-            <a:fld id="{8D3702BB-61BE-4E7E-81F0-181D659F52E7}" type="datetimeFigureOut">
+            <a:fld id="{CB6FC1EB-9754-4FD9-834F-05FAC21D9E74}" type="datetime1">
               <a:rPr lang="en-GB" smtClean="0"/>
               <a:t>05/05/2018</a:t>
             </a:fld>
@@ -3827,7 +4026,7 @@
           <a:bodyPr/>
           <a:lstStyle/>
           <a:p>
-            <a:fld id="{8D3702BB-61BE-4E7E-81F0-181D659F52E7}" type="datetimeFigureOut">
+            <a:fld id="{D47DACD9-42AD-489F-A028-44BF51632F48}" type="datetime1">
               <a:rPr lang="en-GB" smtClean="0"/>
               <a:t>05/05/2018</a:t>
             </a:fld>
@@ -4074,7 +4273,7 @@
           <a:bodyPr/>
           <a:lstStyle/>
           <a:p>
-            <a:fld id="{8D3702BB-61BE-4E7E-81F0-181D659F52E7}" type="datetimeFigureOut">
+            <a:fld id="{716999AB-4BBE-421E-96D8-F77383334567}" type="datetime1">
               <a:rPr lang="en-GB" smtClean="0"/>
               <a:t>05/05/2018</a:t>
             </a:fld>
@@ -4366,7 +4565,7 @@
           <a:bodyPr/>
           <a:lstStyle/>
           <a:p>
-            <a:fld id="{8D3702BB-61BE-4E7E-81F0-181D659F52E7}" type="datetimeFigureOut">
+            <a:fld id="{1E1B7FD6-8831-454A-BA17-78599D9F40E4}" type="datetime1">
               <a:rPr lang="en-GB" smtClean="0"/>
               <a:t>05/05/2018</a:t>
             </a:fld>
@@ -4810,7 +5009,7 @@
           <a:bodyPr/>
           <a:lstStyle/>
           <a:p>
-            <a:fld id="{8D3702BB-61BE-4E7E-81F0-181D659F52E7}" type="datetimeFigureOut">
+            <a:fld id="{F1FF7740-8C1B-44B0-90A3-F61A245B4357}" type="datetime1">
               <a:rPr lang="en-GB" smtClean="0"/>
               <a:t>05/05/2018</a:t>
             </a:fld>
@@ -4928,7 +5127,7 @@
           <a:bodyPr/>
           <a:lstStyle/>
           <a:p>
-            <a:fld id="{8D3702BB-61BE-4E7E-81F0-181D659F52E7}" type="datetimeFigureOut">
+            <a:fld id="{2210AB09-C69F-4882-BD36-28B0274D6B54}" type="datetime1">
               <a:rPr lang="en-GB" smtClean="0"/>
               <a:t>05/05/2018</a:t>
             </a:fld>
@@ -5023,7 +5222,7 @@
           <a:bodyPr/>
           <a:lstStyle/>
           <a:p>
-            <a:fld id="{8D3702BB-61BE-4E7E-81F0-181D659F52E7}" type="datetimeFigureOut">
+            <a:fld id="{BCFFED70-E428-4A78-B9C5-CE51938ABDD2}" type="datetime1">
               <a:rPr lang="en-GB" smtClean="0"/>
               <a:t>05/05/2018</a:t>
             </a:fld>
@@ -5302,7 +5501,7 @@
           <a:bodyPr/>
           <a:lstStyle/>
           <a:p>
-            <a:fld id="{8D3702BB-61BE-4E7E-81F0-181D659F52E7}" type="datetimeFigureOut">
+            <a:fld id="{03E8AFBE-FB91-4AAD-8303-18D4EF660008}" type="datetime1">
               <a:rPr lang="en-GB" smtClean="0"/>
               <a:t>05/05/2018</a:t>
             </a:fld>
@@ -5577,7 +5776,7 @@
           <a:bodyPr/>
           <a:lstStyle/>
           <a:p>
-            <a:fld id="{8D3702BB-61BE-4E7E-81F0-181D659F52E7}" type="datetimeFigureOut">
+            <a:fld id="{ED8A7ACC-1AC7-45B5-B082-BCD311BAA20D}" type="datetime1">
               <a:rPr lang="en-GB" smtClean="0"/>
               <a:t>05/05/2018</a:t>
             </a:fld>
@@ -6006,7 +6205,7 @@
             </a:lvl1pPr>
           </a:lstStyle>
           <a:p>
-            <a:fld id="{8D3702BB-61BE-4E7E-81F0-181D659F52E7}" type="datetimeFigureOut">
+            <a:fld id="{57D8A53F-BA63-449F-B271-6EFE62D8B86B}" type="datetime1">
               <a:rPr lang="en-GB" smtClean="0"/>
               <a:t>05/05/2018</a:t>
             </a:fld>
@@ -6120,6 +6319,7 @@
     <p:sldLayoutId id="2147483712" r:id="rId16"/>
     <p:sldLayoutId id="2147483713" r:id="rId17"/>
   </p:sldLayoutIdLst>
+  <p:hf hdr="0" ftr="0" dt="0"/>
   <p:txStyles>
     <p:titleStyle>
       <a:lvl1pPr algn="l" defTabSz="457200" rtl="0" eaLnBrk="1" latinLnBrk="0" hangingPunct="1">
@@ -7702,6 +7902,35 @@
           </a:p>
         </p:txBody>
       </p:sp>
+      <p:sp>
+        <p:nvSpPr>
+          <p:cNvPr id="4" name="Espace réservé du numéro de diapositive 3">
+            <a:extLst>
+              <a:ext uri="{FF2B5EF4-FFF2-40B4-BE49-F238E27FC236}">
+                <a16:creationId xmlns:a16="http://schemas.microsoft.com/office/drawing/2014/main" id="{83816142-F8D7-41CF-BB49-A6A61EF18AE9}"/>
+              </a:ext>
+            </a:extLst>
+          </p:cNvPr>
+          <p:cNvSpPr>
+            <a:spLocks noGrp="1"/>
+          </p:cNvSpPr>
+          <p:nvPr>
+            <p:ph type="sldNum" sz="quarter" idx="12"/>
+          </p:nvPr>
+        </p:nvSpPr>
+        <p:spPr/>
+        <p:txBody>
+          <a:bodyPr/>
+          <a:lstStyle/>
+          <a:p>
+            <a:fld id="{127B63D7-A8CB-4105-87F4-60707FA10D94}" type="slidenum">
+              <a:rPr lang="en-GB" smtClean="0"/>
+              <a:t>10</a:t>
+            </a:fld>
+            <a:endParaRPr lang="en-GB"/>
+          </a:p>
+        </p:txBody>
+      </p:sp>
     </p:spTree>
     <p:extLst>
       <p:ext uri="{BB962C8B-B14F-4D97-AF65-F5344CB8AC3E}">
@@ -7796,6 +8025,35 @@
           </a:p>
         </p:txBody>
       </p:sp>
+      <p:sp>
+        <p:nvSpPr>
+          <p:cNvPr id="4" name="Espace réservé du numéro de diapositive 3">
+            <a:extLst>
+              <a:ext uri="{FF2B5EF4-FFF2-40B4-BE49-F238E27FC236}">
+                <a16:creationId xmlns:a16="http://schemas.microsoft.com/office/drawing/2014/main" id="{D08BFD3F-7C67-4120-B1D3-FF427EF49D65}"/>
+              </a:ext>
+            </a:extLst>
+          </p:cNvPr>
+          <p:cNvSpPr>
+            <a:spLocks noGrp="1"/>
+          </p:cNvSpPr>
+          <p:nvPr>
+            <p:ph type="sldNum" sz="quarter" idx="12"/>
+          </p:nvPr>
+        </p:nvSpPr>
+        <p:spPr/>
+        <p:txBody>
+          <a:bodyPr/>
+          <a:lstStyle/>
+          <a:p>
+            <a:fld id="{127B63D7-A8CB-4105-87F4-60707FA10D94}" type="slidenum">
+              <a:rPr lang="en-GB" smtClean="0"/>
+              <a:t>11</a:t>
+            </a:fld>
+            <a:endParaRPr lang="en-GB"/>
+          </a:p>
+        </p:txBody>
+      </p:sp>
     </p:spTree>
     <p:extLst>
       <p:ext uri="{BB962C8B-B14F-4D97-AF65-F5344CB8AC3E}">
@@ -7890,6 +8148,35 @@
           </a:p>
         </p:txBody>
       </p:sp>
+      <p:sp>
+        <p:nvSpPr>
+          <p:cNvPr id="4" name="Espace réservé du numéro de diapositive 3">
+            <a:extLst>
+              <a:ext uri="{FF2B5EF4-FFF2-40B4-BE49-F238E27FC236}">
+                <a16:creationId xmlns:a16="http://schemas.microsoft.com/office/drawing/2014/main" id="{ED7D5C1C-5A21-484C-8DEB-9155EEC45427}"/>
+              </a:ext>
+            </a:extLst>
+          </p:cNvPr>
+          <p:cNvSpPr>
+            <a:spLocks noGrp="1"/>
+          </p:cNvSpPr>
+          <p:nvPr>
+            <p:ph type="sldNum" sz="quarter" idx="12"/>
+          </p:nvPr>
+        </p:nvSpPr>
+        <p:spPr/>
+        <p:txBody>
+          <a:bodyPr/>
+          <a:lstStyle/>
+          <a:p>
+            <a:fld id="{127B63D7-A8CB-4105-87F4-60707FA10D94}" type="slidenum">
+              <a:rPr lang="en-GB" smtClean="0"/>
+              <a:t>12</a:t>
+            </a:fld>
+            <a:endParaRPr lang="en-GB"/>
+          </a:p>
+        </p:txBody>
+      </p:sp>
     </p:spTree>
     <p:extLst>
       <p:ext uri="{BB962C8B-B14F-4D97-AF65-F5344CB8AC3E}">
@@ -7984,6 +8271,35 @@
           </a:p>
         </p:txBody>
       </p:sp>
+      <p:sp>
+        <p:nvSpPr>
+          <p:cNvPr id="4" name="Espace réservé du numéro de diapositive 3">
+            <a:extLst>
+              <a:ext uri="{FF2B5EF4-FFF2-40B4-BE49-F238E27FC236}">
+                <a16:creationId xmlns:a16="http://schemas.microsoft.com/office/drawing/2014/main" id="{E32F79F5-69CB-48A3-80A7-00B85042B396}"/>
+              </a:ext>
+            </a:extLst>
+          </p:cNvPr>
+          <p:cNvSpPr>
+            <a:spLocks noGrp="1"/>
+          </p:cNvSpPr>
+          <p:nvPr>
+            <p:ph type="sldNum" sz="quarter" idx="12"/>
+          </p:nvPr>
+        </p:nvSpPr>
+        <p:spPr/>
+        <p:txBody>
+          <a:bodyPr/>
+          <a:lstStyle/>
+          <a:p>
+            <a:fld id="{127B63D7-A8CB-4105-87F4-60707FA10D94}" type="slidenum">
+              <a:rPr lang="en-GB" smtClean="0"/>
+              <a:t>13</a:t>
+            </a:fld>
+            <a:endParaRPr lang="en-GB"/>
+          </a:p>
+        </p:txBody>
+      </p:sp>
     </p:spTree>
     <p:extLst>
       <p:ext uri="{BB962C8B-B14F-4D97-AF65-F5344CB8AC3E}">
@@ -8083,6 +8399,35 @@
           </a:xfrm>
         </p:spPr>
       </p:pic>
+      <p:sp>
+        <p:nvSpPr>
+          <p:cNvPr id="3" name="Espace réservé du numéro de diapositive 2">
+            <a:extLst>
+              <a:ext uri="{FF2B5EF4-FFF2-40B4-BE49-F238E27FC236}">
+                <a16:creationId xmlns:a16="http://schemas.microsoft.com/office/drawing/2014/main" id="{2A8BF67F-C94A-420D-AF29-DFD155B69BAF}"/>
+              </a:ext>
+            </a:extLst>
+          </p:cNvPr>
+          <p:cNvSpPr>
+            <a:spLocks noGrp="1"/>
+          </p:cNvSpPr>
+          <p:nvPr>
+            <p:ph type="sldNum" sz="quarter" idx="12"/>
+          </p:nvPr>
+        </p:nvSpPr>
+        <p:spPr/>
+        <p:txBody>
+          <a:bodyPr/>
+          <a:lstStyle/>
+          <a:p>
+            <a:fld id="{127B63D7-A8CB-4105-87F4-60707FA10D94}" type="slidenum">
+              <a:rPr lang="en-GB" smtClean="0"/>
+              <a:t>14</a:t>
+            </a:fld>
+            <a:endParaRPr lang="en-GB"/>
+          </a:p>
+        </p:txBody>
+      </p:sp>
     </p:spTree>
     <p:extLst>
       <p:ext uri="{BB962C8B-B14F-4D97-AF65-F5344CB8AC3E}">
@@ -8251,6 +8596,35 @@
           </a:p>
         </p:txBody>
       </p:sp>
+      <p:sp>
+        <p:nvSpPr>
+          <p:cNvPr id="6" name="Espace réservé du numéro de diapositive 5">
+            <a:extLst>
+              <a:ext uri="{FF2B5EF4-FFF2-40B4-BE49-F238E27FC236}">
+                <a16:creationId xmlns:a16="http://schemas.microsoft.com/office/drawing/2014/main" id="{00A2632D-E28D-422C-9EC8-5D8134E89D85}"/>
+              </a:ext>
+            </a:extLst>
+          </p:cNvPr>
+          <p:cNvSpPr>
+            <a:spLocks noGrp="1"/>
+          </p:cNvSpPr>
+          <p:nvPr>
+            <p:ph type="sldNum" sz="quarter" idx="12"/>
+          </p:nvPr>
+        </p:nvSpPr>
+        <p:spPr/>
+        <p:txBody>
+          <a:bodyPr/>
+          <a:lstStyle/>
+          <a:p>
+            <a:fld id="{127B63D7-A8CB-4105-87F4-60707FA10D94}" type="slidenum">
+              <a:rPr lang="en-GB" smtClean="0"/>
+              <a:t>2</a:t>
+            </a:fld>
+            <a:endParaRPr lang="en-GB" dirty="0"/>
+          </a:p>
+        </p:txBody>
+      </p:sp>
     </p:spTree>
     <p:extLst>
       <p:ext uri="{BB962C8B-B14F-4D97-AF65-F5344CB8AC3E}">
@@ -8345,6 +8719,35 @@
           </a:p>
         </p:txBody>
       </p:sp>
+      <p:sp>
+        <p:nvSpPr>
+          <p:cNvPr id="4" name="Espace réservé du numéro de diapositive 3">
+            <a:extLst>
+              <a:ext uri="{FF2B5EF4-FFF2-40B4-BE49-F238E27FC236}">
+                <a16:creationId xmlns:a16="http://schemas.microsoft.com/office/drawing/2014/main" id="{B994B995-BFFF-4770-B3BD-922B2E993AFC}"/>
+              </a:ext>
+            </a:extLst>
+          </p:cNvPr>
+          <p:cNvSpPr>
+            <a:spLocks noGrp="1"/>
+          </p:cNvSpPr>
+          <p:nvPr>
+            <p:ph type="sldNum" sz="quarter" idx="12"/>
+          </p:nvPr>
+        </p:nvSpPr>
+        <p:spPr/>
+        <p:txBody>
+          <a:bodyPr/>
+          <a:lstStyle/>
+          <a:p>
+            <a:fld id="{127B63D7-A8CB-4105-87F4-60707FA10D94}" type="slidenum">
+              <a:rPr lang="en-GB" smtClean="0"/>
+              <a:t>3</a:t>
+            </a:fld>
+            <a:endParaRPr lang="en-GB"/>
+          </a:p>
+        </p:txBody>
+      </p:sp>
     </p:spTree>
     <p:extLst>
       <p:ext uri="{BB962C8B-B14F-4D97-AF65-F5344CB8AC3E}">
@@ -8428,6 +8831,35 @@
           </a:p>
         </p:txBody>
       </p:sp>
+      <p:sp>
+        <p:nvSpPr>
+          <p:cNvPr id="2" name="Espace réservé du numéro de diapositive 1">
+            <a:extLst>
+              <a:ext uri="{FF2B5EF4-FFF2-40B4-BE49-F238E27FC236}">
+                <a16:creationId xmlns:a16="http://schemas.microsoft.com/office/drawing/2014/main" id="{86B960F3-747A-4106-851F-9BDBDCEC4B4F}"/>
+              </a:ext>
+            </a:extLst>
+          </p:cNvPr>
+          <p:cNvSpPr>
+            <a:spLocks noGrp="1"/>
+          </p:cNvSpPr>
+          <p:nvPr>
+            <p:ph type="sldNum" sz="quarter" idx="12"/>
+          </p:nvPr>
+        </p:nvSpPr>
+        <p:spPr/>
+        <p:txBody>
+          <a:bodyPr/>
+          <a:lstStyle/>
+          <a:p>
+            <a:fld id="{127B63D7-A8CB-4105-87F4-60707FA10D94}" type="slidenum">
+              <a:rPr lang="en-GB" smtClean="0"/>
+              <a:t>4</a:t>
+            </a:fld>
+            <a:endParaRPr lang="en-GB"/>
+          </a:p>
+        </p:txBody>
+      </p:sp>
     </p:spTree>
     <p:extLst>
       <p:ext uri="{BB962C8B-B14F-4D97-AF65-F5344CB8AC3E}">
@@ -8522,6 +8954,35 @@
           </a:p>
         </p:txBody>
       </p:sp>
+      <p:sp>
+        <p:nvSpPr>
+          <p:cNvPr id="4" name="Espace réservé du numéro de diapositive 3">
+            <a:extLst>
+              <a:ext uri="{FF2B5EF4-FFF2-40B4-BE49-F238E27FC236}">
+                <a16:creationId xmlns:a16="http://schemas.microsoft.com/office/drawing/2014/main" id="{917F6769-927A-43AA-A939-EF5241566688}"/>
+              </a:ext>
+            </a:extLst>
+          </p:cNvPr>
+          <p:cNvSpPr>
+            <a:spLocks noGrp="1"/>
+          </p:cNvSpPr>
+          <p:nvPr>
+            <p:ph type="sldNum" sz="quarter" idx="12"/>
+          </p:nvPr>
+        </p:nvSpPr>
+        <p:spPr/>
+        <p:txBody>
+          <a:bodyPr/>
+          <a:lstStyle/>
+          <a:p>
+            <a:fld id="{127B63D7-A8CB-4105-87F4-60707FA10D94}" type="slidenum">
+              <a:rPr lang="en-GB" smtClean="0"/>
+              <a:t>5</a:t>
+            </a:fld>
+            <a:endParaRPr lang="en-GB"/>
+          </a:p>
+        </p:txBody>
+      </p:sp>
     </p:spTree>
     <p:extLst>
       <p:ext uri="{BB962C8B-B14F-4D97-AF65-F5344CB8AC3E}">
@@ -8620,6 +9081,35 @@
           </a:p>
         </p:txBody>
       </p:sp>
+      <p:sp>
+        <p:nvSpPr>
+          <p:cNvPr id="4" name="Espace réservé du numéro de diapositive 3">
+            <a:extLst>
+              <a:ext uri="{FF2B5EF4-FFF2-40B4-BE49-F238E27FC236}">
+                <a16:creationId xmlns:a16="http://schemas.microsoft.com/office/drawing/2014/main" id="{21395FBB-47FF-471B-A611-00E4D605E6E2}"/>
+              </a:ext>
+            </a:extLst>
+          </p:cNvPr>
+          <p:cNvSpPr>
+            <a:spLocks noGrp="1"/>
+          </p:cNvSpPr>
+          <p:nvPr>
+            <p:ph type="sldNum" sz="quarter" idx="12"/>
+          </p:nvPr>
+        </p:nvSpPr>
+        <p:spPr/>
+        <p:txBody>
+          <a:bodyPr/>
+          <a:lstStyle/>
+          <a:p>
+            <a:fld id="{127B63D7-A8CB-4105-87F4-60707FA10D94}" type="slidenum">
+              <a:rPr lang="en-GB" smtClean="0"/>
+              <a:t>6</a:t>
+            </a:fld>
+            <a:endParaRPr lang="en-GB"/>
+          </a:p>
+        </p:txBody>
+      </p:sp>
     </p:spTree>
     <p:extLst>
       <p:ext uri="{BB962C8B-B14F-4D97-AF65-F5344CB8AC3E}">
@@ -8718,6 +9208,35 @@
           </a:p>
         </p:txBody>
       </p:sp>
+      <p:sp>
+        <p:nvSpPr>
+          <p:cNvPr id="4" name="Espace réservé du numéro de diapositive 3">
+            <a:extLst>
+              <a:ext uri="{FF2B5EF4-FFF2-40B4-BE49-F238E27FC236}">
+                <a16:creationId xmlns:a16="http://schemas.microsoft.com/office/drawing/2014/main" id="{D99255AB-0EA8-4D12-8914-DA5EEBF54499}"/>
+              </a:ext>
+            </a:extLst>
+          </p:cNvPr>
+          <p:cNvSpPr>
+            <a:spLocks noGrp="1"/>
+          </p:cNvSpPr>
+          <p:nvPr>
+            <p:ph type="sldNum" sz="quarter" idx="12"/>
+          </p:nvPr>
+        </p:nvSpPr>
+        <p:spPr/>
+        <p:txBody>
+          <a:bodyPr/>
+          <a:lstStyle/>
+          <a:p>
+            <a:fld id="{127B63D7-A8CB-4105-87F4-60707FA10D94}" type="slidenum">
+              <a:rPr lang="en-GB" smtClean="0"/>
+              <a:t>7</a:t>
+            </a:fld>
+            <a:endParaRPr lang="en-GB"/>
+          </a:p>
+        </p:txBody>
+      </p:sp>
     </p:spTree>
     <p:extLst>
       <p:ext uri="{BB962C8B-B14F-4D97-AF65-F5344CB8AC3E}">
@@ -8801,6 +9320,35 @@
           </a:p>
         </p:txBody>
       </p:sp>
+      <p:sp>
+        <p:nvSpPr>
+          <p:cNvPr id="2" name="Espace réservé du numéro de diapositive 1">
+            <a:extLst>
+              <a:ext uri="{FF2B5EF4-FFF2-40B4-BE49-F238E27FC236}">
+                <a16:creationId xmlns:a16="http://schemas.microsoft.com/office/drawing/2014/main" id="{F6DD80EB-A190-4809-9CB4-45F4C0592A99}"/>
+              </a:ext>
+            </a:extLst>
+          </p:cNvPr>
+          <p:cNvSpPr>
+            <a:spLocks noGrp="1"/>
+          </p:cNvSpPr>
+          <p:nvPr>
+            <p:ph type="sldNum" sz="quarter" idx="12"/>
+          </p:nvPr>
+        </p:nvSpPr>
+        <p:spPr/>
+        <p:txBody>
+          <a:bodyPr/>
+          <a:lstStyle/>
+          <a:p>
+            <a:fld id="{127B63D7-A8CB-4105-87F4-60707FA10D94}" type="slidenum">
+              <a:rPr lang="en-GB" smtClean="0"/>
+              <a:t>8</a:t>
+            </a:fld>
+            <a:endParaRPr lang="en-GB"/>
+          </a:p>
+        </p:txBody>
+      </p:sp>
     </p:spTree>
     <p:extLst>
       <p:ext uri="{BB962C8B-B14F-4D97-AF65-F5344CB8AC3E}">
@@ -8892,6 +9440,35 @@
           <a:lstStyle/>
           <a:p>
             <a:endParaRPr lang="en-GB" dirty="0"/>
+          </a:p>
+        </p:txBody>
+      </p:sp>
+      <p:sp>
+        <p:nvSpPr>
+          <p:cNvPr id="4" name="Espace réservé du numéro de diapositive 3">
+            <a:extLst>
+              <a:ext uri="{FF2B5EF4-FFF2-40B4-BE49-F238E27FC236}">
+                <a16:creationId xmlns:a16="http://schemas.microsoft.com/office/drawing/2014/main" id="{189BB3FE-3B4D-4510-9CC2-33C0DE23EC5A}"/>
+              </a:ext>
+            </a:extLst>
+          </p:cNvPr>
+          <p:cNvSpPr>
+            <a:spLocks noGrp="1"/>
+          </p:cNvSpPr>
+          <p:nvPr>
+            <p:ph type="sldNum" sz="quarter" idx="12"/>
+          </p:nvPr>
+        </p:nvSpPr>
+        <p:spPr/>
+        <p:txBody>
+          <a:bodyPr/>
+          <a:lstStyle/>
+          <a:p>
+            <a:fld id="{127B63D7-A8CB-4105-87F4-60707FA10D94}" type="slidenum">
+              <a:rPr lang="en-GB" smtClean="0"/>
+              <a:t>9</a:t>
+            </a:fld>
+            <a:endParaRPr lang="en-GB"/>
           </a:p>
         </p:txBody>
       </p:sp>
@@ -9467,4 +10044,299 @@
     </a:ext>
   </a:extLst>
 </a:theme>
+</file>
+
+<file path=ppt/theme/theme3.xml><?xml version="1.0" encoding="utf-8"?>
+<a:theme xmlns:a="http://schemas.openxmlformats.org/drawingml/2006/main" name="Thème Office">
+  <a:themeElements>
+    <a:clrScheme name="Office">
+      <a:dk1>
+        <a:sysClr val="windowText" lastClr="000000"/>
+      </a:dk1>
+      <a:lt1>
+        <a:sysClr val="window" lastClr="FFFFFF"/>
+      </a:lt1>
+      <a:dk2>
+        <a:srgbClr val="44546A"/>
+      </a:dk2>
+      <a:lt2>
+        <a:srgbClr val="E7E6E6"/>
+      </a:lt2>
+      <a:accent1>
+        <a:srgbClr val="4472C4"/>
+      </a:accent1>
+      <a:accent2>
+        <a:srgbClr val="ED7D31"/>
+      </a:accent2>
+      <a:accent3>
+        <a:srgbClr val="A5A5A5"/>
+      </a:accent3>
+      <a:accent4>
+        <a:srgbClr val="FFC000"/>
+      </a:accent4>
+      <a:accent5>
+        <a:srgbClr val="5B9BD5"/>
+      </a:accent5>
+      <a:accent6>
+        <a:srgbClr val="70AD47"/>
+      </a:accent6>
+      <a:hlink>
+        <a:srgbClr val="0563C1"/>
+      </a:hlink>
+      <a:folHlink>
+        <a:srgbClr val="954F72"/>
+      </a:folHlink>
+    </a:clrScheme>
+    <a:fontScheme name="Office">
+      <a:majorFont>
+        <a:latin typeface="Calibri Light" panose="020F0302020204030204"/>
+        <a:ea typeface=""/>
+        <a:cs typeface=""/>
+        <a:font script="Jpan" typeface="游ゴシック Light"/>
+        <a:font script="Hang" typeface="맑은 고딕"/>
+        <a:font script="Hans" typeface="等线 Light"/>
+        <a:font script="Hant" typeface="新細明體"/>
+        <a:font script="Arab" typeface="Times New Roman"/>
+        <a:font script="Hebr" typeface="Times New Roman"/>
+        <a:font script="Thai" typeface="Angsana New"/>
+        <a:font script="Ethi" typeface="Nyala"/>
+        <a:font script="Beng" typeface="Vrinda"/>
+        <a:font script="Gujr" typeface="Shruti"/>
+        <a:font script="Khmr" typeface="MoolBoran"/>
+        <a:font script="Knda" typeface="Tunga"/>
+        <a:font script="Guru" typeface="Raavi"/>
+        <a:font script="Cans" typeface="Euphemia"/>
+        <a:font script="Cher" typeface="Plantagenet Cherokee"/>
+        <a:font script="Yiii" typeface="Microsoft Yi Baiti"/>
+        <a:font script="Tibt" typeface="Microsoft Himalaya"/>
+        <a:font script="Thaa" typeface="MV Boli"/>
+        <a:font script="Deva" typeface="Mangal"/>
+        <a:font script="Telu" typeface="Gautami"/>
+        <a:font script="Taml" typeface="Latha"/>
+        <a:font script="Syrc" typeface="Estrangelo Edessa"/>
+        <a:font script="Orya" typeface="Kalinga"/>
+        <a:font script="Mlym" typeface="Kartika"/>
+        <a:font script="Laoo" typeface="DokChampa"/>
+        <a:font script="Sinh" typeface="Iskoola Pota"/>
+        <a:font script="Mong" typeface="Mongolian Baiti"/>
+        <a:font script="Viet" typeface="Times New Roman"/>
+        <a:font script="Uigh" typeface="Microsoft Uighur"/>
+        <a:font script="Geor" typeface="Sylfaen"/>
+        <a:font script="Armn" typeface="Arial"/>
+        <a:font script="Bugi" typeface="Leelawadee UI"/>
+        <a:font script="Bopo" typeface="Microsoft JhengHei"/>
+        <a:font script="Java" typeface="Javanese Text"/>
+        <a:font script="Lisu" typeface="Segoe UI"/>
+        <a:font script="Mymr" typeface="Myanmar Text"/>
+        <a:font script="Nkoo" typeface="Ebrima"/>
+        <a:font script="Olck" typeface="Nirmala UI"/>
+        <a:font script="Osma" typeface="Ebrima"/>
+        <a:font script="Phag" typeface="Phagspa"/>
+        <a:font script="Syrn" typeface="Estrangelo Edessa"/>
+        <a:font script="Syrj" typeface="Estrangelo Edessa"/>
+        <a:font script="Syre" typeface="Estrangelo Edessa"/>
+        <a:font script="Sora" typeface="Nirmala UI"/>
+        <a:font script="Tale" typeface="Microsoft Tai Le"/>
+        <a:font script="Talu" typeface="Microsoft New Tai Lue"/>
+        <a:font script="Tfng" typeface="Ebrima"/>
+      </a:majorFont>
+      <a:minorFont>
+        <a:latin typeface="Calibri" panose="020F0502020204030204"/>
+        <a:ea typeface=""/>
+        <a:cs typeface=""/>
+        <a:font script="Jpan" typeface="游ゴシック"/>
+        <a:font script="Hang" typeface="맑은 고딕"/>
+        <a:font script="Hans" typeface="等线"/>
+        <a:font script="Hant" typeface="新細明體"/>
+        <a:font script="Arab" typeface="Arial"/>
+        <a:font script="Hebr" typeface="Arial"/>
+        <a:font script="Thai" typeface="Cordia New"/>
+        <a:font script="Ethi" typeface="Nyala"/>
+        <a:font script="Beng" typeface="Vrinda"/>
+        <a:font script="Gujr" typeface="Shruti"/>
+        <a:font script="Khmr" typeface="DaunPenh"/>
+        <a:font script="Knda" typeface="Tunga"/>
+        <a:font script="Guru" typeface="Raavi"/>
+        <a:font script="Cans" typeface="Euphemia"/>
+        <a:font script="Cher" typeface="Plantagenet Cherokee"/>
+        <a:font script="Yiii" typeface="Microsoft Yi Baiti"/>
+        <a:font script="Tibt" typeface="Microsoft Himalaya"/>
+        <a:font script="Thaa" typeface="MV Boli"/>
+        <a:font script="Deva" typeface="Mangal"/>
+        <a:font script="Telu" typeface="Gautami"/>
+        <a:font script="Taml" typeface="Latha"/>
+        <a:font script="Syrc" typeface="Estrangelo Edessa"/>
+        <a:font script="Orya" typeface="Kalinga"/>
+        <a:font script="Mlym" typeface="Kartika"/>
+        <a:font script="Laoo" typeface="DokChampa"/>
+        <a:font script="Sinh" typeface="Iskoola Pota"/>
+        <a:font script="Mong" typeface="Mongolian Baiti"/>
+        <a:font script="Viet" typeface="Arial"/>
+        <a:font script="Uigh" typeface="Microsoft Uighur"/>
+        <a:font script="Geor" typeface="Sylfaen"/>
+        <a:font script="Armn" typeface="Arial"/>
+        <a:font script="Bugi" typeface="Leelawadee UI"/>
+        <a:font script="Bopo" typeface="Microsoft JhengHei"/>
+        <a:font script="Java" typeface="Javanese Text"/>
+        <a:font script="Lisu" typeface="Segoe UI"/>
+        <a:font script="Mymr" typeface="Myanmar Text"/>
+        <a:font script="Nkoo" typeface="Ebrima"/>
+        <a:font script="Olck" typeface="Nirmala UI"/>
+        <a:font script="Osma" typeface="Ebrima"/>
+        <a:font script="Phag" typeface="Phagspa"/>
+        <a:font script="Syrn" typeface="Estrangelo Edessa"/>
+        <a:font script="Syrj" typeface="Estrangelo Edessa"/>
+        <a:font script="Syre" typeface="Estrangelo Edessa"/>
+        <a:font script="Sora" typeface="Nirmala UI"/>
+        <a:font script="Tale" typeface="Microsoft Tai Le"/>
+        <a:font script="Talu" typeface="Microsoft New Tai Lue"/>
+        <a:font script="Tfng" typeface="Ebrima"/>
+      </a:minorFont>
+    </a:fontScheme>
+    <a:fmtScheme name="Office">
+      <a:fillStyleLst>
+        <a:solidFill>
+          <a:schemeClr val="phClr"/>
+        </a:solidFill>
+        <a:gradFill rotWithShape="1">
+          <a:gsLst>
+            <a:gs pos="0">
+              <a:schemeClr val="phClr">
+                <a:lumMod val="110000"/>
+                <a:satMod val="105000"/>
+                <a:tint val="67000"/>
+              </a:schemeClr>
+            </a:gs>
+            <a:gs pos="50000">
+              <a:schemeClr val="phClr">
+                <a:lumMod val="105000"/>
+                <a:satMod val="103000"/>
+                <a:tint val="73000"/>
+              </a:schemeClr>
+            </a:gs>
+            <a:gs pos="100000">
+              <a:schemeClr val="phClr">
+                <a:lumMod val="105000"/>
+                <a:satMod val="109000"/>
+                <a:tint val="81000"/>
+              </a:schemeClr>
+            </a:gs>
+          </a:gsLst>
+          <a:lin ang="5400000" scaled="0"/>
+        </a:gradFill>
+        <a:gradFill rotWithShape="1">
+          <a:gsLst>
+            <a:gs pos="0">
+              <a:schemeClr val="phClr">
+                <a:satMod val="103000"/>
+                <a:lumMod val="102000"/>
+                <a:tint val="94000"/>
+              </a:schemeClr>
+            </a:gs>
+            <a:gs pos="50000">
+              <a:schemeClr val="phClr">
+                <a:satMod val="110000"/>
+                <a:lumMod val="100000"/>
+                <a:shade val="100000"/>
+              </a:schemeClr>
+            </a:gs>
+            <a:gs pos="100000">
+              <a:schemeClr val="phClr">
+                <a:lumMod val="99000"/>
+                <a:satMod val="120000"/>
+                <a:shade val="78000"/>
+              </a:schemeClr>
+            </a:gs>
+          </a:gsLst>
+          <a:lin ang="5400000" scaled="0"/>
+        </a:gradFill>
+      </a:fillStyleLst>
+      <a:lnStyleLst>
+        <a:ln w="6350" cap="flat" cmpd="sng" algn="ctr">
+          <a:solidFill>
+            <a:schemeClr val="phClr"/>
+          </a:solidFill>
+          <a:prstDash val="solid"/>
+          <a:miter lim="800000"/>
+        </a:ln>
+        <a:ln w="12700" cap="flat" cmpd="sng" algn="ctr">
+          <a:solidFill>
+            <a:schemeClr val="phClr"/>
+          </a:solidFill>
+          <a:prstDash val="solid"/>
+          <a:miter lim="800000"/>
+        </a:ln>
+        <a:ln w="19050" cap="flat" cmpd="sng" algn="ctr">
+          <a:solidFill>
+            <a:schemeClr val="phClr"/>
+          </a:solidFill>
+          <a:prstDash val="solid"/>
+          <a:miter lim="800000"/>
+        </a:ln>
+      </a:lnStyleLst>
+      <a:effectStyleLst>
+        <a:effectStyle>
+          <a:effectLst/>
+        </a:effectStyle>
+        <a:effectStyle>
+          <a:effectLst/>
+        </a:effectStyle>
+        <a:effectStyle>
+          <a:effectLst>
+            <a:outerShdw blurRad="57150" dist="19050" dir="5400000" algn="ctr" rotWithShape="0">
+              <a:srgbClr val="000000">
+                <a:alpha val="63000"/>
+              </a:srgbClr>
+            </a:outerShdw>
+          </a:effectLst>
+        </a:effectStyle>
+      </a:effectStyleLst>
+      <a:bgFillStyleLst>
+        <a:solidFill>
+          <a:schemeClr val="phClr"/>
+        </a:solidFill>
+        <a:solidFill>
+          <a:schemeClr val="phClr">
+            <a:tint val="95000"/>
+            <a:satMod val="170000"/>
+          </a:schemeClr>
+        </a:solidFill>
+        <a:gradFill rotWithShape="1">
+          <a:gsLst>
+            <a:gs pos="0">
+              <a:schemeClr val="phClr">
+                <a:tint val="93000"/>
+                <a:satMod val="150000"/>
+                <a:shade val="98000"/>
+                <a:lumMod val="102000"/>
+              </a:schemeClr>
+            </a:gs>
+            <a:gs pos="50000">
+              <a:schemeClr val="phClr">
+                <a:tint val="98000"/>
+                <a:satMod val="130000"/>
+                <a:shade val="90000"/>
+                <a:lumMod val="103000"/>
+              </a:schemeClr>
+            </a:gs>
+            <a:gs pos="100000">
+              <a:schemeClr val="phClr">
+                <a:shade val="63000"/>
+                <a:satMod val="120000"/>
+              </a:schemeClr>
+            </a:gs>
+          </a:gsLst>
+          <a:lin ang="5400000" scaled="0"/>
+        </a:gradFill>
+      </a:bgFillStyleLst>
+    </a:fmtScheme>
+  </a:themeElements>
+  <a:objectDefaults/>
+  <a:extraClrSchemeLst/>
+  <a:extLst>
+    <a:ext uri="{05A4C25C-085E-4340-85A3-A5531E510DB2}">
+      <thm15:themeFamily xmlns:thm15="http://schemas.microsoft.com/office/thememl/2012/main" name="Office Theme" id="{62F939B6-93AF-4DB8-9C6B-D6C7DFDC589F}" vid="{4A3C46E8-61CC-4603-A589-7422A47A8E4A}"/>
+    </a:ext>
+  </a:extLst>
+</a:theme>
 </file>
</xml_diff>

<commit_message>
Exécution de plantUML pour générer l'image
Génération de l'image et ajout à la présentation PPT
</commit_message>
<xml_diff>
--- a/Project/MPI_NPE_Presentation NFE210.pptx
+++ b/Project/MPI_NPE_Presentation NFE210.pptx
@@ -13,7 +13,7 @@
   <p:sldIdLst>
     <p:sldId id="256" r:id="rId2"/>
     <p:sldId id="257" r:id="rId3"/>
-    <p:sldId id="258" r:id="rId4"/>
+    <p:sldId id="271" r:id="rId4"/>
     <p:sldId id="265" r:id="rId5"/>
     <p:sldId id="259" r:id="rId6"/>
     <p:sldId id="260" r:id="rId7"/>
@@ -225,7 +225,7 @@
           <a:p>
             <a:fld id="{D67FF10B-49A3-47F0-97A4-40CFA1E6A290}" type="datetimeFigureOut">
               <a:rPr lang="en-GB" smtClean="0"/>
-              <a:t>22/05/2018</a:t>
+              <a:t>05/06/2018</a:t>
             </a:fld>
             <a:endParaRPr lang="en-GB"/>
           </a:p>
@@ -403,7 +403,7 @@
           <a:p>
             <a:fld id="{0672BD84-068F-4711-9548-95846F635E8F}" type="datetimeFigureOut">
               <a:rPr lang="en-GB" smtClean="0"/>
-              <a:t>22/05/2018</a:t>
+              <a:t>05/06/2018</a:t>
             </a:fld>
             <a:endParaRPr lang="en-GB"/>
           </a:p>
@@ -672,90 +672,6 @@
 </p:notesMaster>
 </file>
 
-<file path=ppt/notesSlides/notesSlide1.xml><?xml version="1.0" encoding="utf-8"?>
-<p:notes xmlns:a="http://schemas.openxmlformats.org/drawingml/2006/main" xmlns:r="http://schemas.openxmlformats.org/officeDocument/2006/relationships" xmlns:p="http://schemas.openxmlformats.org/presentationml/2006/main">
-  <p:cSld>
-    <p:spTree>
-      <p:nvGrpSpPr>
-        <p:cNvPr id="1" name=""/>
-        <p:cNvGrpSpPr/>
-        <p:nvPr/>
-      </p:nvGrpSpPr>
-      <p:grpSpPr>
-        <a:xfrm>
-          <a:off x="0" y="0"/>
-          <a:ext cx="0" cy="0"/>
-          <a:chOff x="0" y="0"/>
-          <a:chExt cx="0" cy="0"/>
-        </a:xfrm>
-      </p:grpSpPr>
-      <p:sp>
-        <p:nvSpPr>
-          <p:cNvPr id="2" name="Espace réservé de l'image des diapositives 1"/>
-          <p:cNvSpPr>
-            <a:spLocks noGrp="1" noRot="1" noChangeAspect="1"/>
-          </p:cNvSpPr>
-          <p:nvPr>
-            <p:ph type="sldImg"/>
-          </p:nvPr>
-        </p:nvSpPr>
-        <p:spPr/>
-      </p:sp>
-      <p:sp>
-        <p:nvSpPr>
-          <p:cNvPr id="3" name="Espace réservé des notes 2"/>
-          <p:cNvSpPr>
-            <a:spLocks noGrp="1"/>
-          </p:cNvSpPr>
-          <p:nvPr>
-            <p:ph type="body" idx="1"/>
-          </p:nvPr>
-        </p:nvSpPr>
-        <p:spPr/>
-        <p:txBody>
-          <a:bodyPr/>
-          <a:lstStyle/>
-          <a:p>
-            <a:endParaRPr lang="en-GB" dirty="0"/>
-          </a:p>
-        </p:txBody>
-      </p:sp>
-      <p:sp>
-        <p:nvSpPr>
-          <p:cNvPr id="4" name="Espace réservé du numéro de diapositive 3"/>
-          <p:cNvSpPr>
-            <a:spLocks noGrp="1"/>
-          </p:cNvSpPr>
-          <p:nvPr>
-            <p:ph type="sldNum" sz="quarter" idx="10"/>
-          </p:nvPr>
-        </p:nvSpPr>
-        <p:spPr/>
-        <p:txBody>
-          <a:bodyPr/>
-          <a:lstStyle/>
-          <a:p>
-            <a:fld id="{F62742CE-BF56-404D-956D-45EAAB9E2574}" type="slidenum">
-              <a:rPr lang="en-GB" smtClean="0"/>
-              <a:t>3</a:t>
-            </a:fld>
-            <a:endParaRPr lang="en-GB"/>
-          </a:p>
-        </p:txBody>
-      </p:sp>
-    </p:spTree>
-    <p:extLst>
-      <p:ext uri="{BB962C8B-B14F-4D97-AF65-F5344CB8AC3E}">
-        <p14:creationId xmlns:p14="http://schemas.microsoft.com/office/powerpoint/2010/main" val="4209189276"/>
-      </p:ext>
-    </p:extLst>
-  </p:cSld>
-  <p:clrMapOvr>
-    <a:masterClrMapping/>
-  </p:clrMapOvr>
-</p:notes>
-</file>
-
 <file path=ppt/slideLayouts/slideLayout1.xml><?xml version="1.0" encoding="utf-8"?>
 <p:sldLayout xmlns:a="http://schemas.openxmlformats.org/drawingml/2006/main" xmlns:r="http://schemas.openxmlformats.org/officeDocument/2006/relationships" xmlns:p="http://schemas.openxmlformats.org/presentationml/2006/main" type="title" preserve="1">
   <p:cSld name="Diapositive de titre">
@@ -942,7 +858,7 @@
           <a:p>
             <a:fld id="{D3F8A352-7D6F-42CE-8661-E5131235BF66}" type="datetime1">
               <a:rPr lang="en-GB" smtClean="0"/>
-              <a:t>22/05/2018</a:t>
+              <a:t>05/06/2018</a:t>
             </a:fld>
             <a:endParaRPr lang="en-GB"/>
           </a:p>
@@ -1217,7 +1133,7 @@
           <a:p>
             <a:fld id="{737DF7A2-D041-4336-AA3E-BC558500F365}" type="datetime1">
               <a:rPr lang="en-GB" smtClean="0"/>
-              <a:t>22/05/2018</a:t>
+              <a:t>05/06/2018</a:t>
             </a:fld>
             <a:endParaRPr lang="en-GB"/>
           </a:p>
@@ -1411,7 +1327,7 @@
           <a:p>
             <a:fld id="{2F0FE0E5-BE83-4864-8C9B-04EDD65BD4B6}" type="datetime1">
               <a:rPr lang="en-GB" smtClean="0"/>
-              <a:t>22/05/2018</a:t>
+              <a:t>05/06/2018</a:t>
             </a:fld>
             <a:endParaRPr lang="en-GB"/>
           </a:p>
@@ -1684,7 +1600,7 @@
           <a:p>
             <a:fld id="{79FBD189-42AE-47A2-8621-C858C528542C}" type="datetime1">
               <a:rPr lang="en-GB" smtClean="0"/>
-              <a:t>22/05/2018</a:t>
+              <a:t>05/06/2018</a:t>
             </a:fld>
             <a:endParaRPr lang="en-GB"/>
           </a:p>
@@ -2025,7 +1941,7 @@
           <a:p>
             <a:fld id="{DAA0C222-6505-498B-99E2-E23C861EC4B0}" type="datetime1">
               <a:rPr lang="en-GB" smtClean="0"/>
-              <a:t>22/05/2018</a:t>
+              <a:t>05/06/2018</a:t>
             </a:fld>
             <a:endParaRPr lang="en-GB"/>
           </a:p>
@@ -2648,7 +2564,7 @@
           <a:p>
             <a:fld id="{7C39C3F6-E6AE-4AD4-868E-81687961A7A0}" type="datetime1">
               <a:rPr lang="en-GB" smtClean="0"/>
-              <a:t>22/05/2018</a:t>
+              <a:t>05/06/2018</a:t>
             </a:fld>
             <a:endParaRPr lang="en-GB"/>
           </a:p>
@@ -3508,7 +3424,7 @@
           <a:p>
             <a:fld id="{E3F2F273-67B7-4E62-828A-6B2245ABCEF1}" type="datetime1">
               <a:rPr lang="en-GB" smtClean="0"/>
-              <a:t>22/05/2018</a:t>
+              <a:t>05/06/2018</a:t>
             </a:fld>
             <a:endParaRPr lang="en-GB"/>
           </a:p>
@@ -3678,7 +3594,7 @@
           <a:p>
             <a:fld id="{978BA116-B39F-46A2-B198-7692611A70E3}" type="datetime1">
               <a:rPr lang="en-GB" smtClean="0"/>
-              <a:t>22/05/2018</a:t>
+              <a:t>05/06/2018</a:t>
             </a:fld>
             <a:endParaRPr lang="en-GB"/>
           </a:p>
@@ -3858,7 +3774,7 @@
           <a:p>
             <a:fld id="{CB6FC1EB-9754-4FD9-834F-05FAC21D9E74}" type="datetime1">
               <a:rPr lang="en-GB" smtClean="0"/>
-              <a:t>22/05/2018</a:t>
+              <a:t>05/06/2018</a:t>
             </a:fld>
             <a:endParaRPr lang="en-GB"/>
           </a:p>
@@ -4028,7 +3944,7 @@
           <a:p>
             <a:fld id="{D47DACD9-42AD-489F-A028-44BF51632F48}" type="datetime1">
               <a:rPr lang="en-GB" smtClean="0"/>
-              <a:t>22/05/2018</a:t>
+              <a:t>05/06/2018</a:t>
             </a:fld>
             <a:endParaRPr lang="en-GB"/>
           </a:p>
@@ -4275,7 +4191,7 @@
           <a:p>
             <a:fld id="{716999AB-4BBE-421E-96D8-F77383334567}" type="datetime1">
               <a:rPr lang="en-GB" smtClean="0"/>
-              <a:t>22/05/2018</a:t>
+              <a:t>05/06/2018</a:t>
             </a:fld>
             <a:endParaRPr lang="en-GB"/>
           </a:p>
@@ -4567,7 +4483,7 @@
           <a:p>
             <a:fld id="{1E1B7FD6-8831-454A-BA17-78599D9F40E4}" type="datetime1">
               <a:rPr lang="en-GB" smtClean="0"/>
-              <a:t>22/05/2018</a:t>
+              <a:t>05/06/2018</a:t>
             </a:fld>
             <a:endParaRPr lang="en-GB"/>
           </a:p>
@@ -5011,7 +4927,7 @@
           <a:p>
             <a:fld id="{F1FF7740-8C1B-44B0-90A3-F61A245B4357}" type="datetime1">
               <a:rPr lang="en-GB" smtClean="0"/>
-              <a:t>22/05/2018</a:t>
+              <a:t>05/06/2018</a:t>
             </a:fld>
             <a:endParaRPr lang="en-GB"/>
           </a:p>
@@ -5129,7 +5045,7 @@
           <a:p>
             <a:fld id="{2210AB09-C69F-4882-BD36-28B0274D6B54}" type="datetime1">
               <a:rPr lang="en-GB" smtClean="0"/>
-              <a:t>22/05/2018</a:t>
+              <a:t>05/06/2018</a:t>
             </a:fld>
             <a:endParaRPr lang="en-GB"/>
           </a:p>
@@ -5224,7 +5140,7 @@
           <a:p>
             <a:fld id="{BCFFED70-E428-4A78-B9C5-CE51938ABDD2}" type="datetime1">
               <a:rPr lang="en-GB" smtClean="0"/>
-              <a:t>22/05/2018</a:t>
+              <a:t>05/06/2018</a:t>
             </a:fld>
             <a:endParaRPr lang="en-GB"/>
           </a:p>
@@ -5503,7 +5419,7 @@
           <a:p>
             <a:fld id="{03E8AFBE-FB91-4AAD-8303-18D4EF660008}" type="datetime1">
               <a:rPr lang="en-GB" smtClean="0"/>
-              <a:t>22/05/2018</a:t>
+              <a:t>05/06/2018</a:t>
             </a:fld>
             <a:endParaRPr lang="en-GB"/>
           </a:p>
@@ -5778,7 +5694,7 @@
           <a:p>
             <a:fld id="{ED8A7ACC-1AC7-45B5-B082-BCD311BAA20D}" type="datetime1">
               <a:rPr lang="en-GB" smtClean="0"/>
-              <a:t>22/05/2018</a:t>
+              <a:t>05/06/2018</a:t>
             </a:fld>
             <a:endParaRPr lang="en-GB"/>
           </a:p>
@@ -6207,7 +6123,7 @@
           <a:p>
             <a:fld id="{57D8A53F-BA63-449F-B271-6EFE62D8B86B}" type="datetime1">
               <a:rPr lang="en-GB" smtClean="0"/>
-              <a:t>22/05/2018</a:t>
+              <a:t>05/06/2018</a:t>
             </a:fld>
             <a:endParaRPr lang="en-GB"/>
           </a:p>
@@ -8644,14 +8560,6 @@
 <file path=ppt/slides/slide3.xml><?xml version="1.0" encoding="utf-8"?>
 <p:sld xmlns:a="http://schemas.openxmlformats.org/drawingml/2006/main" xmlns:r="http://schemas.openxmlformats.org/officeDocument/2006/relationships" xmlns:p="http://schemas.openxmlformats.org/presentationml/2006/main">
   <p:cSld>
-    <p:bg>
-      <p:bgPr>
-        <a:solidFill>
-          <a:schemeClr val="bg1"/>
-        </a:solidFill>
-        <a:effectLst/>
-      </p:bgPr>
-    </p:bg>
     <p:spTree>
       <p:nvGrpSpPr>
         <p:cNvPr id="1" name=""/>
@@ -8668,945 +8576,53 @@
       </p:grpSpPr>
       <p:sp>
         <p:nvSpPr>
-          <p:cNvPr id="50" name="Rectangle 39">
+          <p:cNvPr id="2" name="Titre 1">
             <a:extLst>
               <a:ext uri="{FF2B5EF4-FFF2-40B4-BE49-F238E27FC236}">
-                <a16:creationId xmlns:a16="http://schemas.microsoft.com/office/drawing/2014/main" id="{5F3FC718-FDE3-4EF7-921E-A5F374EAF824}"/>
-              </a:ext>
-              <a:ext uri="{C183D7F6-B498-43B3-948B-1728B52AA6E4}">
-                <adec:decorative xmlns:adec="http://schemas.microsoft.com/office/drawing/2017/decorative" val="1"/>
+                <a16:creationId xmlns:a16="http://schemas.microsoft.com/office/drawing/2014/main" id="{3E47E298-DD99-424B-840E-4FAFBEED9743}"/>
               </a:ext>
             </a:extLst>
           </p:cNvPr>
           <p:cNvSpPr>
-            <a:spLocks noGrp="1" noRot="1" noChangeAspect="1" noMove="1" noResize="1" noEditPoints="1" noAdjustHandles="1" noChangeArrowheads="1" noChangeShapeType="1" noTextEdit="1"/>
-          </p:cNvSpPr>
-          <p:nvPr>
-            <p:extLst>
-              <p:ext uri="{386F3935-93C4-4BCD-93E2-E3B085C9AB24}">
-                <p16:designElem xmlns:p16="http://schemas.microsoft.com/office/powerpoint/2015/main" val="1"/>
-              </p:ext>
-            </p:extLst>
+            <a:spLocks noGrp="1"/>
+          </p:cNvSpPr>
+          <p:nvPr>
+            <p:ph type="title"/>
           </p:nvPr>
         </p:nvSpPr>
         <p:spPr>
           <a:xfrm>
-            <a:off x="0" y="0"/>
-            <a:ext cx="12192000" cy="6858000"/>
+            <a:off x="646111" y="452719"/>
+            <a:ext cx="9404723" cy="790156"/>
           </a:xfrm>
-          <a:prstGeom prst="rect">
-            <a:avLst/>
-          </a:prstGeom>
-          <a:ln>
-            <a:noFill/>
-          </a:ln>
         </p:spPr>
-        <p:style>
-          <a:lnRef idx="2">
-            <a:schemeClr val="accent1">
-              <a:shade val="50000"/>
-            </a:schemeClr>
-          </a:lnRef>
-          <a:fillRef idx="1003">
-            <a:schemeClr val="dk2"/>
-          </a:fillRef>
-          <a:effectRef idx="0">
-            <a:schemeClr val="accent1"/>
-          </a:effectRef>
-          <a:fontRef idx="minor">
-            <a:schemeClr val="lt1"/>
-          </a:fontRef>
-        </p:style>
-        <p:txBody>
-          <a:bodyPr rtlCol="0" anchor="ctr"/>
+        <p:txBody>
+          <a:bodyPr/>
           <a:lstStyle/>
           <a:p>
             <a:pPr algn="ctr"/>
-            <a:endParaRPr lang="en-US"/>
-          </a:p>
-        </p:txBody>
-      </p:sp>
-      <p:sp>
-        <p:nvSpPr>
-          <p:cNvPr id="51" name="Freeform 11">
+            <a:r>
+              <a:rPr lang="fr-FR" b="1" dirty="0"/>
+              <a:t>Présentation Aero-Breizh</a:t>
+            </a:r>
+          </a:p>
+        </p:txBody>
+      </p:sp>
+      <p:pic>
+        <p:nvPicPr>
+          <p:cNvPr id="6" name="Espace réservé du contenu 5">
             <a:extLst>
               <a:ext uri="{FF2B5EF4-FFF2-40B4-BE49-F238E27FC236}">
-                <a16:creationId xmlns:a16="http://schemas.microsoft.com/office/drawing/2014/main" id="{FAA0F719-3DC8-4F08-AD8F-5A845658CB9D}"/>
-              </a:ext>
-              <a:ext uri="{C183D7F6-B498-43B3-948B-1728B52AA6E4}">
-                <adec:decorative xmlns:adec="http://schemas.microsoft.com/office/drawing/2017/decorative" val="1"/>
-              </a:ext>
-            </a:extLst>
-          </p:cNvPr>
-          <p:cNvSpPr>
-            <a:spLocks noGrp="1" noRot="1" noChangeAspect="1" noMove="1" noResize="1" noEditPoints="1" noAdjustHandles="1" noChangeArrowheads="1" noChangeShapeType="1" noTextEdit="1"/>
-          </p:cNvSpPr>
-          <p:nvPr>
-            <p:extLst>
-              <p:ext uri="{386F3935-93C4-4BCD-93E2-E3B085C9AB24}">
-                <p16:designElem xmlns:p16="http://schemas.microsoft.com/office/powerpoint/2015/main" val="1"/>
-              </p:ext>
-            </p:extLst>
-          </p:nvPr>
-        </p:nvSpPr>
-        <p:spPr>
-          <a:xfrm>
-            <a:off x="3948110" y="-1"/>
-            <a:ext cx="559472" cy="3709642"/>
-          </a:xfrm>
-          <a:custGeom>
-            <a:avLst/>
-            <a:gdLst>
-              <a:gd name="connsiteX0" fmla="*/ 0 w 559472"/>
-              <a:gd name="connsiteY0" fmla="*/ 0 h 3709642"/>
-              <a:gd name="connsiteX1" fmla="*/ 473952 w 559472"/>
-              <a:gd name="connsiteY1" fmla="*/ 0 h 3709642"/>
-              <a:gd name="connsiteX2" fmla="*/ 485840 w 559472"/>
-              <a:gd name="connsiteY2" fmla="*/ 161194 h 3709642"/>
-              <a:gd name="connsiteX3" fmla="*/ 523949 w 559472"/>
-              <a:gd name="connsiteY3" fmla="*/ 3672197 h 3709642"/>
-              <a:gd name="connsiteX4" fmla="*/ 454748 w 559472"/>
-              <a:gd name="connsiteY4" fmla="*/ 3709642 h 3709642"/>
-              <a:gd name="connsiteX5" fmla="*/ 448224 w 559472"/>
-              <a:gd name="connsiteY5" fmla="*/ 3510471 h 3709642"/>
-              <a:gd name="connsiteX6" fmla="*/ 443564 w 559472"/>
-              <a:gd name="connsiteY6" fmla="*/ 3408563 h 3709642"/>
-              <a:gd name="connsiteX7" fmla="*/ 438902 w 559472"/>
-              <a:gd name="connsiteY7" fmla="*/ 3304407 h 3709642"/>
-              <a:gd name="connsiteX8" fmla="*/ 433941 w 559472"/>
-              <a:gd name="connsiteY8" fmla="*/ 3198777 h 3709642"/>
-              <a:gd name="connsiteX9" fmla="*/ 427584 w 559472"/>
-              <a:gd name="connsiteY9" fmla="*/ 3092510 h 3709642"/>
-              <a:gd name="connsiteX10" fmla="*/ 420988 w 559472"/>
-              <a:gd name="connsiteY10" fmla="*/ 2984390 h 3709642"/>
-              <a:gd name="connsiteX11" fmla="*/ 414330 w 559472"/>
-              <a:gd name="connsiteY11" fmla="*/ 2874401 h 3709642"/>
-              <a:gd name="connsiteX12" fmla="*/ 406840 w 559472"/>
-              <a:gd name="connsiteY12" fmla="*/ 2762980 h 3709642"/>
-              <a:gd name="connsiteX13" fmla="*/ 397745 w 559472"/>
-              <a:gd name="connsiteY13" fmla="*/ 2650566 h 3709642"/>
-              <a:gd name="connsiteX14" fmla="*/ 389154 w 559472"/>
-              <a:gd name="connsiteY14" fmla="*/ 2536612 h 3709642"/>
-              <a:gd name="connsiteX15" fmla="*/ 379225 w 559472"/>
-              <a:gd name="connsiteY15" fmla="*/ 2421642 h 3709642"/>
-              <a:gd name="connsiteX16" fmla="*/ 368316 w 559472"/>
-              <a:gd name="connsiteY16" fmla="*/ 2305627 h 3709642"/>
-              <a:gd name="connsiteX17" fmla="*/ 357466 w 559472"/>
-              <a:gd name="connsiteY17" fmla="*/ 2189233 h 3709642"/>
-              <a:gd name="connsiteX18" fmla="*/ 344982 w 559472"/>
-              <a:gd name="connsiteY18" fmla="*/ 2071473 h 3709642"/>
-              <a:gd name="connsiteX19" fmla="*/ 332466 w 559472"/>
-              <a:gd name="connsiteY19" fmla="*/ 1952216 h 3709642"/>
-              <a:gd name="connsiteX20" fmla="*/ 319121 w 559472"/>
-              <a:gd name="connsiteY20" fmla="*/ 1833776 h 3709642"/>
-              <a:gd name="connsiteX21" fmla="*/ 304408 w 559472"/>
-              <a:gd name="connsiteY21" fmla="*/ 1713948 h 3709642"/>
-              <a:gd name="connsiteX22" fmla="*/ 288685 w 559472"/>
-              <a:gd name="connsiteY22" fmla="*/ 1592703 h 3709642"/>
-              <a:gd name="connsiteX23" fmla="*/ 273050 w 559472"/>
-              <a:gd name="connsiteY23" fmla="*/ 1471451 h 3709642"/>
-              <a:gd name="connsiteX24" fmla="*/ 255813 w 559472"/>
-              <a:gd name="connsiteY24" fmla="*/ 1350328 h 3709642"/>
-              <a:gd name="connsiteX25" fmla="*/ 237060 w 559472"/>
-              <a:gd name="connsiteY25" fmla="*/ 1227080 h 3709642"/>
-              <a:gd name="connsiteX26" fmla="*/ 218488 w 559472"/>
-              <a:gd name="connsiteY26" fmla="*/ 1106065 h 3709642"/>
-              <a:gd name="connsiteX27" fmla="*/ 198221 w 559472"/>
-              <a:gd name="connsiteY27" fmla="*/ 982940 h 3709642"/>
-              <a:gd name="connsiteX28" fmla="*/ 177152 w 559472"/>
-              <a:gd name="connsiteY28" fmla="*/ 858755 h 3709642"/>
-              <a:gd name="connsiteX29" fmla="*/ 155551 w 559472"/>
-              <a:gd name="connsiteY29" fmla="*/ 736861 h 3709642"/>
-              <a:gd name="connsiteX30" fmla="*/ 131782 w 559472"/>
-              <a:gd name="connsiteY30" fmla="*/ 613645 h 3709642"/>
-              <a:gd name="connsiteX31" fmla="*/ 107123 w 559472"/>
-              <a:gd name="connsiteY31" fmla="*/ 490500 h 3709642"/>
-              <a:gd name="connsiteX32" fmla="*/ 82552 w 559472"/>
-              <a:gd name="connsiteY32" fmla="*/ 367348 h 3709642"/>
-              <a:gd name="connsiteX33" fmla="*/ 55608 w 559472"/>
-              <a:gd name="connsiteY33" fmla="*/ 244762 h 3709642"/>
-              <a:gd name="connsiteX34" fmla="*/ 28130 w 559472"/>
-              <a:gd name="connsiteY34" fmla="*/ 122220 h 3709642"/>
-              <a:gd name="connsiteX35" fmla="*/ 0 w 559472"/>
-              <a:gd name="connsiteY35" fmla="*/ 0 h 3709642"/>
-            </a:gdLst>
-            <a:ahLst/>
-            <a:cxnLst>
-              <a:cxn ang="0">
-                <a:pos x="connsiteX0" y="connsiteY0"/>
-              </a:cxn>
-              <a:cxn ang="0">
-                <a:pos x="connsiteX1" y="connsiteY1"/>
-              </a:cxn>
-              <a:cxn ang="0">
-                <a:pos x="connsiteX2" y="connsiteY2"/>
-              </a:cxn>
-              <a:cxn ang="0">
-                <a:pos x="connsiteX3" y="connsiteY3"/>
-              </a:cxn>
-              <a:cxn ang="0">
-                <a:pos x="connsiteX4" y="connsiteY4"/>
-              </a:cxn>
-              <a:cxn ang="0">
-                <a:pos x="connsiteX5" y="connsiteY5"/>
-              </a:cxn>
-              <a:cxn ang="0">
-                <a:pos x="connsiteX6" y="connsiteY6"/>
-              </a:cxn>
-              <a:cxn ang="0">
-                <a:pos x="connsiteX7" y="connsiteY7"/>
-              </a:cxn>
-              <a:cxn ang="0">
-                <a:pos x="connsiteX8" y="connsiteY8"/>
-              </a:cxn>
-              <a:cxn ang="0">
-                <a:pos x="connsiteX9" y="connsiteY9"/>
-              </a:cxn>
-              <a:cxn ang="0">
-                <a:pos x="connsiteX10" y="connsiteY10"/>
-              </a:cxn>
-              <a:cxn ang="0">
-                <a:pos x="connsiteX11" y="connsiteY11"/>
-              </a:cxn>
-              <a:cxn ang="0">
-                <a:pos x="connsiteX12" y="connsiteY12"/>
-              </a:cxn>
-              <a:cxn ang="0">
-                <a:pos x="connsiteX13" y="connsiteY13"/>
-              </a:cxn>
-              <a:cxn ang="0">
-                <a:pos x="connsiteX14" y="connsiteY14"/>
-              </a:cxn>
-              <a:cxn ang="0">
-                <a:pos x="connsiteX15" y="connsiteY15"/>
-              </a:cxn>
-              <a:cxn ang="0">
-                <a:pos x="connsiteX16" y="connsiteY16"/>
-              </a:cxn>
-              <a:cxn ang="0">
-                <a:pos x="connsiteX17" y="connsiteY17"/>
-              </a:cxn>
-              <a:cxn ang="0">
-                <a:pos x="connsiteX18" y="connsiteY18"/>
-              </a:cxn>
-              <a:cxn ang="0">
-                <a:pos x="connsiteX19" y="connsiteY19"/>
-              </a:cxn>
-              <a:cxn ang="0">
-                <a:pos x="connsiteX20" y="connsiteY20"/>
-              </a:cxn>
-              <a:cxn ang="0">
-                <a:pos x="connsiteX21" y="connsiteY21"/>
-              </a:cxn>
-              <a:cxn ang="0">
-                <a:pos x="connsiteX22" y="connsiteY22"/>
-              </a:cxn>
-              <a:cxn ang="0">
-                <a:pos x="connsiteX23" y="connsiteY23"/>
-              </a:cxn>
-              <a:cxn ang="0">
-                <a:pos x="connsiteX24" y="connsiteY24"/>
-              </a:cxn>
-              <a:cxn ang="0">
-                <a:pos x="connsiteX25" y="connsiteY25"/>
-              </a:cxn>
-              <a:cxn ang="0">
-                <a:pos x="connsiteX26" y="connsiteY26"/>
-              </a:cxn>
-              <a:cxn ang="0">
-                <a:pos x="connsiteX27" y="connsiteY27"/>
-              </a:cxn>
-              <a:cxn ang="0">
-                <a:pos x="connsiteX28" y="connsiteY28"/>
-              </a:cxn>
-              <a:cxn ang="0">
-                <a:pos x="connsiteX29" y="connsiteY29"/>
-              </a:cxn>
-              <a:cxn ang="0">
-                <a:pos x="connsiteX30" y="connsiteY30"/>
-              </a:cxn>
-              <a:cxn ang="0">
-                <a:pos x="connsiteX31" y="connsiteY31"/>
-              </a:cxn>
-              <a:cxn ang="0">
-                <a:pos x="connsiteX32" y="connsiteY32"/>
-              </a:cxn>
-              <a:cxn ang="0">
-                <a:pos x="connsiteX33" y="connsiteY33"/>
-              </a:cxn>
-              <a:cxn ang="0">
-                <a:pos x="connsiteX34" y="connsiteY34"/>
-              </a:cxn>
-              <a:cxn ang="0">
-                <a:pos x="connsiteX35" y="connsiteY35"/>
-              </a:cxn>
-            </a:cxnLst>
-            <a:rect l="l" t="t" r="r" b="b"/>
-            <a:pathLst>
-              <a:path w="559472" h="3709642">
-                <a:moveTo>
-                  <a:pt x="0" y="0"/>
-                </a:moveTo>
-                <a:lnTo>
-                  <a:pt x="473952" y="0"/>
-                </a:lnTo>
-                <a:lnTo>
-                  <a:pt x="485840" y="161194"/>
-                </a:lnTo>
-                <a:cubicBezTo>
-                  <a:pt x="552063" y="1147770"/>
-                  <a:pt x="592441" y="3086737"/>
-                  <a:pt x="523949" y="3672197"/>
-                </a:cubicBezTo>
-                <a:cubicBezTo>
-                  <a:pt x="500842" y="3684557"/>
-                  <a:pt x="477855" y="3697282"/>
-                  <a:pt x="454748" y="3709642"/>
-                </a:cubicBezTo>
-                <a:lnTo>
-                  <a:pt x="448224" y="3510471"/>
-                </a:lnTo>
-                <a:lnTo>
-                  <a:pt x="443564" y="3408563"/>
-                </a:lnTo>
-                <a:lnTo>
-                  <a:pt x="438902" y="3304407"/>
-                </a:lnTo>
-                <a:lnTo>
-                  <a:pt x="433941" y="3198777"/>
-                </a:lnTo>
-                <a:lnTo>
-                  <a:pt x="427584" y="3092510"/>
-                </a:lnTo>
-                <a:lnTo>
-                  <a:pt x="420988" y="2984390"/>
-                </a:lnTo>
-                <a:lnTo>
-                  <a:pt x="414330" y="2874401"/>
-                </a:lnTo>
-                <a:lnTo>
-                  <a:pt x="406840" y="2762980"/>
-                </a:lnTo>
-                <a:lnTo>
-                  <a:pt x="397745" y="2650566"/>
-                </a:lnTo>
-                <a:lnTo>
-                  <a:pt x="389154" y="2536612"/>
-                </a:lnTo>
-                <a:lnTo>
-                  <a:pt x="379225" y="2421642"/>
-                </a:lnTo>
-                <a:lnTo>
-                  <a:pt x="368316" y="2305627"/>
-                </a:lnTo>
-                <a:lnTo>
-                  <a:pt x="357466" y="2189233"/>
-                </a:lnTo>
-                <a:lnTo>
-                  <a:pt x="344982" y="2071473"/>
-                </a:lnTo>
-                <a:lnTo>
-                  <a:pt x="332466" y="1952216"/>
-                </a:lnTo>
-                <a:lnTo>
-                  <a:pt x="319121" y="1833776"/>
-                </a:lnTo>
-                <a:lnTo>
-                  <a:pt x="304408" y="1713948"/>
-                </a:lnTo>
-                <a:lnTo>
-                  <a:pt x="288685" y="1592703"/>
-                </a:lnTo>
-                <a:lnTo>
-                  <a:pt x="273050" y="1471451"/>
-                </a:lnTo>
-                <a:lnTo>
-                  <a:pt x="255813" y="1350328"/>
-                </a:lnTo>
-                <a:lnTo>
-                  <a:pt x="237060" y="1227080"/>
-                </a:lnTo>
-                <a:lnTo>
-                  <a:pt x="218488" y="1106065"/>
-                </a:lnTo>
-                <a:lnTo>
-                  <a:pt x="198221" y="982940"/>
-                </a:lnTo>
-                <a:lnTo>
-                  <a:pt x="177152" y="858755"/>
-                </a:lnTo>
-                <a:lnTo>
-                  <a:pt x="155551" y="736861"/>
-                </a:lnTo>
-                <a:lnTo>
-                  <a:pt x="131782" y="613645"/>
-                </a:lnTo>
-                <a:lnTo>
-                  <a:pt x="107123" y="490500"/>
-                </a:lnTo>
-                <a:lnTo>
-                  <a:pt x="82552" y="367348"/>
-                </a:lnTo>
-                <a:lnTo>
-                  <a:pt x="55608" y="244762"/>
-                </a:lnTo>
-                <a:lnTo>
-                  <a:pt x="28130" y="122220"/>
-                </a:lnTo>
-                <a:lnTo>
-                  <a:pt x="0" y="0"/>
-                </a:lnTo>
-                <a:close/>
-              </a:path>
-            </a:pathLst>
-          </a:custGeom>
-          <a:solidFill>
-            <a:schemeClr val="bg1">
-              <a:alpha val="20000"/>
-            </a:schemeClr>
-          </a:solidFill>
-          <a:ln>
-            <a:noFill/>
-          </a:ln>
-        </p:spPr>
-        <p:txBody>
-          <a:bodyPr rtlCol="0" anchor="ctr"/>
-          <a:lstStyle/>
-          <a:p>
-            <a:pPr algn="ctr"/>
-            <a:endParaRPr lang="en-US"/>
-          </a:p>
-        </p:txBody>
-      </p:sp>
-      <p:sp useBgFill="1">
-        <p:nvSpPr>
-          <p:cNvPr id="52" name="Freeform: Shape 43">
-            <a:extLst>
-              <a:ext uri="{FF2B5EF4-FFF2-40B4-BE49-F238E27FC236}">
-                <a16:creationId xmlns:a16="http://schemas.microsoft.com/office/drawing/2014/main" id="{7DCB61BE-FA0F-4EFB-BE0E-268BAD8E30D6}"/>
-              </a:ext>
-              <a:ext uri="{C183D7F6-B498-43B3-948B-1728B52AA6E4}">
-                <adec:decorative xmlns:adec="http://schemas.microsoft.com/office/drawing/2017/decorative" val="1"/>
-              </a:ext>
-            </a:extLst>
-          </p:cNvPr>
-          <p:cNvSpPr>
-            <a:spLocks noGrp="1" noRot="1" noChangeAspect="1" noMove="1" noResize="1" noEditPoints="1" noAdjustHandles="1" noChangeArrowheads="1" noChangeShapeType="1" noTextEdit="1"/>
-          </p:cNvSpPr>
-          <p:nvPr>
-            <p:extLst>
-              <p:ext uri="{386F3935-93C4-4BCD-93E2-E3B085C9AB24}">
-                <p16:designElem xmlns:p16="http://schemas.microsoft.com/office/powerpoint/2015/main" val="1"/>
-              </p:ext>
-            </p:extLst>
-          </p:nvPr>
-        </p:nvSpPr>
-        <p:spPr bwMode="gray">
-          <a:xfrm rot="16200000">
-            <a:off x="4747655" y="-586345"/>
-            <a:ext cx="6858001" cy="8030691"/>
-          </a:xfrm>
-          <a:custGeom>
-            <a:avLst/>
-            <a:gdLst>
-              <a:gd name="connsiteX0" fmla="*/ 6858001 w 6858001"/>
-              <a:gd name="connsiteY0" fmla="*/ 1177 h 8030691"/>
-              <a:gd name="connsiteX1" fmla="*/ 6858001 w 6858001"/>
-              <a:gd name="connsiteY1" fmla="*/ 1344715 h 8030691"/>
-              <a:gd name="connsiteX2" fmla="*/ 6858000 w 6858001"/>
-              <a:gd name="connsiteY2" fmla="*/ 1344715 h 8030691"/>
-              <a:gd name="connsiteX3" fmla="*/ 6858000 w 6858001"/>
-              <a:gd name="connsiteY3" fmla="*/ 8030691 h 8030691"/>
-              <a:gd name="connsiteX4" fmla="*/ 0 w 6858001"/>
-              <a:gd name="connsiteY4" fmla="*/ 8030690 h 8030691"/>
-              <a:gd name="connsiteX5" fmla="*/ 0 w 6858001"/>
-              <a:gd name="connsiteY5" fmla="*/ 477747 h 8030691"/>
-              <a:gd name="connsiteX6" fmla="*/ 1 w 6858001"/>
-              <a:gd name="connsiteY6" fmla="*/ 477747 h 8030691"/>
-              <a:gd name="connsiteX7" fmla="*/ 1 w 6858001"/>
-              <a:gd name="connsiteY7" fmla="*/ 0 h 8030691"/>
-              <a:gd name="connsiteX8" fmla="*/ 40463 w 6858001"/>
-              <a:gd name="connsiteY8" fmla="*/ 5883 h 8030691"/>
-              <a:gd name="connsiteX9" fmla="*/ 159107 w 6858001"/>
-              <a:gd name="connsiteY9" fmla="*/ 23196 h 8030691"/>
-              <a:gd name="connsiteX10" fmla="*/ 245518 w 6858001"/>
-              <a:gd name="connsiteY10" fmla="*/ 35299 h 8030691"/>
-              <a:gd name="connsiteX11" fmla="*/ 348388 w 6858001"/>
-              <a:gd name="connsiteY11" fmla="*/ 48074 h 8030691"/>
-              <a:gd name="connsiteX12" fmla="*/ 470460 w 6858001"/>
-              <a:gd name="connsiteY12" fmla="*/ 63370 h 8030691"/>
-              <a:gd name="connsiteX13" fmla="*/ 605563 w 6858001"/>
-              <a:gd name="connsiteY13" fmla="*/ 79507 h 8030691"/>
-              <a:gd name="connsiteX14" fmla="*/ 757810 w 6858001"/>
-              <a:gd name="connsiteY14" fmla="*/ 96484 h 8030691"/>
-              <a:gd name="connsiteX15" fmla="*/ 923774 w 6858001"/>
-              <a:gd name="connsiteY15" fmla="*/ 114469 h 8030691"/>
-              <a:gd name="connsiteX16" fmla="*/ 1104139 w 6858001"/>
-              <a:gd name="connsiteY16" fmla="*/ 132455 h 8030691"/>
-              <a:gd name="connsiteX17" fmla="*/ 1296163 w 6858001"/>
-              <a:gd name="connsiteY17" fmla="*/ 150776 h 8030691"/>
-              <a:gd name="connsiteX18" fmla="*/ 1503275 w 6858001"/>
-              <a:gd name="connsiteY18" fmla="*/ 167753 h 8030691"/>
-              <a:gd name="connsiteX19" fmla="*/ 1719988 w 6858001"/>
-              <a:gd name="connsiteY19" fmla="*/ 184058 h 8030691"/>
-              <a:gd name="connsiteX20" fmla="*/ 1949045 w 6858001"/>
-              <a:gd name="connsiteY20" fmla="*/ 198850 h 8030691"/>
-              <a:gd name="connsiteX21" fmla="*/ 2187703 w 6858001"/>
-              <a:gd name="connsiteY21" fmla="*/ 212969 h 8030691"/>
-              <a:gd name="connsiteX22" fmla="*/ 2436649 w 6858001"/>
-              <a:gd name="connsiteY22" fmla="*/ 226249 h 8030691"/>
-              <a:gd name="connsiteX23" fmla="*/ 2564208 w 6858001"/>
-              <a:gd name="connsiteY23" fmla="*/ 230955 h 8030691"/>
-              <a:gd name="connsiteX24" fmla="*/ 2694509 w 6858001"/>
-              <a:gd name="connsiteY24" fmla="*/ 236166 h 8030691"/>
-              <a:gd name="connsiteX25" fmla="*/ 2826869 w 6858001"/>
-              <a:gd name="connsiteY25" fmla="*/ 241040 h 8030691"/>
-              <a:gd name="connsiteX26" fmla="*/ 2959914 w 6858001"/>
-              <a:gd name="connsiteY26" fmla="*/ 244234 h 8030691"/>
-              <a:gd name="connsiteX27" fmla="*/ 3095702 w 6858001"/>
-              <a:gd name="connsiteY27" fmla="*/ 247092 h 8030691"/>
-              <a:gd name="connsiteX28" fmla="*/ 3232862 w 6858001"/>
-              <a:gd name="connsiteY28" fmla="*/ 250117 h 8030691"/>
-              <a:gd name="connsiteX29" fmla="*/ 3372766 w 6858001"/>
-              <a:gd name="connsiteY29" fmla="*/ 252134 h 8030691"/>
-              <a:gd name="connsiteX30" fmla="*/ 3514040 w 6858001"/>
-              <a:gd name="connsiteY30" fmla="*/ 252134 h 8030691"/>
-              <a:gd name="connsiteX31" fmla="*/ 3656686 w 6858001"/>
-              <a:gd name="connsiteY31" fmla="*/ 253143 h 8030691"/>
-              <a:gd name="connsiteX32" fmla="*/ 3800705 w 6858001"/>
-              <a:gd name="connsiteY32" fmla="*/ 252134 h 8030691"/>
-              <a:gd name="connsiteX33" fmla="*/ 3946780 w 6858001"/>
-              <a:gd name="connsiteY33" fmla="*/ 250117 h 8030691"/>
-              <a:gd name="connsiteX34" fmla="*/ 4092856 w 6858001"/>
-              <a:gd name="connsiteY34" fmla="*/ 248268 h 8030691"/>
-              <a:gd name="connsiteX35" fmla="*/ 4240988 w 6858001"/>
-              <a:gd name="connsiteY35" fmla="*/ 244234 h 8030691"/>
-              <a:gd name="connsiteX36" fmla="*/ 4390492 w 6858001"/>
-              <a:gd name="connsiteY36" fmla="*/ 240032 h 8030691"/>
-              <a:gd name="connsiteX37" fmla="*/ 4539997 w 6858001"/>
-              <a:gd name="connsiteY37" fmla="*/ 235157 h 8030691"/>
-              <a:gd name="connsiteX38" fmla="*/ 4690873 w 6858001"/>
-              <a:gd name="connsiteY38" fmla="*/ 228266 h 8030691"/>
-              <a:gd name="connsiteX39" fmla="*/ 4843120 w 6858001"/>
-              <a:gd name="connsiteY39" fmla="*/ 220029 h 8030691"/>
-              <a:gd name="connsiteX40" fmla="*/ 4996054 w 6858001"/>
-              <a:gd name="connsiteY40" fmla="*/ 212129 h 8030691"/>
-              <a:gd name="connsiteX41" fmla="*/ 5148987 w 6858001"/>
-              <a:gd name="connsiteY41" fmla="*/ 202044 h 8030691"/>
-              <a:gd name="connsiteX42" fmla="*/ 5303978 w 6858001"/>
-              <a:gd name="connsiteY42" fmla="*/ 189941 h 8030691"/>
-              <a:gd name="connsiteX43" fmla="*/ 5456911 w 6858001"/>
-              <a:gd name="connsiteY43" fmla="*/ 177839 h 8030691"/>
-              <a:gd name="connsiteX44" fmla="*/ 5612588 w 6858001"/>
-              <a:gd name="connsiteY44" fmla="*/ 163887 h 8030691"/>
-              <a:gd name="connsiteX45" fmla="*/ 5768950 w 6858001"/>
-              <a:gd name="connsiteY45" fmla="*/ 148591 h 8030691"/>
-              <a:gd name="connsiteX46" fmla="*/ 5923255 w 6858001"/>
-              <a:gd name="connsiteY46" fmla="*/ 132455 h 8030691"/>
-              <a:gd name="connsiteX47" fmla="*/ 6079618 w 6858001"/>
-              <a:gd name="connsiteY47" fmla="*/ 113629 h 8030691"/>
-              <a:gd name="connsiteX48" fmla="*/ 6235294 w 6858001"/>
-              <a:gd name="connsiteY48" fmla="*/ 93458 h 8030691"/>
-              <a:gd name="connsiteX49" fmla="*/ 6391657 w 6858001"/>
-              <a:gd name="connsiteY49" fmla="*/ 73455 h 8030691"/>
-              <a:gd name="connsiteX50" fmla="*/ 6547333 w 6858001"/>
-              <a:gd name="connsiteY50" fmla="*/ 50091 h 8030691"/>
-              <a:gd name="connsiteX51" fmla="*/ 6702324 w 6858001"/>
-              <a:gd name="connsiteY51" fmla="*/ 26222 h 8030691"/>
-            </a:gdLst>
-            <a:ahLst/>
-            <a:cxnLst>
-              <a:cxn ang="0">
-                <a:pos x="connsiteX0" y="connsiteY0"/>
-              </a:cxn>
-              <a:cxn ang="0">
-                <a:pos x="connsiteX1" y="connsiteY1"/>
-              </a:cxn>
-              <a:cxn ang="0">
-                <a:pos x="connsiteX2" y="connsiteY2"/>
-              </a:cxn>
-              <a:cxn ang="0">
-                <a:pos x="connsiteX3" y="connsiteY3"/>
-              </a:cxn>
-              <a:cxn ang="0">
-                <a:pos x="connsiteX4" y="connsiteY4"/>
-              </a:cxn>
-              <a:cxn ang="0">
-                <a:pos x="connsiteX5" y="connsiteY5"/>
-              </a:cxn>
-              <a:cxn ang="0">
-                <a:pos x="connsiteX6" y="connsiteY6"/>
-              </a:cxn>
-              <a:cxn ang="0">
-                <a:pos x="connsiteX7" y="connsiteY7"/>
-              </a:cxn>
-              <a:cxn ang="0">
-                <a:pos x="connsiteX8" y="connsiteY8"/>
-              </a:cxn>
-              <a:cxn ang="0">
-                <a:pos x="connsiteX9" y="connsiteY9"/>
-              </a:cxn>
-              <a:cxn ang="0">
-                <a:pos x="connsiteX10" y="connsiteY10"/>
-              </a:cxn>
-              <a:cxn ang="0">
-                <a:pos x="connsiteX11" y="connsiteY11"/>
-              </a:cxn>
-              <a:cxn ang="0">
-                <a:pos x="connsiteX12" y="connsiteY12"/>
-              </a:cxn>
-              <a:cxn ang="0">
-                <a:pos x="connsiteX13" y="connsiteY13"/>
-              </a:cxn>
-              <a:cxn ang="0">
-                <a:pos x="connsiteX14" y="connsiteY14"/>
-              </a:cxn>
-              <a:cxn ang="0">
-                <a:pos x="connsiteX15" y="connsiteY15"/>
-              </a:cxn>
-              <a:cxn ang="0">
-                <a:pos x="connsiteX16" y="connsiteY16"/>
-              </a:cxn>
-              <a:cxn ang="0">
-                <a:pos x="connsiteX17" y="connsiteY17"/>
-              </a:cxn>
-              <a:cxn ang="0">
-                <a:pos x="connsiteX18" y="connsiteY18"/>
-              </a:cxn>
-              <a:cxn ang="0">
-                <a:pos x="connsiteX19" y="connsiteY19"/>
-              </a:cxn>
-              <a:cxn ang="0">
-                <a:pos x="connsiteX20" y="connsiteY20"/>
-              </a:cxn>
-              <a:cxn ang="0">
-                <a:pos x="connsiteX21" y="connsiteY21"/>
-              </a:cxn>
-              <a:cxn ang="0">
-                <a:pos x="connsiteX22" y="connsiteY22"/>
-              </a:cxn>
-              <a:cxn ang="0">
-                <a:pos x="connsiteX23" y="connsiteY23"/>
-              </a:cxn>
-              <a:cxn ang="0">
-                <a:pos x="connsiteX24" y="connsiteY24"/>
-              </a:cxn>
-              <a:cxn ang="0">
-                <a:pos x="connsiteX25" y="connsiteY25"/>
-              </a:cxn>
-              <a:cxn ang="0">
-                <a:pos x="connsiteX26" y="connsiteY26"/>
-              </a:cxn>
-              <a:cxn ang="0">
-                <a:pos x="connsiteX27" y="connsiteY27"/>
-              </a:cxn>
-              <a:cxn ang="0">
-                <a:pos x="connsiteX28" y="connsiteY28"/>
-              </a:cxn>
-              <a:cxn ang="0">
-                <a:pos x="connsiteX29" y="connsiteY29"/>
-              </a:cxn>
-              <a:cxn ang="0">
-                <a:pos x="connsiteX30" y="connsiteY30"/>
-              </a:cxn>
-              <a:cxn ang="0">
-                <a:pos x="connsiteX31" y="connsiteY31"/>
-              </a:cxn>
-              <a:cxn ang="0">
-                <a:pos x="connsiteX32" y="connsiteY32"/>
-              </a:cxn>
-              <a:cxn ang="0">
-                <a:pos x="connsiteX33" y="connsiteY33"/>
-              </a:cxn>
-              <a:cxn ang="0">
-                <a:pos x="connsiteX34" y="connsiteY34"/>
-              </a:cxn>
-              <a:cxn ang="0">
-                <a:pos x="connsiteX35" y="connsiteY35"/>
-              </a:cxn>
-              <a:cxn ang="0">
-                <a:pos x="connsiteX36" y="connsiteY36"/>
-              </a:cxn>
-              <a:cxn ang="0">
-                <a:pos x="connsiteX37" y="connsiteY37"/>
-              </a:cxn>
-              <a:cxn ang="0">
-                <a:pos x="connsiteX38" y="connsiteY38"/>
-              </a:cxn>
-              <a:cxn ang="0">
-                <a:pos x="connsiteX39" y="connsiteY39"/>
-              </a:cxn>
-              <a:cxn ang="0">
-                <a:pos x="connsiteX40" y="connsiteY40"/>
-              </a:cxn>
-              <a:cxn ang="0">
-                <a:pos x="connsiteX41" y="connsiteY41"/>
-              </a:cxn>
-              <a:cxn ang="0">
-                <a:pos x="connsiteX42" y="connsiteY42"/>
-              </a:cxn>
-              <a:cxn ang="0">
-                <a:pos x="connsiteX43" y="connsiteY43"/>
-              </a:cxn>
-              <a:cxn ang="0">
-                <a:pos x="connsiteX44" y="connsiteY44"/>
-              </a:cxn>
-              <a:cxn ang="0">
-                <a:pos x="connsiteX45" y="connsiteY45"/>
-              </a:cxn>
-              <a:cxn ang="0">
-                <a:pos x="connsiteX46" y="connsiteY46"/>
-              </a:cxn>
-              <a:cxn ang="0">
-                <a:pos x="connsiteX47" y="connsiteY47"/>
-              </a:cxn>
-              <a:cxn ang="0">
-                <a:pos x="connsiteX48" y="connsiteY48"/>
-              </a:cxn>
-              <a:cxn ang="0">
-                <a:pos x="connsiteX49" y="connsiteY49"/>
-              </a:cxn>
-              <a:cxn ang="0">
-                <a:pos x="connsiteX50" y="connsiteY50"/>
-              </a:cxn>
-              <a:cxn ang="0">
-                <a:pos x="connsiteX51" y="connsiteY51"/>
-              </a:cxn>
-            </a:cxnLst>
-            <a:rect l="l" t="t" r="r" b="b"/>
-            <a:pathLst>
-              <a:path w="6858001" h="8030691">
-                <a:moveTo>
-                  <a:pt x="6858001" y="1177"/>
-                </a:moveTo>
-                <a:lnTo>
-                  <a:pt x="6858001" y="1344715"/>
-                </a:lnTo>
-                <a:lnTo>
-                  <a:pt x="6858000" y="1344715"/>
-                </a:lnTo>
-                <a:lnTo>
-                  <a:pt x="6858000" y="8030691"/>
-                </a:lnTo>
-                <a:lnTo>
-                  <a:pt x="0" y="8030690"/>
-                </a:lnTo>
-                <a:lnTo>
-                  <a:pt x="0" y="477747"/>
-                </a:lnTo>
-                <a:lnTo>
-                  <a:pt x="1" y="477747"/>
-                </a:lnTo>
-                <a:lnTo>
-                  <a:pt x="1" y="0"/>
-                </a:lnTo>
-                <a:lnTo>
-                  <a:pt x="40463" y="5883"/>
-                </a:lnTo>
-                <a:lnTo>
-                  <a:pt x="159107" y="23196"/>
-                </a:lnTo>
-                <a:lnTo>
-                  <a:pt x="245518" y="35299"/>
-                </a:lnTo>
-                <a:lnTo>
-                  <a:pt x="348388" y="48074"/>
-                </a:lnTo>
-                <a:lnTo>
-                  <a:pt x="470460" y="63370"/>
-                </a:lnTo>
-                <a:lnTo>
-                  <a:pt x="605563" y="79507"/>
-                </a:lnTo>
-                <a:lnTo>
-                  <a:pt x="757810" y="96484"/>
-                </a:lnTo>
-                <a:lnTo>
-                  <a:pt x="923774" y="114469"/>
-                </a:lnTo>
-                <a:lnTo>
-                  <a:pt x="1104139" y="132455"/>
-                </a:lnTo>
-                <a:lnTo>
-                  <a:pt x="1296163" y="150776"/>
-                </a:lnTo>
-                <a:lnTo>
-                  <a:pt x="1503275" y="167753"/>
-                </a:lnTo>
-                <a:lnTo>
-                  <a:pt x="1719988" y="184058"/>
-                </a:lnTo>
-                <a:lnTo>
-                  <a:pt x="1949045" y="198850"/>
-                </a:lnTo>
-                <a:lnTo>
-                  <a:pt x="2187703" y="212969"/>
-                </a:lnTo>
-                <a:lnTo>
-                  <a:pt x="2436649" y="226249"/>
-                </a:lnTo>
-                <a:lnTo>
-                  <a:pt x="2564208" y="230955"/>
-                </a:lnTo>
-                <a:lnTo>
-                  <a:pt x="2694509" y="236166"/>
-                </a:lnTo>
-                <a:lnTo>
-                  <a:pt x="2826869" y="241040"/>
-                </a:lnTo>
-                <a:lnTo>
-                  <a:pt x="2959914" y="244234"/>
-                </a:lnTo>
-                <a:lnTo>
-                  <a:pt x="3095702" y="247092"/>
-                </a:lnTo>
-                <a:lnTo>
-                  <a:pt x="3232862" y="250117"/>
-                </a:lnTo>
-                <a:lnTo>
-                  <a:pt x="3372766" y="252134"/>
-                </a:lnTo>
-                <a:lnTo>
-                  <a:pt x="3514040" y="252134"/>
-                </a:lnTo>
-                <a:lnTo>
-                  <a:pt x="3656686" y="253143"/>
-                </a:lnTo>
-                <a:lnTo>
-                  <a:pt x="3800705" y="252134"/>
-                </a:lnTo>
-                <a:lnTo>
-                  <a:pt x="3946780" y="250117"/>
-                </a:lnTo>
-                <a:lnTo>
-                  <a:pt x="4092856" y="248268"/>
-                </a:lnTo>
-                <a:lnTo>
-                  <a:pt x="4240988" y="244234"/>
-                </a:lnTo>
-                <a:lnTo>
-                  <a:pt x="4390492" y="240032"/>
-                </a:lnTo>
-                <a:lnTo>
-                  <a:pt x="4539997" y="235157"/>
-                </a:lnTo>
-                <a:lnTo>
-                  <a:pt x="4690873" y="228266"/>
-                </a:lnTo>
-                <a:lnTo>
-                  <a:pt x="4843120" y="220029"/>
-                </a:lnTo>
-                <a:lnTo>
-                  <a:pt x="4996054" y="212129"/>
-                </a:lnTo>
-                <a:lnTo>
-                  <a:pt x="5148987" y="202044"/>
-                </a:lnTo>
-                <a:lnTo>
-                  <a:pt x="5303978" y="189941"/>
-                </a:lnTo>
-                <a:lnTo>
-                  <a:pt x="5456911" y="177839"/>
-                </a:lnTo>
-                <a:lnTo>
-                  <a:pt x="5612588" y="163887"/>
-                </a:lnTo>
-                <a:lnTo>
-                  <a:pt x="5768950" y="148591"/>
-                </a:lnTo>
-                <a:lnTo>
-                  <a:pt x="5923255" y="132455"/>
-                </a:lnTo>
-                <a:lnTo>
-                  <a:pt x="6079618" y="113629"/>
-                </a:lnTo>
-                <a:lnTo>
-                  <a:pt x="6235294" y="93458"/>
-                </a:lnTo>
-                <a:lnTo>
-                  <a:pt x="6391657" y="73455"/>
-                </a:lnTo>
-                <a:lnTo>
-                  <a:pt x="6547333" y="50091"/>
-                </a:lnTo>
-                <a:lnTo>
-                  <a:pt x="6702324" y="26222"/>
-                </a:lnTo>
-                <a:close/>
-              </a:path>
-            </a:pathLst>
-          </a:custGeom>
-          <a:ln>
-            <a:noFill/>
-          </a:ln>
-        </p:spPr>
-      </p:sp>
-      <p:sp>
-        <p:nvSpPr>
-          <p:cNvPr id="53" name="Rectangle 45">
-            <a:extLst>
-              <a:ext uri="{FF2B5EF4-FFF2-40B4-BE49-F238E27FC236}">
-                <a16:creationId xmlns:a16="http://schemas.microsoft.com/office/drawing/2014/main" id="{A4B31EAA-7423-46F7-9B90-4AB2B09C35C4}"/>
-              </a:ext>
-              <a:ext uri="{C183D7F6-B498-43B3-948B-1728B52AA6E4}">
-                <adec:decorative xmlns:adec="http://schemas.microsoft.com/office/drawing/2017/decorative" val="1"/>
-              </a:ext>
-            </a:extLst>
-          </p:cNvPr>
-          <p:cNvSpPr>
-            <a:spLocks noGrp="1" noRot="1" noChangeAspect="1" noMove="1" noResize="1" noEditPoints="1" noAdjustHandles="1" noChangeArrowheads="1" noChangeShapeType="1" noTextEdit="1"/>
-          </p:cNvSpPr>
-          <p:nvPr>
-            <p:extLst>
-              <p:ext uri="{386F3935-93C4-4BCD-93E2-E3B085C9AB24}">
-                <p16:designElem xmlns:p16="http://schemas.microsoft.com/office/powerpoint/2015/main" val="1"/>
-              </p:ext>
-            </p:extLst>
-          </p:nvPr>
-        </p:nvSpPr>
-        <p:spPr>
-          <a:xfrm>
-            <a:off x="10437812" y="0"/>
-            <a:ext cx="685800" cy="1143000"/>
-          </a:xfrm>
-          <a:prstGeom prst="rect">
-            <a:avLst/>
-          </a:prstGeom>
-          <a:solidFill>
-            <a:schemeClr val="accent1"/>
-          </a:solidFill>
-          <a:ln>
-            <a:noFill/>
-          </a:ln>
-        </p:spPr>
-        <p:style>
-          <a:lnRef idx="1">
-            <a:schemeClr val="accent1"/>
-          </a:lnRef>
-          <a:fillRef idx="3">
-            <a:schemeClr val="accent1"/>
-          </a:fillRef>
-          <a:effectRef idx="2">
-            <a:schemeClr val="accent1"/>
-          </a:effectRef>
-          <a:fontRef idx="minor">
-            <a:schemeClr val="lt1"/>
-          </a:fontRef>
-        </p:style>
-      </p:sp>
-      <p:pic>
-        <p:nvPicPr>
-          <p:cNvPr id="54" name="Espace réservé du contenu 8">
-            <a:extLst>
-              <a:ext uri="{FF2B5EF4-FFF2-40B4-BE49-F238E27FC236}">
-                <a16:creationId xmlns:a16="http://schemas.microsoft.com/office/drawing/2014/main" id="{B69A34AC-6A4C-4B35-A18C-91237E1472DC}"/>
+                <a16:creationId xmlns:a16="http://schemas.microsoft.com/office/drawing/2014/main" id="{4E1680A2-0040-4531-B209-0BA9D4ED4284}"/>
               </a:ext>
             </a:extLst>
           </p:cNvPr>
           <p:cNvPicPr>
-            <a:picLocks noChangeAspect="1"/>
+            <a:picLocks noGrp="1" noChangeAspect="1"/>
           </p:cNvPicPr>
-          <p:nvPr/>
+          <p:nvPr>
+            <p:ph idx="1"/>
+          </p:nvPr>
         </p:nvPicPr>
         <p:blipFill>
           <a:blip r:embed="rId3">
@@ -9622,120 +8638,163 @@
         </p:blipFill>
         <p:spPr>
           <a:xfrm>
-            <a:off x="4720782" y="1602620"/>
-            <a:ext cx="7036716" cy="4521090"/>
+            <a:off x="867245" y="1406199"/>
+            <a:ext cx="8962085" cy="4910789"/>
+          </a:xfrm>
+        </p:spPr>
+      </p:pic>
+      <p:sp>
+        <p:nvSpPr>
+          <p:cNvPr id="4" name="Espace réservé du numéro de diapositive 3">
+            <a:extLst>
+              <a:ext uri="{FF2B5EF4-FFF2-40B4-BE49-F238E27FC236}">
+                <a16:creationId xmlns:a16="http://schemas.microsoft.com/office/drawing/2014/main" id="{917F6769-927A-43AA-A939-EF5241566688}"/>
+              </a:ext>
+            </a:extLst>
+          </p:cNvPr>
+          <p:cNvSpPr>
+            <a:spLocks noGrp="1"/>
+          </p:cNvSpPr>
+          <p:nvPr>
+            <p:ph type="sldNum" sz="quarter" idx="12"/>
+          </p:nvPr>
+        </p:nvSpPr>
+        <p:spPr/>
+        <p:txBody>
+          <a:bodyPr/>
+          <a:lstStyle/>
+          <a:p>
+            <a:fld id="{127B63D7-A8CB-4105-87F4-60707FA10D94}" type="slidenum">
+              <a:rPr lang="en-GB" smtClean="0"/>
+              <a:t>3</a:t>
+            </a:fld>
+            <a:endParaRPr lang="en-GB"/>
+          </a:p>
+        </p:txBody>
+      </p:sp>
+      <p:sp>
+        <p:nvSpPr>
+          <p:cNvPr id="7" name="ZoneTexte 6">
+            <a:extLst>
+              <a:ext uri="{FF2B5EF4-FFF2-40B4-BE49-F238E27FC236}">
+                <a16:creationId xmlns:a16="http://schemas.microsoft.com/office/drawing/2014/main" id="{DF50E693-45C7-48F5-B970-80C6CA5F4C6F}"/>
+              </a:ext>
+            </a:extLst>
+          </p:cNvPr>
+          <p:cNvSpPr txBox="1"/>
+          <p:nvPr/>
+        </p:nvSpPr>
+        <p:spPr>
+          <a:xfrm>
+            <a:off x="1393824" y="6324084"/>
+            <a:ext cx="7908926" cy="369332"/>
           </a:xfrm>
           <a:prstGeom prst="rect">
             <a:avLst/>
           </a:prstGeom>
-          <a:effectLst/>
+          <a:noFill/>
         </p:spPr>
-      </p:pic>
-      <p:sp>
-        <p:nvSpPr>
-          <p:cNvPr id="2" name="Titre 1">
+        <p:txBody>
+          <a:bodyPr wrap="square" rtlCol="0">
+            <a:spAutoFit/>
+          </a:bodyPr>
+          <a:lstStyle/>
+          <a:p>
+            <a:pPr algn="ctr"/>
+            <a:r>
+              <a:rPr lang="fr-FR" sz="1100" dirty="0"/>
+              <a:t>Généré avec </a:t>
+            </a:r>
+            <a:r>
+              <a:rPr lang="fr-FR" sz="1100" dirty="0" err="1"/>
+              <a:t>PlantUML</a:t>
+            </a:r>
+            <a:r>
+              <a:rPr lang="fr-FR" sz="1100" dirty="0"/>
+              <a:t> </a:t>
+            </a:r>
+            <a:r>
+              <a:rPr lang="fr-FR" dirty="0"/>
+              <a:t>  </a:t>
+            </a:r>
+          </a:p>
+        </p:txBody>
+      </p:sp>
+      <p:graphicFrame>
+        <p:nvGraphicFramePr>
+          <p:cNvPr id="9" name="Objet 8">
             <a:extLst>
               <a:ext uri="{FF2B5EF4-FFF2-40B4-BE49-F238E27FC236}">
-                <a16:creationId xmlns:a16="http://schemas.microsoft.com/office/drawing/2014/main" id="{3E47E298-DD99-424B-840E-4FAFBEED9743}"/>
+                <a16:creationId xmlns:a16="http://schemas.microsoft.com/office/drawing/2014/main" id="{F2D8465B-37F3-4CAE-8C36-1348FAB0E502}"/>
               </a:ext>
             </a:extLst>
           </p:cNvPr>
-          <p:cNvSpPr>
-            <a:spLocks noGrp="1"/>
-          </p:cNvSpPr>
-          <p:nvPr>
-            <p:ph type="title"/>
-          </p:nvPr>
-        </p:nvSpPr>
-        <p:spPr>
-          <a:xfrm>
-            <a:off x="643855" y="2706624"/>
-            <a:ext cx="3108626" cy="1444752"/>
-          </a:xfrm>
-        </p:spPr>
-        <p:txBody>
-          <a:bodyPr vert="horz" lIns="91440" tIns="45720" rIns="91440" bIns="45720" rtlCol="0" anchor="ctr">
-            <a:normAutofit/>
-          </a:bodyPr>
-          <a:lstStyle/>
-          <a:p>
-            <a:r>
-              <a:rPr lang="fr-FR" sz="3200" b="0" i="0" kern="1200">
-                <a:solidFill>
-                  <a:srgbClr val="EBEBEB"/>
-                </a:solidFill>
-                <a:latin typeface="+mj-lt"/>
-                <a:ea typeface="+mj-ea"/>
-                <a:cs typeface="+mj-cs"/>
-              </a:rPr>
-              <a:t>Présentation Aero-Breizh</a:t>
-            </a:r>
-          </a:p>
-        </p:txBody>
-      </p:sp>
-      <p:sp>
-        <p:nvSpPr>
-          <p:cNvPr id="4" name="Espace réservé du numéro de diapositive 3">
-            <a:extLst>
-              <a:ext uri="{FF2B5EF4-FFF2-40B4-BE49-F238E27FC236}">
-                <a16:creationId xmlns:a16="http://schemas.microsoft.com/office/drawing/2014/main" id="{B994B995-BFFF-4770-B3BD-922B2E993AFC}"/>
-              </a:ext>
-            </a:extLst>
-          </p:cNvPr>
-          <p:cNvSpPr>
-            <a:spLocks noGrp="1"/>
-          </p:cNvSpPr>
-          <p:nvPr>
-            <p:ph type="sldNum" sz="quarter" idx="12"/>
-          </p:nvPr>
-        </p:nvSpPr>
-        <p:spPr>
-          <a:xfrm>
-            <a:off x="10352540" y="295729"/>
-            <a:ext cx="838199" cy="767687"/>
-          </a:xfrm>
-        </p:spPr>
-        <p:txBody>
-          <a:bodyPr vert="horz" lIns="91440" tIns="45720" rIns="91440" bIns="45720" rtlCol="0">
-            <a:normAutofit/>
-          </a:bodyPr>
-          <a:lstStyle/>
-          <a:p>
-            <a:pPr defTabSz="914400">
-              <a:spcAft>
-                <a:spcPts val="600"/>
-              </a:spcAft>
-            </a:pPr>
-            <a:fld id="{127B63D7-A8CB-4105-87F4-60707FA10D94}" type="slidenum">
-              <a:rPr lang="en-US">
-                <a:solidFill>
-                  <a:srgbClr val="FFFFFF"/>
-                </a:solidFill>
-              </a:rPr>
-              <a:pPr defTabSz="914400">
-                <a:spcAft>
-                  <a:spcPts val="600"/>
-                </a:spcAft>
-              </a:pPr>
-              <a:t>3</a:t>
-            </a:fld>
-            <a:endParaRPr lang="en-US" dirty="0">
-              <a:solidFill>
-                <a:srgbClr val="FFFFFF"/>
-              </a:solidFill>
-            </a:endParaRPr>
-          </a:p>
-        </p:txBody>
-      </p:sp>
+          <p:cNvGraphicFramePr>
+            <a:graphicFrameLocks noChangeAspect="1"/>
+          </p:cNvGraphicFramePr>
+          <p:nvPr>
+            <p:extLst>
+              <p:ext uri="{D42A27DB-BD31-4B8C-83A1-F6EECF244321}">
+                <p14:modId xmlns:p14="http://schemas.microsoft.com/office/powerpoint/2010/main" val="205724845"/>
+              </p:ext>
+            </p:extLst>
+          </p:nvPr>
+        </p:nvGraphicFramePr>
+        <p:xfrm>
+          <a:off x="11063287" y="6508750"/>
+          <a:ext cx="1128713" cy="349250"/>
+        </p:xfrm>
+        <a:graphic>
+          <a:graphicData uri="http://schemas.openxmlformats.org/presentationml/2006/ole">
+            <mc:AlternateContent xmlns:mc="http://schemas.openxmlformats.org/markup-compatibility/2006">
+              <mc:Choice xmlns:v="urn:schemas-microsoft-com:vml" Requires="v">
+                <p:oleObj spid="_x0000_s1040" name="Packager Shell Object" showAsIcon="1" r:id="rId4" imgW="1128600" imgH="349200" progId="Package">
+                  <p:embed/>
+                </p:oleObj>
+              </mc:Choice>
+              <mc:Fallback>
+                <p:oleObj name="Packager Shell Object" showAsIcon="1" r:id="rId4" imgW="1128600" imgH="349200" progId="Package">
+                  <p:embed/>
+                  <p:pic>
+                    <p:nvPicPr>
+                      <p:cNvPr id="0" name=""/>
+                      <p:cNvPicPr/>
+                      <p:nvPr/>
+                    </p:nvPicPr>
+                    <p:blipFill>
+                      <a:blip r:embed="rId5"/>
+                      <a:stretch>
+                        <a:fillRect/>
+                      </a:stretch>
+                    </p:blipFill>
+                    <p:spPr>
+                      <a:xfrm>
+                        <a:off x="11063287" y="6508750"/>
+                        <a:ext cx="1128713" cy="349250"/>
+                      </a:xfrm>
+                      <a:prstGeom prst="rect">
+                        <a:avLst/>
+                      </a:prstGeom>
+                      <a:solidFill>
+                        <a:schemeClr val="accent1"/>
+                      </a:solidFill>
+                    </p:spPr>
+                  </p:pic>
+                </p:oleObj>
+              </mc:Fallback>
+            </mc:AlternateContent>
+          </a:graphicData>
+        </a:graphic>
+      </p:graphicFrame>
     </p:spTree>
     <p:extLst>
       <p:ext uri="{BB962C8B-B14F-4D97-AF65-F5344CB8AC3E}">
-        <p14:creationId xmlns:p14="http://schemas.microsoft.com/office/powerpoint/2010/main" val="140982770"/>
+        <p14:creationId xmlns:p14="http://schemas.microsoft.com/office/powerpoint/2010/main" val="4258556019"/>
       </p:ext>
     </p:extLst>
   </p:cSld>
   <p:clrMapOvr>
-    <a:overrideClrMapping bg1="lt1" tx1="dk1" bg2="lt2" tx2="dk2" accent1="accent1" accent2="accent2" accent3="accent3" accent4="accent4" accent5="accent5" accent6="accent6" hlink="hlink" folHlink="folHlink"/>
+    <a:masterClrMapping/>
   </p:clrMapOvr>
 </p:sld>
 </file>

</xml_diff>

<commit_message>
Mockup de la vue du projet de migration et démarrage de la présentation powerpoint
</commit_message>
<xml_diff>
--- a/Project/MPI_NPE_Presentation NFE210.pptx
+++ b/Project/MPI_NPE_Presentation NFE210.pptx
@@ -5,26 +5,32 @@
     <p:sldMasterId id="2147483696" r:id="rId1"/>
   </p:sldMasterIdLst>
   <p:notesMasterIdLst>
-    <p:notesMasterId r:id="rId16"/>
+    <p:notesMasterId r:id="rId22"/>
   </p:notesMasterIdLst>
   <p:handoutMasterIdLst>
-    <p:handoutMasterId r:id="rId17"/>
+    <p:handoutMasterId r:id="rId23"/>
   </p:handoutMasterIdLst>
   <p:sldIdLst>
     <p:sldId id="256" r:id="rId2"/>
     <p:sldId id="257" r:id="rId3"/>
-    <p:sldId id="271" r:id="rId4"/>
-    <p:sldId id="265" r:id="rId5"/>
-    <p:sldId id="259" r:id="rId6"/>
-    <p:sldId id="260" r:id="rId7"/>
-    <p:sldId id="261" r:id="rId8"/>
-    <p:sldId id="266" r:id="rId9"/>
-    <p:sldId id="262" r:id="rId10"/>
-    <p:sldId id="263" r:id="rId11"/>
-    <p:sldId id="267" r:id="rId12"/>
-    <p:sldId id="268" r:id="rId13"/>
-    <p:sldId id="269" r:id="rId14"/>
-    <p:sldId id="270" r:id="rId15"/>
+    <p:sldId id="272" r:id="rId4"/>
+    <p:sldId id="271" r:id="rId5"/>
+    <p:sldId id="265" r:id="rId6"/>
+    <p:sldId id="259" r:id="rId7"/>
+    <p:sldId id="260" r:id="rId8"/>
+    <p:sldId id="261" r:id="rId9"/>
+    <p:sldId id="273" r:id="rId10"/>
+    <p:sldId id="266" r:id="rId11"/>
+    <p:sldId id="262" r:id="rId12"/>
+    <p:sldId id="263" r:id="rId13"/>
+    <p:sldId id="268" r:id="rId14"/>
+    <p:sldId id="274" r:id="rId15"/>
+    <p:sldId id="267" r:id="rId16"/>
+    <p:sldId id="275" r:id="rId17"/>
+    <p:sldId id="276" r:id="rId18"/>
+    <p:sldId id="277" r:id="rId19"/>
+    <p:sldId id="269" r:id="rId20"/>
+    <p:sldId id="270" r:id="rId21"/>
   </p:sldIdLst>
   <p:sldSz cx="12192000" cy="6858000"/>
   <p:notesSz cx="6858000" cy="9144000"/>
@@ -125,7 +131,7 @@
   </p:defaultTextStyle>
   <p:extLst>
     <p:ext uri="{EFAFB233-063F-42B5-8137-9DF3F51BA10A}">
-      <p15:sldGuideLst xmlns:p15="http://schemas.microsoft.com/office/powerpoint/2012/main"/>
+      <p15:sldGuideLst xmlns:p15="http://schemas.microsoft.com/office/powerpoint/2012/main" xmlns=""/>
     </p:ext>
   </p:extLst>
 </p:presentation>
@@ -158,7 +164,7 @@
           <p:cNvPr id="2" name="Espace réservé de l'en-tête 1">
             <a:extLst>
               <a:ext uri="{FF2B5EF4-FFF2-40B4-BE49-F238E27FC236}">
-                <a16:creationId xmlns:a16="http://schemas.microsoft.com/office/drawing/2014/main" id="{B256A708-5AC1-45D6-99D2-370CDDEC9DD6}"/>
+                <a16:creationId xmlns:a16="http://schemas.microsoft.com/office/drawing/2014/main" xmlns="" id="{B256A708-5AC1-45D6-99D2-370CDDEC9DD6}"/>
               </a:ext>
             </a:extLst>
           </p:cNvPr>
@@ -195,7 +201,7 @@
           <p:cNvPr id="3" name="Espace réservé de la date 2">
             <a:extLst>
               <a:ext uri="{FF2B5EF4-FFF2-40B4-BE49-F238E27FC236}">
-                <a16:creationId xmlns:a16="http://schemas.microsoft.com/office/drawing/2014/main" id="{51D25BC3-EB04-4D9A-B084-403A0CC00025}"/>
+                <a16:creationId xmlns:a16="http://schemas.microsoft.com/office/drawing/2014/main" xmlns="" id="{51D25BC3-EB04-4D9A-B084-403A0CC00025}"/>
               </a:ext>
             </a:extLst>
           </p:cNvPr>
@@ -225,7 +231,7 @@
           <a:p>
             <a:fld id="{D67FF10B-49A3-47F0-97A4-40CFA1E6A290}" type="datetimeFigureOut">
               <a:rPr lang="en-GB" smtClean="0"/>
-              <a:t>05/06/2018</a:t>
+              <a:t>08/06/2018</a:t>
             </a:fld>
             <a:endParaRPr lang="en-GB"/>
           </a:p>
@@ -236,7 +242,7 @@
           <p:cNvPr id="4" name="Espace réservé du pied de page 3">
             <a:extLst>
               <a:ext uri="{FF2B5EF4-FFF2-40B4-BE49-F238E27FC236}">
-                <a16:creationId xmlns:a16="http://schemas.microsoft.com/office/drawing/2014/main" id="{E92170BA-C24F-4AFE-85EC-188150036829}"/>
+                <a16:creationId xmlns:a16="http://schemas.microsoft.com/office/drawing/2014/main" xmlns="" id="{E92170BA-C24F-4AFE-85EC-188150036829}"/>
               </a:ext>
             </a:extLst>
           </p:cNvPr>
@@ -273,7 +279,7 @@
           <p:cNvPr id="5" name="Espace réservé du numéro de diapositive 4">
             <a:extLst>
               <a:ext uri="{FF2B5EF4-FFF2-40B4-BE49-F238E27FC236}">
-                <a16:creationId xmlns:a16="http://schemas.microsoft.com/office/drawing/2014/main" id="{92592474-78D3-41D7-8930-C77C2E1AD071}"/>
+                <a16:creationId xmlns:a16="http://schemas.microsoft.com/office/drawing/2014/main" xmlns="" id="{92592474-78D3-41D7-8930-C77C2E1AD071}"/>
               </a:ext>
             </a:extLst>
           </p:cNvPr>
@@ -403,7 +409,7 @@
           <a:p>
             <a:fld id="{0672BD84-068F-4711-9548-95846F635E8F}" type="datetimeFigureOut">
               <a:rPr lang="en-GB" smtClean="0"/>
-              <a:t>05/06/2018</a:t>
+              <a:t>08/06/2018</a:t>
             </a:fld>
             <a:endParaRPr lang="en-GB"/>
           </a:p>
@@ -858,7 +864,7 @@
           <a:p>
             <a:fld id="{D3F8A352-7D6F-42CE-8661-E5131235BF66}" type="datetime1">
               <a:rPr lang="en-GB" smtClean="0"/>
-              <a:t>05/06/2018</a:t>
+              <a:t>08/06/2018</a:t>
             </a:fld>
             <a:endParaRPr lang="en-GB"/>
           </a:p>
@@ -1133,7 +1139,7 @@
           <a:p>
             <a:fld id="{737DF7A2-D041-4336-AA3E-BC558500F365}" type="datetime1">
               <a:rPr lang="en-GB" smtClean="0"/>
-              <a:t>05/06/2018</a:t>
+              <a:t>08/06/2018</a:t>
             </a:fld>
             <a:endParaRPr lang="en-GB"/>
           </a:p>
@@ -1327,7 +1333,7 @@
           <a:p>
             <a:fld id="{2F0FE0E5-BE83-4864-8C9B-04EDD65BD4B6}" type="datetime1">
               <a:rPr lang="en-GB" smtClean="0"/>
-              <a:t>05/06/2018</a:t>
+              <a:t>08/06/2018</a:t>
             </a:fld>
             <a:endParaRPr lang="en-GB"/>
           </a:p>
@@ -1600,7 +1606,7 @@
           <a:p>
             <a:fld id="{79FBD189-42AE-47A2-8621-C858C528542C}" type="datetime1">
               <a:rPr lang="en-GB" smtClean="0"/>
-              <a:t>05/06/2018</a:t>
+              <a:t>08/06/2018</a:t>
             </a:fld>
             <a:endParaRPr lang="en-GB"/>
           </a:p>
@@ -1941,7 +1947,7 @@
           <a:p>
             <a:fld id="{DAA0C222-6505-498B-99E2-E23C861EC4B0}" type="datetime1">
               <a:rPr lang="en-GB" smtClean="0"/>
-              <a:t>05/06/2018</a:t>
+              <a:t>08/06/2018</a:t>
             </a:fld>
             <a:endParaRPr lang="en-GB"/>
           </a:p>
@@ -2564,7 +2570,7 @@
           <a:p>
             <a:fld id="{7C39C3F6-E6AE-4AD4-868E-81687961A7A0}" type="datetime1">
               <a:rPr lang="en-GB" smtClean="0"/>
-              <a:t>05/06/2018</a:t>
+              <a:t>08/06/2018</a:t>
             </a:fld>
             <a:endParaRPr lang="en-GB"/>
           </a:p>
@@ -3424,7 +3430,7 @@
           <a:p>
             <a:fld id="{E3F2F273-67B7-4E62-828A-6B2245ABCEF1}" type="datetime1">
               <a:rPr lang="en-GB" smtClean="0"/>
-              <a:t>05/06/2018</a:t>
+              <a:t>08/06/2018</a:t>
             </a:fld>
             <a:endParaRPr lang="en-GB"/>
           </a:p>
@@ -3594,7 +3600,7 @@
           <a:p>
             <a:fld id="{978BA116-B39F-46A2-B198-7692611A70E3}" type="datetime1">
               <a:rPr lang="en-GB" smtClean="0"/>
-              <a:t>05/06/2018</a:t>
+              <a:t>08/06/2018</a:t>
             </a:fld>
             <a:endParaRPr lang="en-GB"/>
           </a:p>
@@ -3774,7 +3780,7 @@
           <a:p>
             <a:fld id="{CB6FC1EB-9754-4FD9-834F-05FAC21D9E74}" type="datetime1">
               <a:rPr lang="en-GB" smtClean="0"/>
-              <a:t>05/06/2018</a:t>
+              <a:t>08/06/2018</a:t>
             </a:fld>
             <a:endParaRPr lang="en-GB"/>
           </a:p>
@@ -3944,7 +3950,7 @@
           <a:p>
             <a:fld id="{D47DACD9-42AD-489F-A028-44BF51632F48}" type="datetime1">
               <a:rPr lang="en-GB" smtClean="0"/>
-              <a:t>05/06/2018</a:t>
+              <a:t>08/06/2018</a:t>
             </a:fld>
             <a:endParaRPr lang="en-GB"/>
           </a:p>
@@ -4191,7 +4197,7 @@
           <a:p>
             <a:fld id="{716999AB-4BBE-421E-96D8-F77383334567}" type="datetime1">
               <a:rPr lang="en-GB" smtClean="0"/>
-              <a:t>05/06/2018</a:t>
+              <a:t>08/06/2018</a:t>
             </a:fld>
             <a:endParaRPr lang="en-GB"/>
           </a:p>
@@ -4483,7 +4489,7 @@
           <a:p>
             <a:fld id="{1E1B7FD6-8831-454A-BA17-78599D9F40E4}" type="datetime1">
               <a:rPr lang="en-GB" smtClean="0"/>
-              <a:t>05/06/2018</a:t>
+              <a:t>08/06/2018</a:t>
             </a:fld>
             <a:endParaRPr lang="en-GB"/>
           </a:p>
@@ -4927,7 +4933,7 @@
           <a:p>
             <a:fld id="{F1FF7740-8C1B-44B0-90A3-F61A245B4357}" type="datetime1">
               <a:rPr lang="en-GB" smtClean="0"/>
-              <a:t>05/06/2018</a:t>
+              <a:t>08/06/2018</a:t>
             </a:fld>
             <a:endParaRPr lang="en-GB"/>
           </a:p>
@@ -5045,7 +5051,7 @@
           <a:p>
             <a:fld id="{2210AB09-C69F-4882-BD36-28B0274D6B54}" type="datetime1">
               <a:rPr lang="en-GB" smtClean="0"/>
-              <a:t>05/06/2018</a:t>
+              <a:t>08/06/2018</a:t>
             </a:fld>
             <a:endParaRPr lang="en-GB"/>
           </a:p>
@@ -5140,7 +5146,7 @@
           <a:p>
             <a:fld id="{BCFFED70-E428-4A78-B9C5-CE51938ABDD2}" type="datetime1">
               <a:rPr lang="en-GB" smtClean="0"/>
-              <a:t>05/06/2018</a:t>
+              <a:t>08/06/2018</a:t>
             </a:fld>
             <a:endParaRPr lang="en-GB"/>
           </a:p>
@@ -5419,7 +5425,7 @@
           <a:p>
             <a:fld id="{03E8AFBE-FB91-4AAD-8303-18D4EF660008}" type="datetime1">
               <a:rPr lang="en-GB" smtClean="0"/>
-              <a:t>05/06/2018</a:t>
+              <a:t>08/06/2018</a:t>
             </a:fld>
             <a:endParaRPr lang="en-GB"/>
           </a:p>
@@ -5694,7 +5700,7 @@
           <a:p>
             <a:fld id="{ED8A7ACC-1AC7-45B5-B082-BCD311BAA20D}" type="datetime1">
               <a:rPr lang="en-GB" smtClean="0"/>
-              <a:t>05/06/2018</a:t>
+              <a:t>08/06/2018</a:t>
             </a:fld>
             <a:endParaRPr lang="en-GB"/>
           </a:p>
@@ -6123,7 +6129,7 @@
           <a:p>
             <a:fld id="{57D8A53F-BA63-449F-B271-6EFE62D8B86B}" type="datetime1">
               <a:rPr lang="en-GB" smtClean="0"/>
-              <a:t>05/06/2018</a:t>
+              <a:t>08/06/2018</a:t>
             </a:fld>
             <a:endParaRPr lang="en-GB"/>
           </a:p>
@@ -6665,7 +6671,7 @@
           <p:cNvPr id="17" name="Rectangle 8">
             <a:extLst>
               <a:ext uri="{FF2B5EF4-FFF2-40B4-BE49-F238E27FC236}">
-                <a16:creationId xmlns:a16="http://schemas.microsoft.com/office/drawing/2014/main" id="{F3F4807A-5068-4492-8025-D75F320E908D}"/>
+                <a16:creationId xmlns:a16="http://schemas.microsoft.com/office/drawing/2014/main" xmlns="" id="{F3F4807A-5068-4492-8025-D75F320E908D}"/>
               </a:ext>
             </a:extLst>
           </p:cNvPr>
@@ -6675,7 +6681,7 @@
           <p:nvPr>
             <p:extLst>
               <p:ext uri="{386F3935-93C4-4BCD-93E2-E3B085C9AB24}">
-                <p16:designElem xmlns:p16="http://schemas.microsoft.com/office/powerpoint/2015/main" val="1"/>
+                <p16:designElem xmlns:p16="http://schemas.microsoft.com/office/powerpoint/2015/main" xmlns="" val="1"/>
               </p:ext>
             </p:extLst>
           </p:nvPr>
@@ -6722,7 +6728,7 @@
           <p:cNvPr id="18" name="Freeform 36">
             <a:extLst>
               <a:ext uri="{FF2B5EF4-FFF2-40B4-BE49-F238E27FC236}">
-                <a16:creationId xmlns:a16="http://schemas.microsoft.com/office/drawing/2014/main" id="{B24996F8-180C-4DCB-8A26-DFA336CDEFBC}"/>
+                <a16:creationId xmlns:a16="http://schemas.microsoft.com/office/drawing/2014/main" xmlns="" id="{B24996F8-180C-4DCB-8A26-DFA336CDEFBC}"/>
               </a:ext>
             </a:extLst>
           </p:cNvPr>
@@ -6732,7 +6738,7 @@
           <p:nvPr>
             <p:extLst>
               <p:ext uri="{386F3935-93C4-4BCD-93E2-E3B085C9AB24}">
-                <p16:designElem xmlns:p16="http://schemas.microsoft.com/office/powerpoint/2015/main" val="1"/>
+                <p16:designElem xmlns:p16="http://schemas.microsoft.com/office/powerpoint/2015/main" xmlns="" val="1"/>
               </p:ext>
             </p:extLst>
           </p:nvPr>
@@ -7071,7 +7077,7 @@
           <p:cNvPr id="19" name="Rectangle 12">
             <a:extLst>
               <a:ext uri="{FF2B5EF4-FFF2-40B4-BE49-F238E27FC236}">
-                <a16:creationId xmlns:a16="http://schemas.microsoft.com/office/drawing/2014/main" id="{630182B0-3559-41D5-9EBC-0BD86BEDAD09}"/>
+                <a16:creationId xmlns:a16="http://schemas.microsoft.com/office/drawing/2014/main" xmlns="" id="{630182B0-3559-41D5-9EBC-0BD86BEDAD09}"/>
               </a:ext>
             </a:extLst>
           </p:cNvPr>
@@ -7081,7 +7087,7 @@
           <p:nvPr>
             <p:extLst>
               <p:ext uri="{386F3935-93C4-4BCD-93E2-E3B085C9AB24}">
-                <p16:designElem xmlns:p16="http://schemas.microsoft.com/office/powerpoint/2015/main" val="1"/>
+                <p16:designElem xmlns:p16="http://schemas.microsoft.com/office/powerpoint/2015/main" xmlns="" val="1"/>
               </p:ext>
             </p:extLst>
           </p:nvPr>
@@ -7121,7 +7127,7 @@
           <p:cNvPr id="20" name="Freeform: Shape 14">
             <a:extLst>
               <a:ext uri="{FF2B5EF4-FFF2-40B4-BE49-F238E27FC236}">
-                <a16:creationId xmlns:a16="http://schemas.microsoft.com/office/drawing/2014/main" id="{D8B22DE2-C518-4F77-BE90-E1B6B1909D91}"/>
+                <a16:creationId xmlns:a16="http://schemas.microsoft.com/office/drawing/2014/main" xmlns="" id="{D8B22DE2-C518-4F77-BE90-E1B6B1909D91}"/>
               </a:ext>
             </a:extLst>
           </p:cNvPr>
@@ -7131,7 +7137,7 @@
           <p:nvPr>
             <p:extLst>
               <p:ext uri="{386F3935-93C4-4BCD-93E2-E3B085C9AB24}">
-                <p16:designElem xmlns:p16="http://schemas.microsoft.com/office/powerpoint/2015/main" val="1"/>
+                <p16:designElem xmlns:p16="http://schemas.microsoft.com/office/powerpoint/2015/main" xmlns="" val="1"/>
               </p:ext>
             </p:extLst>
           </p:nvPr>
@@ -7581,7 +7587,7 @@
           <p:cNvPr id="4" name="Image 3" descr="https://upload.wikimedia.org/wikipedia/commons/thumb/4/42/CNAM_Logo.svg/1000px-CNAM_Logo.svg.png">
             <a:extLst>
               <a:ext uri="{FF2B5EF4-FFF2-40B4-BE49-F238E27FC236}">
-                <a16:creationId xmlns:a16="http://schemas.microsoft.com/office/drawing/2014/main" id="{8FC39933-9226-42C4-B02E-FEA6ABB5856C}"/>
+                <a16:creationId xmlns:a16="http://schemas.microsoft.com/office/drawing/2014/main" xmlns="" id="{8FC39933-9226-42C4-B02E-FEA6ABB5856C}"/>
               </a:ext>
             </a:extLst>
           </p:cNvPr>
@@ -7618,7 +7624,7 @@
           <p:cNvPr id="2" name="Titre 1">
             <a:extLst>
               <a:ext uri="{FF2B5EF4-FFF2-40B4-BE49-F238E27FC236}">
-                <a16:creationId xmlns:a16="http://schemas.microsoft.com/office/drawing/2014/main" id="{982FC87B-FCE2-4FFF-A2F5-9E6D6B9E1CC9}"/>
+                <a16:creationId xmlns:a16="http://schemas.microsoft.com/office/drawing/2014/main" xmlns="" id="{982FC87B-FCE2-4FFF-A2F5-9E6D6B9E1CC9}"/>
               </a:ext>
             </a:extLst>
           </p:cNvPr>
@@ -7672,7 +7678,7 @@
           <p:cNvPr id="3" name="Sous-titre 2">
             <a:extLst>
               <a:ext uri="{FF2B5EF4-FFF2-40B4-BE49-F238E27FC236}">
-                <a16:creationId xmlns:a16="http://schemas.microsoft.com/office/drawing/2014/main" id="{A7E29A82-524E-415D-B019-5C448BF061B3}"/>
+                <a16:creationId xmlns:a16="http://schemas.microsoft.com/office/drawing/2014/main" xmlns="" id="{A7E29A82-524E-415D-B019-5C448BF061B3}"/>
               </a:ext>
             </a:extLst>
           </p:cNvPr>
@@ -7734,6 +7740,13 @@
   <p:clrMapOvr>
     <a:overrideClrMapping bg1="lt1" tx1="dk1" bg2="lt2" tx2="dk2" accent1="accent1" accent2="accent2" accent3="accent3" accent4="accent4" accent5="accent5" accent6="accent6" hlink="hlink" folHlink="folHlink"/>
   </p:clrMapOvr>
+  <p:timing>
+    <p:tnLst>
+      <p:par>
+        <p:cTn id="1" dur="indefinite" restart="never" nodeType="tmRoot"/>
+      </p:par>
+    </p:tnLst>
+  </p:timing>
 </p:sld>
 </file>
 
@@ -7756,10 +7769,10 @@
       </p:grpSpPr>
       <p:sp>
         <p:nvSpPr>
-          <p:cNvPr id="2" name="Titre 1">
+          <p:cNvPr id="4" name="Titre 3">
             <a:extLst>
               <a:ext uri="{FF2B5EF4-FFF2-40B4-BE49-F238E27FC236}">
-                <a16:creationId xmlns:a16="http://schemas.microsoft.com/office/drawing/2014/main" id="{3E47E298-DD99-424B-840E-4FAFBEED9743}"/>
+                <a16:creationId xmlns:a16="http://schemas.microsoft.com/office/drawing/2014/main" xmlns="" id="{F93902C4-F6C7-436F-B4F3-5924B28A4C32}"/>
               </a:ext>
             </a:extLst>
           </p:cNvPr>
@@ -7770,30 +7783,29 @@
             <p:ph type="title"/>
           </p:nvPr>
         </p:nvSpPr>
-        <p:spPr>
-          <a:xfrm>
-            <a:off x="646111" y="452719"/>
-            <a:ext cx="9404723" cy="790156"/>
-          </a:xfrm>
-        </p:spPr>
+        <p:spPr/>
         <p:txBody>
           <a:bodyPr/>
           <a:lstStyle/>
           <a:p>
-            <a:pPr algn="ctr"/>
             <a:r>
               <a:rPr lang="fr-FR" b="1" dirty="0"/>
-              <a:t>AéroNet</a:t>
-            </a:r>
-          </a:p>
-        </p:txBody>
-      </p:sp>
-      <p:sp>
-        <p:nvSpPr>
-          <p:cNvPr id="3" name="Espace réservé du contenu 2">
+              <a:t>SI </a:t>
+            </a:r>
+            <a:r>
+              <a:rPr lang="fr-FR" b="1" dirty="0" smtClean="0"/>
+              <a:t>Actuel</a:t>
+            </a:r>
+            <a:endParaRPr lang="fr-FR" b="1" dirty="0"/>
+          </a:p>
+        </p:txBody>
+      </p:sp>
+      <p:sp>
+        <p:nvSpPr>
+          <p:cNvPr id="5" name="Espace réservé du texte 4">
             <a:extLst>
               <a:ext uri="{FF2B5EF4-FFF2-40B4-BE49-F238E27FC236}">
-                <a16:creationId xmlns:a16="http://schemas.microsoft.com/office/drawing/2014/main" id="{37F25BD2-9027-45FC-9136-D69CC9700F4E}"/>
+                <a16:creationId xmlns:a16="http://schemas.microsoft.com/office/drawing/2014/main" xmlns="" id="{DEDA8C52-4803-48B8-9E38-1F7A36DEA2B6}"/>
               </a:ext>
             </a:extLst>
           </p:cNvPr>
@@ -7801,29 +7813,24 @@
             <a:spLocks noGrp="1"/>
           </p:cNvSpPr>
           <p:nvPr>
-            <p:ph idx="1"/>
-          </p:nvPr>
-        </p:nvSpPr>
-        <p:spPr>
-          <a:xfrm>
-            <a:off x="646111" y="1242875"/>
-            <a:ext cx="9404723" cy="5237824"/>
-          </a:xfrm>
-        </p:spPr>
+            <p:ph type="body" idx="1"/>
+          </p:nvPr>
+        </p:nvSpPr>
+        <p:spPr/>
         <p:txBody>
           <a:bodyPr/>
           <a:lstStyle/>
           <a:p>
-            <a:endParaRPr lang="en-GB" dirty="0"/>
-          </a:p>
-        </p:txBody>
-      </p:sp>
-      <p:sp>
-        <p:nvSpPr>
-          <p:cNvPr id="4" name="Espace réservé du numéro de diapositive 3">
+            <a:endParaRPr lang="fr-FR"/>
+          </a:p>
+        </p:txBody>
+      </p:sp>
+      <p:sp>
+        <p:nvSpPr>
+          <p:cNvPr id="2" name="Espace réservé du numéro de diapositive 1">
             <a:extLst>
               <a:ext uri="{FF2B5EF4-FFF2-40B4-BE49-F238E27FC236}">
-                <a16:creationId xmlns:a16="http://schemas.microsoft.com/office/drawing/2014/main" id="{83816142-F8D7-41CF-BB49-A6A61EF18AE9}"/>
+                <a16:creationId xmlns:a16="http://schemas.microsoft.com/office/drawing/2014/main" xmlns="" id="{F6DD80EB-A190-4809-9CB4-45F4C0592A99}"/>
               </a:ext>
             </a:extLst>
           </p:cNvPr>
@@ -7850,7 +7857,7 @@
     </p:spTree>
     <p:extLst>
       <p:ext uri="{BB962C8B-B14F-4D97-AF65-F5344CB8AC3E}">
-        <p14:creationId xmlns:p14="http://schemas.microsoft.com/office/powerpoint/2010/main" val="3226498662"/>
+        <p14:creationId xmlns:p14="http://schemas.microsoft.com/office/powerpoint/2010/main" val="4038036019"/>
       </p:ext>
     </p:extLst>
   </p:cSld>
@@ -7882,7 +7889,7 @@
           <p:cNvPr id="2" name="Titre 1">
             <a:extLst>
               <a:ext uri="{FF2B5EF4-FFF2-40B4-BE49-F238E27FC236}">
-                <a16:creationId xmlns:a16="http://schemas.microsoft.com/office/drawing/2014/main" id="{3E47E298-DD99-424B-840E-4FAFBEED9743}"/>
+                <a16:creationId xmlns:a16="http://schemas.microsoft.com/office/drawing/2014/main" xmlns="" id="{3E47E298-DD99-424B-840E-4FAFBEED9743}"/>
               </a:ext>
             </a:extLst>
           </p:cNvPr>
@@ -7895,7 +7902,7 @@
         </p:nvSpPr>
         <p:spPr>
           <a:xfrm>
-            <a:off x="646111" y="452719"/>
+            <a:off x="569911" y="0"/>
             <a:ext cx="9404723" cy="790156"/>
           </a:xfrm>
         </p:spPr>
@@ -7906,38 +7913,20 @@
             <a:pPr algn="ctr"/>
             <a:r>
               <a:rPr lang="fr-FR" b="1" dirty="0"/>
-              <a:t>POS Applicatif</a:t>
-            </a:r>
-          </a:p>
-        </p:txBody>
-      </p:sp>
-      <p:sp>
-        <p:nvSpPr>
-          <p:cNvPr id="3" name="Espace réservé du contenu 2">
-            <a:extLst>
-              <a:ext uri="{FF2B5EF4-FFF2-40B4-BE49-F238E27FC236}">
-                <a16:creationId xmlns:a16="http://schemas.microsoft.com/office/drawing/2014/main" id="{37F25BD2-9027-45FC-9136-D69CC9700F4E}"/>
-              </a:ext>
-            </a:extLst>
-          </p:cNvPr>
-          <p:cNvSpPr>
-            <a:spLocks noGrp="1"/>
-          </p:cNvSpPr>
-          <p:nvPr>
-            <p:ph idx="1"/>
-          </p:nvPr>
-        </p:nvSpPr>
-        <p:spPr>
-          <a:xfrm>
-            <a:off x="646111" y="1242875"/>
-            <a:ext cx="9404723" cy="5237824"/>
-          </a:xfrm>
-        </p:spPr>
-        <p:txBody>
-          <a:bodyPr/>
-          <a:lstStyle/>
-          <a:p>
-            <a:endParaRPr lang="en-GB" dirty="0"/>
+              <a:t>SI Actuel </a:t>
+            </a:r>
+            <a:r>
+              <a:rPr lang="fr-FR" b="1" dirty="0" smtClean="0"/>
+              <a:t>: POS </a:t>
+            </a:r>
+            <a:r>
+              <a:rPr lang="fr-FR" b="1" dirty="0"/>
+              <a:t>applicatif</a:t>
+            </a:r>
+            <a:br>
+              <a:rPr lang="fr-FR" b="1" dirty="0"/>
+            </a:br>
+            <a:endParaRPr lang="fr-FR" b="1" dirty="0"/>
           </a:p>
         </p:txBody>
       </p:sp>
@@ -7946,7 +7935,7 @@
           <p:cNvPr id="4" name="Espace réservé du numéro de diapositive 3">
             <a:extLst>
               <a:ext uri="{FF2B5EF4-FFF2-40B4-BE49-F238E27FC236}">
-                <a16:creationId xmlns:a16="http://schemas.microsoft.com/office/drawing/2014/main" id="{D08BFD3F-7C67-4120-B1D3-FF427EF49D65}"/>
+                <a16:creationId xmlns:a16="http://schemas.microsoft.com/office/drawing/2014/main" xmlns="" id="{189BB3FE-3B4D-4510-9CC2-33C0DE23EC5A}"/>
               </a:ext>
             </a:extLst>
           </p:cNvPr>
@@ -7970,10 +7959,36 @@
           </a:p>
         </p:txBody>
       </p:sp>
+      <p:pic>
+        <p:nvPicPr>
+          <p:cNvPr id="5" name="Espace réservé du contenu 4"/>
+          <p:cNvPicPr>
+            <a:picLocks noGrp="1"/>
+          </p:cNvPicPr>
+          <p:nvPr>
+            <p:ph idx="1"/>
+          </p:nvPr>
+        </p:nvPicPr>
+        <p:blipFill>
+          <a:blip r:embed="rId2"/>
+          <a:stretch>
+            <a:fillRect/>
+          </a:stretch>
+        </p:blipFill>
+        <p:spPr>
+          <a:xfrm>
+            <a:off x="1341092" y="1017589"/>
+            <a:ext cx="7862360" cy="5721878"/>
+          </a:xfrm>
+          <a:prstGeom prst="rect">
+            <a:avLst/>
+          </a:prstGeom>
+        </p:spPr>
+      </p:pic>
     </p:spTree>
     <p:extLst>
       <p:ext uri="{BB962C8B-B14F-4D97-AF65-F5344CB8AC3E}">
-        <p14:creationId xmlns:p14="http://schemas.microsoft.com/office/powerpoint/2010/main" val="508686246"/>
+        <p14:creationId xmlns:p14="http://schemas.microsoft.com/office/powerpoint/2010/main" val="691430565"/>
       </p:ext>
     </p:extLst>
   </p:cSld>
@@ -8005,7 +8020,7 @@
           <p:cNvPr id="2" name="Titre 1">
             <a:extLst>
               <a:ext uri="{FF2B5EF4-FFF2-40B4-BE49-F238E27FC236}">
-                <a16:creationId xmlns:a16="http://schemas.microsoft.com/office/drawing/2014/main" id="{3E47E298-DD99-424B-840E-4FAFBEED9743}"/>
+                <a16:creationId xmlns:a16="http://schemas.microsoft.com/office/drawing/2014/main" xmlns="" id="{3E47E298-DD99-424B-840E-4FAFBEED9743}"/>
               </a:ext>
             </a:extLst>
           </p:cNvPr>
@@ -8018,7 +8033,7 @@
         </p:nvSpPr>
         <p:spPr>
           <a:xfrm>
-            <a:off x="646111" y="452719"/>
+            <a:off x="612244" y="0"/>
             <a:ext cx="9404723" cy="790156"/>
           </a:xfrm>
         </p:spPr>
@@ -8029,38 +8044,13 @@
             <a:pPr algn="ctr"/>
             <a:r>
               <a:rPr lang="fr-FR" b="1" dirty="0"/>
-              <a:t>Infrastructure</a:t>
-            </a:r>
-          </a:p>
-        </p:txBody>
-      </p:sp>
-      <p:sp>
-        <p:nvSpPr>
-          <p:cNvPr id="3" name="Espace réservé du contenu 2">
-            <a:extLst>
-              <a:ext uri="{FF2B5EF4-FFF2-40B4-BE49-F238E27FC236}">
-                <a16:creationId xmlns:a16="http://schemas.microsoft.com/office/drawing/2014/main" id="{37F25BD2-9027-45FC-9136-D69CC9700F4E}"/>
-              </a:ext>
-            </a:extLst>
-          </p:cNvPr>
-          <p:cNvSpPr>
-            <a:spLocks noGrp="1"/>
-          </p:cNvSpPr>
-          <p:nvPr>
-            <p:ph idx="1"/>
-          </p:nvPr>
-        </p:nvSpPr>
-        <p:spPr>
-          <a:xfrm>
-            <a:off x="646111" y="1242875"/>
-            <a:ext cx="9404723" cy="5237824"/>
-          </a:xfrm>
-        </p:spPr>
-        <p:txBody>
-          <a:bodyPr/>
-          <a:lstStyle/>
-          <a:p>
-            <a:endParaRPr lang="en-GB" dirty="0"/>
+              <a:t>SI Actuel </a:t>
+            </a:r>
+            <a:r>
+              <a:rPr lang="fr-FR" b="1" dirty="0" smtClean="0"/>
+              <a:t>: Cartographie</a:t>
+            </a:r>
+            <a:endParaRPr lang="fr-FR" b="1" dirty="0"/>
           </a:p>
         </p:txBody>
       </p:sp>
@@ -8069,7 +8059,7 @@
           <p:cNvPr id="4" name="Espace réservé du numéro de diapositive 3">
             <a:extLst>
               <a:ext uri="{FF2B5EF4-FFF2-40B4-BE49-F238E27FC236}">
-                <a16:creationId xmlns:a16="http://schemas.microsoft.com/office/drawing/2014/main" id="{ED7D5C1C-5A21-484C-8DEB-9155EEC45427}"/>
+                <a16:creationId xmlns:a16="http://schemas.microsoft.com/office/drawing/2014/main" xmlns="" id="{83816142-F8D7-41CF-BB49-A6A61EF18AE9}"/>
               </a:ext>
             </a:extLst>
           </p:cNvPr>
@@ -8093,10 +8083,76 @@
           </a:p>
         </p:txBody>
       </p:sp>
+      <p:pic>
+        <p:nvPicPr>
+          <p:cNvPr id="6146" name="Picture 2"/>
+          <p:cNvPicPr>
+            <a:picLocks noGrp="1" noChangeAspect="1" noChangeArrowheads="1"/>
+          </p:cNvPicPr>
+          <p:nvPr>
+            <p:ph idx="1"/>
+          </p:nvPr>
+        </p:nvPicPr>
+        <p:blipFill>
+          <a:blip r:embed="rId2">
+            <a:extLst>
+              <a:ext uri="{28A0092B-C50C-407E-A947-70E740481C1C}">
+                <a14:useLocalDpi xmlns:a14="http://schemas.microsoft.com/office/drawing/2010/main" val="0"/>
+              </a:ext>
+            </a:extLst>
+          </a:blip>
+          <a:srcRect/>
+          <a:stretch>
+            <a:fillRect/>
+          </a:stretch>
+        </p:blipFill>
+        <p:spPr bwMode="auto">
+          <a:xfrm>
+            <a:off x="1403525" y="723124"/>
+            <a:ext cx="7822160" cy="6134876"/>
+          </a:xfrm>
+          <a:prstGeom prst="rect">
+            <a:avLst/>
+          </a:prstGeom>
+          <a:noFill/>
+          <a:ln>
+            <a:noFill/>
+          </a:ln>
+          <a:effectLst/>
+          <a:extLst>
+            <a:ext uri="{909E8E84-426E-40DD-AFC4-6F175D3DCCD1}">
+              <a14:hiddenFill xmlns:a14="http://schemas.microsoft.com/office/drawing/2010/main">
+                <a:solidFill>
+                  <a:schemeClr val="accent1"/>
+                </a:solidFill>
+              </a14:hiddenFill>
+            </a:ext>
+            <a:ext uri="{91240B29-F687-4F45-9708-019B960494DF}">
+              <a14:hiddenLine xmlns:a14="http://schemas.microsoft.com/office/drawing/2010/main" w="9525">
+                <a:solidFill>
+                  <a:schemeClr val="tx1"/>
+                </a:solidFill>
+                <a:miter lim="800000"/>
+                <a:headEnd/>
+                <a:tailEnd/>
+              </a14:hiddenLine>
+            </a:ext>
+            <a:ext uri="{AF507438-7753-43E0-B8FC-AC1667EBCBE1}">
+              <a14:hiddenEffects xmlns:a14="http://schemas.microsoft.com/office/drawing/2010/main">
+                <a:effectLst>
+                  <a:outerShdw dist="35921" dir="2700000" algn="ctr" rotWithShape="0">
+                    <a:schemeClr val="bg2"/>
+                  </a:outerShdw>
+                </a:effectLst>
+              </a14:hiddenEffects>
+            </a:ext>
+          </a:extLst>
+        </p:spPr>
+      </p:pic>
     </p:spTree>
     <p:extLst>
       <p:ext uri="{BB962C8B-B14F-4D97-AF65-F5344CB8AC3E}">
-        <p14:creationId xmlns:p14="http://schemas.microsoft.com/office/powerpoint/2010/main" val="2888172669"/>
+        <p14:creationId xmlns:p14="http://schemas.microsoft.com/office/powerpoint/2010/main" val="3226498662"/>
       </p:ext>
     </p:extLst>
   </p:cSld>
@@ -8128,7 +8184,7 @@
           <p:cNvPr id="2" name="Titre 1">
             <a:extLst>
               <a:ext uri="{FF2B5EF4-FFF2-40B4-BE49-F238E27FC236}">
-                <a16:creationId xmlns:a16="http://schemas.microsoft.com/office/drawing/2014/main" id="{3E47E298-DD99-424B-840E-4FAFBEED9743}"/>
+                <a16:creationId xmlns:a16="http://schemas.microsoft.com/office/drawing/2014/main" xmlns="" id="{3E47E298-DD99-424B-840E-4FAFBEED9743}"/>
               </a:ext>
             </a:extLst>
           </p:cNvPr>
@@ -8141,7 +8197,7 @@
         </p:nvSpPr>
         <p:spPr>
           <a:xfrm>
-            <a:off x="646111" y="452719"/>
+            <a:off x="646111" y="0"/>
             <a:ext cx="9404723" cy="790156"/>
           </a:xfrm>
         </p:spPr>
@@ -8152,38 +8208,13 @@
             <a:pPr algn="ctr"/>
             <a:r>
               <a:rPr lang="fr-FR" b="1" dirty="0"/>
-              <a:t>Conclusion</a:t>
-            </a:r>
-          </a:p>
-        </p:txBody>
-      </p:sp>
-      <p:sp>
-        <p:nvSpPr>
-          <p:cNvPr id="3" name="Espace réservé du contenu 2">
-            <a:extLst>
-              <a:ext uri="{FF2B5EF4-FFF2-40B4-BE49-F238E27FC236}">
-                <a16:creationId xmlns:a16="http://schemas.microsoft.com/office/drawing/2014/main" id="{37F25BD2-9027-45FC-9136-D69CC9700F4E}"/>
-              </a:ext>
-            </a:extLst>
-          </p:cNvPr>
-          <p:cNvSpPr>
-            <a:spLocks noGrp="1"/>
-          </p:cNvSpPr>
-          <p:nvPr>
-            <p:ph idx="1"/>
-          </p:nvPr>
-        </p:nvSpPr>
-        <p:spPr>
-          <a:xfrm>
-            <a:off x="646111" y="1242875"/>
-            <a:ext cx="9404723" cy="5237824"/>
-          </a:xfrm>
-        </p:spPr>
-        <p:txBody>
-          <a:bodyPr/>
-          <a:lstStyle/>
-          <a:p>
-            <a:endParaRPr lang="en-GB" dirty="0"/>
+              <a:t>SI Actuel </a:t>
+            </a:r>
+            <a:r>
+              <a:rPr lang="fr-FR" b="1" dirty="0" smtClean="0"/>
+              <a:t>: Infrastructure</a:t>
+            </a:r>
+            <a:endParaRPr lang="fr-FR" b="1" dirty="0"/>
           </a:p>
         </p:txBody>
       </p:sp>
@@ -8192,7 +8223,7 @@
           <p:cNvPr id="4" name="Espace réservé du numéro de diapositive 3">
             <a:extLst>
               <a:ext uri="{FF2B5EF4-FFF2-40B4-BE49-F238E27FC236}">
-                <a16:creationId xmlns:a16="http://schemas.microsoft.com/office/drawing/2014/main" id="{E32F79F5-69CB-48A3-80A7-00B85042B396}"/>
+                <a16:creationId xmlns:a16="http://schemas.microsoft.com/office/drawing/2014/main" xmlns="" id="{ED7D5C1C-5A21-484C-8DEB-9155EEC45427}"/>
               </a:ext>
             </a:extLst>
           </p:cNvPr>
@@ -8216,10 +8247,76 @@
           </a:p>
         </p:txBody>
       </p:sp>
+      <p:pic>
+        <p:nvPicPr>
+          <p:cNvPr id="7170" name="Picture 2"/>
+          <p:cNvPicPr>
+            <a:picLocks noGrp="1" noChangeAspect="1" noChangeArrowheads="1"/>
+          </p:cNvPicPr>
+          <p:nvPr>
+            <p:ph idx="1"/>
+          </p:nvPr>
+        </p:nvPicPr>
+        <p:blipFill>
+          <a:blip r:embed="rId2">
+            <a:extLst>
+              <a:ext uri="{28A0092B-C50C-407E-A947-70E740481C1C}">
+                <a14:useLocalDpi xmlns:a14="http://schemas.microsoft.com/office/drawing/2010/main" val="0"/>
+              </a:ext>
+            </a:extLst>
+          </a:blip>
+          <a:srcRect/>
+          <a:stretch>
+            <a:fillRect/>
+          </a:stretch>
+        </p:blipFill>
+        <p:spPr bwMode="auto">
+          <a:xfrm>
+            <a:off x="2399612" y="912734"/>
+            <a:ext cx="5897722" cy="5897720"/>
+          </a:xfrm>
+          <a:prstGeom prst="rect">
+            <a:avLst/>
+          </a:prstGeom>
+          <a:noFill/>
+          <a:ln>
+            <a:noFill/>
+          </a:ln>
+          <a:effectLst/>
+          <a:extLst>
+            <a:ext uri="{909E8E84-426E-40DD-AFC4-6F175D3DCCD1}">
+              <a14:hiddenFill xmlns:a14="http://schemas.microsoft.com/office/drawing/2010/main">
+                <a:solidFill>
+                  <a:schemeClr val="accent1"/>
+                </a:solidFill>
+              </a14:hiddenFill>
+            </a:ext>
+            <a:ext uri="{91240B29-F687-4F45-9708-019B960494DF}">
+              <a14:hiddenLine xmlns:a14="http://schemas.microsoft.com/office/drawing/2010/main" w="9525">
+                <a:solidFill>
+                  <a:schemeClr val="tx1"/>
+                </a:solidFill>
+                <a:miter lim="800000"/>
+                <a:headEnd/>
+                <a:tailEnd/>
+              </a14:hiddenLine>
+            </a:ext>
+            <a:ext uri="{AF507438-7753-43E0-B8FC-AC1667EBCBE1}">
+              <a14:hiddenEffects xmlns:a14="http://schemas.microsoft.com/office/drawing/2010/main">
+                <a:effectLst>
+                  <a:outerShdw dist="35921" dir="2700000" algn="ctr" rotWithShape="0">
+                    <a:schemeClr val="bg2"/>
+                  </a:outerShdw>
+                </a:effectLst>
+              </a14:hiddenEffects>
+            </a:ext>
+          </a:extLst>
+        </p:spPr>
+      </p:pic>
     </p:spTree>
     <p:extLst>
       <p:ext uri="{BB962C8B-B14F-4D97-AF65-F5344CB8AC3E}">
-        <p14:creationId xmlns:p14="http://schemas.microsoft.com/office/powerpoint/2010/main" val="1758904482"/>
+        <p14:creationId xmlns:p14="http://schemas.microsoft.com/office/powerpoint/2010/main" val="2888172669"/>
       </p:ext>
     </p:extLst>
   </p:cSld>
@@ -8248,10 +8345,10 @@
       </p:grpSpPr>
       <p:sp>
         <p:nvSpPr>
-          <p:cNvPr id="2" name="Titre 1">
+          <p:cNvPr id="4" name="Titre 3">
             <a:extLst>
               <a:ext uri="{FF2B5EF4-FFF2-40B4-BE49-F238E27FC236}">
-                <a16:creationId xmlns:a16="http://schemas.microsoft.com/office/drawing/2014/main" id="{3E47E298-DD99-424B-840E-4FAFBEED9743}"/>
+                <a16:creationId xmlns:a16="http://schemas.microsoft.com/office/drawing/2014/main" xmlns="" id="{F93902C4-F6C7-436F-B4F3-5924B28A4C32}"/>
               </a:ext>
             </a:extLst>
           </p:cNvPr>
@@ -8262,65 +8359,49 @@
             <p:ph type="title"/>
           </p:nvPr>
         </p:nvSpPr>
-        <p:spPr>
-          <a:xfrm>
-            <a:off x="646111" y="452719"/>
-            <a:ext cx="9404723" cy="790156"/>
-          </a:xfrm>
-        </p:spPr>
+        <p:spPr/>
         <p:txBody>
           <a:bodyPr/>
           <a:lstStyle/>
           <a:p>
-            <a:pPr algn="ctr"/>
             <a:r>
               <a:rPr lang="fr-FR" b="1" dirty="0"/>
-              <a:t>Questions</a:t>
-            </a:r>
-          </a:p>
-        </p:txBody>
-      </p:sp>
-      <p:pic>
-        <p:nvPicPr>
-          <p:cNvPr id="7" name="Espace réservé du contenu 6">
+              <a:t>SI de demain</a:t>
+            </a:r>
+          </a:p>
+        </p:txBody>
+      </p:sp>
+      <p:sp>
+        <p:nvSpPr>
+          <p:cNvPr id="5" name="Espace réservé du texte 4">
             <a:extLst>
               <a:ext uri="{FF2B5EF4-FFF2-40B4-BE49-F238E27FC236}">
-                <a16:creationId xmlns:a16="http://schemas.microsoft.com/office/drawing/2014/main" id="{03E8DA0E-BF57-4EE0-A458-09B3B4F2ACED}"/>
+                <a16:creationId xmlns:a16="http://schemas.microsoft.com/office/drawing/2014/main" xmlns="" id="{DEDA8C52-4803-48B8-9E38-1F7A36DEA2B6}"/>
               </a:ext>
             </a:extLst>
           </p:cNvPr>
-          <p:cNvPicPr>
-            <a:picLocks noGrp="1" noChangeAspect="1"/>
-          </p:cNvPicPr>
-          <p:nvPr>
-            <p:ph idx="1"/>
-          </p:nvPr>
-        </p:nvPicPr>
-        <p:blipFill>
-          <a:blip r:embed="rId2">
-            <a:extLst>
-              <a:ext uri="{28A0092B-C50C-407E-A947-70E740481C1C}">
-                <a14:useLocalDpi xmlns:a14="http://schemas.microsoft.com/office/drawing/2010/main" val="0"/>
-              </a:ext>
-            </a:extLst>
-          </a:blip>
-          <a:stretch>
-            <a:fillRect/>
-          </a:stretch>
-        </p:blipFill>
-        <p:spPr>
-          <a:xfrm>
-            <a:off x="2729707" y="1243013"/>
-            <a:ext cx="5237162" cy="5237162"/>
-          </a:xfrm>
-        </p:spPr>
-      </p:pic>
-      <p:sp>
-        <p:nvSpPr>
-          <p:cNvPr id="3" name="Espace réservé du numéro de diapositive 2">
+          <p:cNvSpPr>
+            <a:spLocks noGrp="1"/>
+          </p:cNvSpPr>
+          <p:nvPr>
+            <p:ph type="body" idx="1"/>
+          </p:nvPr>
+        </p:nvSpPr>
+        <p:spPr/>
+        <p:txBody>
+          <a:bodyPr/>
+          <a:lstStyle/>
+          <a:p>
+            <a:endParaRPr lang="fr-FR"/>
+          </a:p>
+        </p:txBody>
+      </p:sp>
+      <p:sp>
+        <p:nvSpPr>
+          <p:cNvPr id="2" name="Espace réservé du numéro de diapositive 1">
             <a:extLst>
               <a:ext uri="{FF2B5EF4-FFF2-40B4-BE49-F238E27FC236}">
-                <a16:creationId xmlns:a16="http://schemas.microsoft.com/office/drawing/2014/main" id="{2A8BF67F-C94A-420D-AF29-DFD155B69BAF}"/>
+                <a16:creationId xmlns:a16="http://schemas.microsoft.com/office/drawing/2014/main" xmlns="" id="{F6DD80EB-A190-4809-9CB4-45F4C0592A99}"/>
               </a:ext>
             </a:extLst>
           </p:cNvPr>
@@ -8347,7 +8428,623 @@
     </p:spTree>
     <p:extLst>
       <p:ext uri="{BB962C8B-B14F-4D97-AF65-F5344CB8AC3E}">
-        <p14:creationId xmlns:p14="http://schemas.microsoft.com/office/powerpoint/2010/main" val="2551737681"/>
+        <p14:creationId xmlns:p14="http://schemas.microsoft.com/office/powerpoint/2010/main" val="2617679320"/>
+      </p:ext>
+    </p:extLst>
+  </p:cSld>
+  <p:clrMapOvr>
+    <a:masterClrMapping/>
+  </p:clrMapOvr>
+</p:sld>
+</file>
+
+<file path=ppt/slides/slide15.xml><?xml version="1.0" encoding="utf-8"?>
+<p:sld xmlns:a="http://schemas.openxmlformats.org/drawingml/2006/main" xmlns:r="http://schemas.openxmlformats.org/officeDocument/2006/relationships" xmlns:p="http://schemas.openxmlformats.org/presentationml/2006/main">
+  <p:cSld>
+    <p:spTree>
+      <p:nvGrpSpPr>
+        <p:cNvPr id="1" name=""/>
+        <p:cNvGrpSpPr/>
+        <p:nvPr/>
+      </p:nvGrpSpPr>
+      <p:grpSpPr>
+        <a:xfrm>
+          <a:off x="0" y="0"/>
+          <a:ext cx="0" cy="0"/>
+          <a:chOff x="0" y="0"/>
+          <a:chExt cx="0" cy="0"/>
+        </a:xfrm>
+      </p:grpSpPr>
+      <p:sp>
+        <p:nvSpPr>
+          <p:cNvPr id="2" name="Titre 1">
+            <a:extLst>
+              <a:ext uri="{FF2B5EF4-FFF2-40B4-BE49-F238E27FC236}">
+                <a16:creationId xmlns:a16="http://schemas.microsoft.com/office/drawing/2014/main" xmlns="" id="{3E47E298-DD99-424B-840E-4FAFBEED9743}"/>
+              </a:ext>
+            </a:extLst>
+          </p:cNvPr>
+          <p:cNvSpPr>
+            <a:spLocks noGrp="1"/>
+          </p:cNvSpPr>
+          <p:nvPr>
+            <p:ph type="title"/>
+          </p:nvPr>
+        </p:nvSpPr>
+        <p:spPr>
+          <a:xfrm>
+            <a:off x="646111" y="0"/>
+            <a:ext cx="9404723" cy="790156"/>
+          </a:xfrm>
+        </p:spPr>
+        <p:txBody>
+          <a:bodyPr/>
+          <a:lstStyle/>
+          <a:p>
+            <a:pPr algn="ctr"/>
+            <a:r>
+              <a:rPr lang="fr-FR" b="1" dirty="0"/>
+              <a:t>Vue globale des projets</a:t>
+            </a:r>
+          </a:p>
+        </p:txBody>
+      </p:sp>
+      <p:sp>
+        <p:nvSpPr>
+          <p:cNvPr id="3" name="Espace réservé du contenu 2">
+            <a:extLst>
+              <a:ext uri="{FF2B5EF4-FFF2-40B4-BE49-F238E27FC236}">
+                <a16:creationId xmlns:a16="http://schemas.microsoft.com/office/drawing/2014/main" xmlns="" id="{37F25BD2-9027-45FC-9136-D69CC9700F4E}"/>
+              </a:ext>
+            </a:extLst>
+          </p:cNvPr>
+          <p:cNvSpPr>
+            <a:spLocks noGrp="1"/>
+          </p:cNvSpPr>
+          <p:nvPr>
+            <p:ph idx="1"/>
+          </p:nvPr>
+        </p:nvSpPr>
+        <p:spPr>
+          <a:xfrm>
+            <a:off x="646111" y="1242875"/>
+            <a:ext cx="9404723" cy="5237824"/>
+          </a:xfrm>
+        </p:spPr>
+        <p:txBody>
+          <a:bodyPr/>
+          <a:lstStyle/>
+          <a:p>
+            <a:endParaRPr lang="en-GB" dirty="0"/>
+          </a:p>
+        </p:txBody>
+      </p:sp>
+      <p:sp>
+        <p:nvSpPr>
+          <p:cNvPr id="4" name="Espace réservé du numéro de diapositive 3">
+            <a:extLst>
+              <a:ext uri="{FF2B5EF4-FFF2-40B4-BE49-F238E27FC236}">
+                <a16:creationId xmlns:a16="http://schemas.microsoft.com/office/drawing/2014/main" xmlns="" id="{D08BFD3F-7C67-4120-B1D3-FF427EF49D65}"/>
+              </a:ext>
+            </a:extLst>
+          </p:cNvPr>
+          <p:cNvSpPr>
+            <a:spLocks noGrp="1"/>
+          </p:cNvSpPr>
+          <p:nvPr>
+            <p:ph type="sldNum" sz="quarter" idx="12"/>
+          </p:nvPr>
+        </p:nvSpPr>
+        <p:spPr/>
+        <p:txBody>
+          <a:bodyPr/>
+          <a:lstStyle/>
+          <a:p>
+            <a:fld id="{127B63D7-A8CB-4105-87F4-60707FA10D94}" type="slidenum">
+              <a:rPr lang="en-GB" smtClean="0"/>
+              <a:t>15</a:t>
+            </a:fld>
+            <a:endParaRPr lang="en-GB"/>
+          </a:p>
+        </p:txBody>
+      </p:sp>
+    </p:spTree>
+    <p:extLst>
+      <p:ext uri="{BB962C8B-B14F-4D97-AF65-F5344CB8AC3E}">
+        <p14:creationId xmlns:p14="http://schemas.microsoft.com/office/powerpoint/2010/main" val="508686246"/>
+      </p:ext>
+    </p:extLst>
+  </p:cSld>
+  <p:clrMapOvr>
+    <a:masterClrMapping/>
+  </p:clrMapOvr>
+</p:sld>
+</file>
+
+<file path=ppt/slides/slide16.xml><?xml version="1.0" encoding="utf-8"?>
+<p:sld xmlns:a="http://schemas.openxmlformats.org/drawingml/2006/main" xmlns:r="http://schemas.openxmlformats.org/officeDocument/2006/relationships" xmlns:p="http://schemas.openxmlformats.org/presentationml/2006/main">
+  <p:cSld>
+    <p:spTree>
+      <p:nvGrpSpPr>
+        <p:cNvPr id="1" name=""/>
+        <p:cNvGrpSpPr/>
+        <p:nvPr/>
+      </p:nvGrpSpPr>
+      <p:grpSpPr>
+        <a:xfrm>
+          <a:off x="0" y="0"/>
+          <a:ext cx="0" cy="0"/>
+          <a:chOff x="0" y="0"/>
+          <a:chExt cx="0" cy="0"/>
+        </a:xfrm>
+      </p:grpSpPr>
+      <p:sp>
+        <p:nvSpPr>
+          <p:cNvPr id="2" name="Titre 1">
+            <a:extLst>
+              <a:ext uri="{FF2B5EF4-FFF2-40B4-BE49-F238E27FC236}">
+                <a16:creationId xmlns:a16="http://schemas.microsoft.com/office/drawing/2014/main" xmlns="" id="{3E47E298-DD99-424B-840E-4FAFBEED9743}"/>
+              </a:ext>
+            </a:extLst>
+          </p:cNvPr>
+          <p:cNvSpPr>
+            <a:spLocks noGrp="1"/>
+          </p:cNvSpPr>
+          <p:nvPr>
+            <p:ph type="title"/>
+          </p:nvPr>
+        </p:nvSpPr>
+        <p:spPr>
+          <a:xfrm>
+            <a:off x="646111" y="0"/>
+            <a:ext cx="9404723" cy="790156"/>
+          </a:xfrm>
+        </p:spPr>
+        <p:txBody>
+          <a:bodyPr/>
+          <a:lstStyle/>
+          <a:p>
+            <a:pPr algn="ctr"/>
+            <a:r>
+              <a:rPr lang="fr-FR" b="1" dirty="0" err="1"/>
+              <a:t>AéroNet</a:t>
+            </a:r>
+            <a:endParaRPr lang="fr-FR" b="1" dirty="0"/>
+          </a:p>
+        </p:txBody>
+      </p:sp>
+      <p:sp>
+        <p:nvSpPr>
+          <p:cNvPr id="3" name="Espace réservé du contenu 2">
+            <a:extLst>
+              <a:ext uri="{FF2B5EF4-FFF2-40B4-BE49-F238E27FC236}">
+                <a16:creationId xmlns:a16="http://schemas.microsoft.com/office/drawing/2014/main" xmlns="" id="{37F25BD2-9027-45FC-9136-D69CC9700F4E}"/>
+              </a:ext>
+            </a:extLst>
+          </p:cNvPr>
+          <p:cNvSpPr>
+            <a:spLocks noGrp="1"/>
+          </p:cNvSpPr>
+          <p:nvPr>
+            <p:ph idx="1"/>
+          </p:nvPr>
+        </p:nvSpPr>
+        <p:spPr>
+          <a:xfrm>
+            <a:off x="646111" y="1242875"/>
+            <a:ext cx="9404723" cy="5237824"/>
+          </a:xfrm>
+        </p:spPr>
+        <p:txBody>
+          <a:bodyPr/>
+          <a:lstStyle/>
+          <a:p>
+            <a:endParaRPr lang="en-GB" dirty="0"/>
+          </a:p>
+        </p:txBody>
+      </p:sp>
+      <p:sp>
+        <p:nvSpPr>
+          <p:cNvPr id="4" name="Espace réservé du numéro de diapositive 3">
+            <a:extLst>
+              <a:ext uri="{FF2B5EF4-FFF2-40B4-BE49-F238E27FC236}">
+                <a16:creationId xmlns:a16="http://schemas.microsoft.com/office/drawing/2014/main" xmlns="" id="{D08BFD3F-7C67-4120-B1D3-FF427EF49D65}"/>
+              </a:ext>
+            </a:extLst>
+          </p:cNvPr>
+          <p:cNvSpPr>
+            <a:spLocks noGrp="1"/>
+          </p:cNvSpPr>
+          <p:nvPr>
+            <p:ph type="sldNum" sz="quarter" idx="12"/>
+          </p:nvPr>
+        </p:nvSpPr>
+        <p:spPr/>
+        <p:txBody>
+          <a:bodyPr/>
+          <a:lstStyle/>
+          <a:p>
+            <a:fld id="{127B63D7-A8CB-4105-87F4-60707FA10D94}" type="slidenum">
+              <a:rPr lang="en-GB" smtClean="0"/>
+              <a:t>16</a:t>
+            </a:fld>
+            <a:endParaRPr lang="en-GB"/>
+          </a:p>
+        </p:txBody>
+      </p:sp>
+    </p:spTree>
+    <p:extLst>
+      <p:ext uri="{BB962C8B-B14F-4D97-AF65-F5344CB8AC3E}">
+        <p14:creationId xmlns:p14="http://schemas.microsoft.com/office/powerpoint/2010/main" val="1878354870"/>
+      </p:ext>
+    </p:extLst>
+  </p:cSld>
+  <p:clrMapOvr>
+    <a:masterClrMapping/>
+  </p:clrMapOvr>
+</p:sld>
+</file>
+
+<file path=ppt/slides/slide17.xml><?xml version="1.0" encoding="utf-8"?>
+<p:sld xmlns:a="http://schemas.openxmlformats.org/drawingml/2006/main" xmlns:r="http://schemas.openxmlformats.org/officeDocument/2006/relationships" xmlns:p="http://schemas.openxmlformats.org/presentationml/2006/main">
+  <p:cSld>
+    <p:spTree>
+      <p:nvGrpSpPr>
+        <p:cNvPr id="1" name=""/>
+        <p:cNvGrpSpPr/>
+        <p:nvPr/>
+      </p:nvGrpSpPr>
+      <p:grpSpPr>
+        <a:xfrm>
+          <a:off x="0" y="0"/>
+          <a:ext cx="0" cy="0"/>
+          <a:chOff x="0" y="0"/>
+          <a:chExt cx="0" cy="0"/>
+        </a:xfrm>
+      </p:grpSpPr>
+      <p:sp>
+        <p:nvSpPr>
+          <p:cNvPr id="2" name="Titre 1">
+            <a:extLst>
+              <a:ext uri="{FF2B5EF4-FFF2-40B4-BE49-F238E27FC236}">
+                <a16:creationId xmlns:a16="http://schemas.microsoft.com/office/drawing/2014/main" xmlns="" id="{3E47E298-DD99-424B-840E-4FAFBEED9743}"/>
+              </a:ext>
+            </a:extLst>
+          </p:cNvPr>
+          <p:cNvSpPr>
+            <a:spLocks noGrp="1"/>
+          </p:cNvSpPr>
+          <p:nvPr>
+            <p:ph type="title"/>
+          </p:nvPr>
+        </p:nvSpPr>
+        <p:spPr>
+          <a:xfrm>
+            <a:off x="646111" y="0"/>
+            <a:ext cx="9404723" cy="790156"/>
+          </a:xfrm>
+        </p:spPr>
+        <p:txBody>
+          <a:bodyPr/>
+          <a:lstStyle/>
+          <a:p>
+            <a:pPr algn="ctr"/>
+            <a:r>
+              <a:rPr lang="fr-FR" b="1" dirty="0"/>
+              <a:t>O3</a:t>
+            </a:r>
+          </a:p>
+        </p:txBody>
+      </p:sp>
+      <p:sp>
+        <p:nvSpPr>
+          <p:cNvPr id="3" name="Espace réservé du contenu 2">
+            <a:extLst>
+              <a:ext uri="{FF2B5EF4-FFF2-40B4-BE49-F238E27FC236}">
+                <a16:creationId xmlns:a16="http://schemas.microsoft.com/office/drawing/2014/main" xmlns="" id="{37F25BD2-9027-45FC-9136-D69CC9700F4E}"/>
+              </a:ext>
+            </a:extLst>
+          </p:cNvPr>
+          <p:cNvSpPr>
+            <a:spLocks noGrp="1"/>
+          </p:cNvSpPr>
+          <p:nvPr>
+            <p:ph idx="1"/>
+          </p:nvPr>
+        </p:nvSpPr>
+        <p:spPr>
+          <a:xfrm>
+            <a:off x="646111" y="1242875"/>
+            <a:ext cx="9404723" cy="5237824"/>
+          </a:xfrm>
+        </p:spPr>
+        <p:txBody>
+          <a:bodyPr/>
+          <a:lstStyle/>
+          <a:p>
+            <a:endParaRPr lang="en-GB" dirty="0"/>
+          </a:p>
+        </p:txBody>
+      </p:sp>
+      <p:sp>
+        <p:nvSpPr>
+          <p:cNvPr id="4" name="Espace réservé du numéro de diapositive 3">
+            <a:extLst>
+              <a:ext uri="{FF2B5EF4-FFF2-40B4-BE49-F238E27FC236}">
+                <a16:creationId xmlns:a16="http://schemas.microsoft.com/office/drawing/2014/main" xmlns="" id="{D08BFD3F-7C67-4120-B1D3-FF427EF49D65}"/>
+              </a:ext>
+            </a:extLst>
+          </p:cNvPr>
+          <p:cNvSpPr>
+            <a:spLocks noGrp="1"/>
+          </p:cNvSpPr>
+          <p:nvPr>
+            <p:ph type="sldNum" sz="quarter" idx="12"/>
+          </p:nvPr>
+        </p:nvSpPr>
+        <p:spPr/>
+        <p:txBody>
+          <a:bodyPr/>
+          <a:lstStyle/>
+          <a:p>
+            <a:fld id="{127B63D7-A8CB-4105-87F4-60707FA10D94}" type="slidenum">
+              <a:rPr lang="en-GB" smtClean="0"/>
+              <a:t>17</a:t>
+            </a:fld>
+            <a:endParaRPr lang="en-GB"/>
+          </a:p>
+        </p:txBody>
+      </p:sp>
+    </p:spTree>
+    <p:extLst>
+      <p:ext uri="{BB962C8B-B14F-4D97-AF65-F5344CB8AC3E}">
+        <p14:creationId xmlns:p14="http://schemas.microsoft.com/office/powerpoint/2010/main" val="1878354870"/>
+      </p:ext>
+    </p:extLst>
+  </p:cSld>
+  <p:clrMapOvr>
+    <a:masterClrMapping/>
+  </p:clrMapOvr>
+</p:sld>
+</file>
+
+<file path=ppt/slides/slide18.xml><?xml version="1.0" encoding="utf-8"?>
+<p:sld xmlns:a="http://schemas.openxmlformats.org/drawingml/2006/main" xmlns:r="http://schemas.openxmlformats.org/officeDocument/2006/relationships" xmlns:p="http://schemas.openxmlformats.org/presentationml/2006/main">
+  <p:cSld>
+    <p:spTree>
+      <p:nvGrpSpPr>
+        <p:cNvPr id="1" name=""/>
+        <p:cNvGrpSpPr/>
+        <p:nvPr/>
+      </p:nvGrpSpPr>
+      <p:grpSpPr>
+        <a:xfrm>
+          <a:off x="0" y="0"/>
+          <a:ext cx="0" cy="0"/>
+          <a:chOff x="0" y="0"/>
+          <a:chExt cx="0" cy="0"/>
+        </a:xfrm>
+      </p:grpSpPr>
+      <p:sp>
+        <p:nvSpPr>
+          <p:cNvPr id="2" name="Titre 1">
+            <a:extLst>
+              <a:ext uri="{FF2B5EF4-FFF2-40B4-BE49-F238E27FC236}">
+                <a16:creationId xmlns:a16="http://schemas.microsoft.com/office/drawing/2014/main" xmlns="" id="{3E47E298-DD99-424B-840E-4FAFBEED9743}"/>
+              </a:ext>
+            </a:extLst>
+          </p:cNvPr>
+          <p:cNvSpPr>
+            <a:spLocks noGrp="1"/>
+          </p:cNvSpPr>
+          <p:nvPr>
+            <p:ph type="title"/>
+          </p:nvPr>
+        </p:nvSpPr>
+        <p:spPr>
+          <a:xfrm>
+            <a:off x="646111" y="0"/>
+            <a:ext cx="9404723" cy="790156"/>
+          </a:xfrm>
+        </p:spPr>
+        <p:txBody>
+          <a:bodyPr/>
+          <a:lstStyle/>
+          <a:p>
+            <a:pPr algn="ctr"/>
+            <a:r>
+              <a:rPr lang="fr-FR" b="1" dirty="0"/>
+              <a:t>Projet de migration</a:t>
+            </a:r>
+          </a:p>
+        </p:txBody>
+      </p:sp>
+      <p:sp>
+        <p:nvSpPr>
+          <p:cNvPr id="3" name="Espace réservé du contenu 2">
+            <a:extLst>
+              <a:ext uri="{FF2B5EF4-FFF2-40B4-BE49-F238E27FC236}">
+                <a16:creationId xmlns:a16="http://schemas.microsoft.com/office/drawing/2014/main" xmlns="" id="{37F25BD2-9027-45FC-9136-D69CC9700F4E}"/>
+              </a:ext>
+            </a:extLst>
+          </p:cNvPr>
+          <p:cNvSpPr>
+            <a:spLocks noGrp="1"/>
+          </p:cNvSpPr>
+          <p:nvPr>
+            <p:ph idx="1"/>
+          </p:nvPr>
+        </p:nvSpPr>
+        <p:spPr>
+          <a:xfrm>
+            <a:off x="646111" y="1242875"/>
+            <a:ext cx="9404723" cy="5237824"/>
+          </a:xfrm>
+        </p:spPr>
+        <p:txBody>
+          <a:bodyPr/>
+          <a:lstStyle/>
+          <a:p>
+            <a:endParaRPr lang="en-GB" dirty="0"/>
+          </a:p>
+        </p:txBody>
+      </p:sp>
+      <p:sp>
+        <p:nvSpPr>
+          <p:cNvPr id="4" name="Espace réservé du numéro de diapositive 3">
+            <a:extLst>
+              <a:ext uri="{FF2B5EF4-FFF2-40B4-BE49-F238E27FC236}">
+                <a16:creationId xmlns:a16="http://schemas.microsoft.com/office/drawing/2014/main" xmlns="" id="{D08BFD3F-7C67-4120-B1D3-FF427EF49D65}"/>
+              </a:ext>
+            </a:extLst>
+          </p:cNvPr>
+          <p:cNvSpPr>
+            <a:spLocks noGrp="1"/>
+          </p:cNvSpPr>
+          <p:nvPr>
+            <p:ph type="sldNum" sz="quarter" idx="12"/>
+          </p:nvPr>
+        </p:nvSpPr>
+        <p:spPr/>
+        <p:txBody>
+          <a:bodyPr/>
+          <a:lstStyle/>
+          <a:p>
+            <a:fld id="{127B63D7-A8CB-4105-87F4-60707FA10D94}" type="slidenum">
+              <a:rPr lang="en-GB" smtClean="0"/>
+              <a:t>18</a:t>
+            </a:fld>
+            <a:endParaRPr lang="en-GB"/>
+          </a:p>
+        </p:txBody>
+      </p:sp>
+    </p:spTree>
+    <p:extLst>
+      <p:ext uri="{BB962C8B-B14F-4D97-AF65-F5344CB8AC3E}">
+        <p14:creationId xmlns:p14="http://schemas.microsoft.com/office/powerpoint/2010/main" val="1878354870"/>
+      </p:ext>
+    </p:extLst>
+  </p:cSld>
+  <p:clrMapOvr>
+    <a:masterClrMapping/>
+  </p:clrMapOvr>
+</p:sld>
+</file>
+
+<file path=ppt/slides/slide19.xml><?xml version="1.0" encoding="utf-8"?>
+<p:sld xmlns:a="http://schemas.openxmlformats.org/drawingml/2006/main" xmlns:r="http://schemas.openxmlformats.org/officeDocument/2006/relationships" xmlns:p="http://schemas.openxmlformats.org/presentationml/2006/main">
+  <p:cSld>
+    <p:spTree>
+      <p:nvGrpSpPr>
+        <p:cNvPr id="1" name=""/>
+        <p:cNvGrpSpPr/>
+        <p:nvPr/>
+      </p:nvGrpSpPr>
+      <p:grpSpPr>
+        <a:xfrm>
+          <a:off x="0" y="0"/>
+          <a:ext cx="0" cy="0"/>
+          <a:chOff x="0" y="0"/>
+          <a:chExt cx="0" cy="0"/>
+        </a:xfrm>
+      </p:grpSpPr>
+      <p:sp>
+        <p:nvSpPr>
+          <p:cNvPr id="2" name="Titre 1">
+            <a:extLst>
+              <a:ext uri="{FF2B5EF4-FFF2-40B4-BE49-F238E27FC236}">
+                <a16:creationId xmlns:a16="http://schemas.microsoft.com/office/drawing/2014/main" xmlns="" id="{3E47E298-DD99-424B-840E-4FAFBEED9743}"/>
+              </a:ext>
+            </a:extLst>
+          </p:cNvPr>
+          <p:cNvSpPr>
+            <a:spLocks noGrp="1"/>
+          </p:cNvSpPr>
+          <p:nvPr>
+            <p:ph type="title"/>
+          </p:nvPr>
+        </p:nvSpPr>
+        <p:spPr>
+          <a:xfrm>
+            <a:off x="646111" y="0"/>
+            <a:ext cx="9404723" cy="790156"/>
+          </a:xfrm>
+        </p:spPr>
+        <p:txBody>
+          <a:bodyPr/>
+          <a:lstStyle/>
+          <a:p>
+            <a:pPr algn="ctr"/>
+            <a:r>
+              <a:rPr lang="fr-FR" b="1" dirty="0"/>
+              <a:t>Conclusion</a:t>
+            </a:r>
+          </a:p>
+        </p:txBody>
+      </p:sp>
+      <p:sp>
+        <p:nvSpPr>
+          <p:cNvPr id="3" name="Espace réservé du contenu 2">
+            <a:extLst>
+              <a:ext uri="{FF2B5EF4-FFF2-40B4-BE49-F238E27FC236}">
+                <a16:creationId xmlns:a16="http://schemas.microsoft.com/office/drawing/2014/main" xmlns="" id="{37F25BD2-9027-45FC-9136-D69CC9700F4E}"/>
+              </a:ext>
+            </a:extLst>
+          </p:cNvPr>
+          <p:cNvSpPr>
+            <a:spLocks noGrp="1"/>
+          </p:cNvSpPr>
+          <p:nvPr>
+            <p:ph idx="1"/>
+          </p:nvPr>
+        </p:nvSpPr>
+        <p:spPr>
+          <a:xfrm>
+            <a:off x="646111" y="1242875"/>
+            <a:ext cx="9404723" cy="5237824"/>
+          </a:xfrm>
+        </p:spPr>
+        <p:txBody>
+          <a:bodyPr/>
+          <a:lstStyle/>
+          <a:p>
+            <a:endParaRPr lang="en-GB" dirty="0"/>
+          </a:p>
+        </p:txBody>
+      </p:sp>
+      <p:sp>
+        <p:nvSpPr>
+          <p:cNvPr id="4" name="Espace réservé du numéro de diapositive 3">
+            <a:extLst>
+              <a:ext uri="{FF2B5EF4-FFF2-40B4-BE49-F238E27FC236}">
+                <a16:creationId xmlns:a16="http://schemas.microsoft.com/office/drawing/2014/main" xmlns="" id="{E32F79F5-69CB-48A3-80A7-00B85042B396}"/>
+              </a:ext>
+            </a:extLst>
+          </p:cNvPr>
+          <p:cNvSpPr>
+            <a:spLocks noGrp="1"/>
+          </p:cNvSpPr>
+          <p:nvPr>
+            <p:ph type="sldNum" sz="quarter" idx="12"/>
+          </p:nvPr>
+        </p:nvSpPr>
+        <p:spPr/>
+        <p:txBody>
+          <a:bodyPr/>
+          <a:lstStyle/>
+          <a:p>
+            <a:fld id="{127B63D7-A8CB-4105-87F4-60707FA10D94}" type="slidenum">
+              <a:rPr lang="en-GB" smtClean="0"/>
+              <a:t>19</a:t>
+            </a:fld>
+            <a:endParaRPr lang="en-GB"/>
+          </a:p>
+        </p:txBody>
+      </p:sp>
+    </p:spTree>
+    <p:extLst>
+      <p:ext uri="{BB962C8B-B14F-4D97-AF65-F5344CB8AC3E}">
+        <p14:creationId xmlns:p14="http://schemas.microsoft.com/office/powerpoint/2010/main" val="1758904482"/>
       </p:ext>
     </p:extLst>
   </p:cSld>
@@ -8379,7 +9076,7 @@
           <p:cNvPr id="2" name="Titre 1">
             <a:extLst>
               <a:ext uri="{FF2B5EF4-FFF2-40B4-BE49-F238E27FC236}">
-                <a16:creationId xmlns:a16="http://schemas.microsoft.com/office/drawing/2014/main" id="{3E47E298-DD99-424B-840E-4FAFBEED9743}"/>
+                <a16:creationId xmlns:a16="http://schemas.microsoft.com/office/drawing/2014/main" xmlns="" id="{3E47E298-DD99-424B-840E-4FAFBEED9743}"/>
               </a:ext>
             </a:extLst>
           </p:cNvPr>
@@ -8402,9 +9099,10 @@
           <a:p>
             <a:pPr algn="ctr"/>
             <a:r>
-              <a:rPr lang="fr-FR" b="1" dirty="0"/>
-              <a:t>Sommaire</a:t>
-            </a:r>
+              <a:rPr lang="fr-FR" b="1" dirty="0" smtClean="0"/>
+              <a:t>Sommaire : Partie 1 &amp; 2</a:t>
+            </a:r>
+            <a:endParaRPr lang="fr-FR" b="1" dirty="0"/>
           </a:p>
         </p:txBody>
       </p:sp>
@@ -8413,7 +9111,7 @@
           <p:cNvPr id="3" name="Espace réservé du contenu 2">
             <a:extLst>
               <a:ext uri="{FF2B5EF4-FFF2-40B4-BE49-F238E27FC236}">
-                <a16:creationId xmlns:a16="http://schemas.microsoft.com/office/drawing/2014/main" id="{37F25BD2-9027-45FC-9136-D69CC9700F4E}"/>
+                <a16:creationId xmlns:a16="http://schemas.microsoft.com/office/drawing/2014/main" xmlns="" id="{37F25BD2-9027-45FC-9136-D69CC9700F4E}"/>
               </a:ext>
             </a:extLst>
           </p:cNvPr>
@@ -8465,53 +9163,52 @@
             <a:pPr lvl="1"/>
             <a:r>
               <a:rPr lang="fr-FR" dirty="0"/>
-              <a:t>Organisation fonctionnelle</a:t>
-            </a:r>
-          </a:p>
-          <a:p>
+              <a:t>Organisation </a:t>
+            </a:r>
+            <a:r>
+              <a:rPr lang="fr-FR" dirty="0" smtClean="0"/>
+              <a:t>fonctionnelle</a:t>
+            </a:r>
+          </a:p>
+          <a:p>
+            <a:pPr lvl="1"/>
             <a:r>
               <a:rPr lang="fr-FR" dirty="0"/>
-              <a:t>SI Actuel</a:t>
-            </a:r>
+              <a:t>Projection organisation cible</a:t>
+            </a:r>
+            <a:endParaRPr lang="fr-FR" dirty="0"/>
           </a:p>
           <a:p>
             <a:r>
               <a:rPr lang="fr-FR" dirty="0"/>
-              <a:t>Projets Retenus</a:t>
+              <a:t>SI </a:t>
+            </a:r>
+            <a:r>
+              <a:rPr lang="fr-FR" dirty="0" smtClean="0"/>
+              <a:t>Actuel</a:t>
             </a:r>
           </a:p>
           <a:p>
             <a:pPr lvl="1"/>
             <a:r>
-              <a:rPr lang="fr-FR" dirty="0"/>
-              <a:t>Vue globale</a:t>
+              <a:rPr lang="fr-FR" dirty="0" smtClean="0"/>
+              <a:t>POS applicatif</a:t>
             </a:r>
           </a:p>
           <a:p>
             <a:pPr lvl="1"/>
             <a:r>
-              <a:rPr lang="fr-FR" dirty="0"/>
-              <a:t>AéroNet</a:t>
+              <a:rPr lang="fr-FR" dirty="0" smtClean="0"/>
+              <a:t>Cartographie</a:t>
             </a:r>
           </a:p>
           <a:p>
             <a:pPr lvl="1"/>
             <a:r>
-              <a:rPr lang="fr-FR" dirty="0"/>
-              <a:t>Anis</a:t>
-            </a:r>
-          </a:p>
-          <a:p>
-            <a:r>
-              <a:rPr lang="fr-FR" dirty="0"/>
-              <a:t>Conclusion</a:t>
-            </a:r>
-          </a:p>
-          <a:p>
-            <a:r>
-              <a:rPr lang="fr-FR" dirty="0"/>
-              <a:t>Questions</a:t>
-            </a:r>
+              <a:rPr lang="fr-FR" dirty="0" smtClean="0"/>
+              <a:t>Infrastructure</a:t>
+            </a:r>
+            <a:endParaRPr lang="fr-FR" dirty="0"/>
           </a:p>
         </p:txBody>
       </p:sp>
@@ -8520,7 +9217,7 @@
           <p:cNvPr id="6" name="Espace réservé du numéro de diapositive 5">
             <a:extLst>
               <a:ext uri="{FF2B5EF4-FFF2-40B4-BE49-F238E27FC236}">
-                <a16:creationId xmlns:a16="http://schemas.microsoft.com/office/drawing/2014/main" id="{00A2632D-E28D-422C-9EC8-5D8134E89D85}"/>
+                <a16:creationId xmlns:a16="http://schemas.microsoft.com/office/drawing/2014/main" xmlns="" id="{00A2632D-E28D-422C-9EC8-5D8134E89D85}"/>
               </a:ext>
             </a:extLst>
           </p:cNvPr>
@@ -8548,6 +9245,141 @@
     <p:extLst>
       <p:ext uri="{BB962C8B-B14F-4D97-AF65-F5344CB8AC3E}">
         <p14:creationId xmlns:p14="http://schemas.microsoft.com/office/powerpoint/2010/main" val="3786178639"/>
+      </p:ext>
+    </p:extLst>
+  </p:cSld>
+  <p:clrMapOvr>
+    <a:masterClrMapping/>
+  </p:clrMapOvr>
+  <p:timing>
+    <p:tnLst>
+      <p:par>
+        <p:cTn id="1" dur="indefinite" restart="never" nodeType="tmRoot"/>
+      </p:par>
+    </p:tnLst>
+  </p:timing>
+</p:sld>
+</file>
+
+<file path=ppt/slides/slide20.xml><?xml version="1.0" encoding="utf-8"?>
+<p:sld xmlns:a="http://schemas.openxmlformats.org/drawingml/2006/main" xmlns:r="http://schemas.openxmlformats.org/officeDocument/2006/relationships" xmlns:p="http://schemas.openxmlformats.org/presentationml/2006/main">
+  <p:cSld>
+    <p:spTree>
+      <p:nvGrpSpPr>
+        <p:cNvPr id="1" name=""/>
+        <p:cNvGrpSpPr/>
+        <p:nvPr/>
+      </p:nvGrpSpPr>
+      <p:grpSpPr>
+        <a:xfrm>
+          <a:off x="0" y="0"/>
+          <a:ext cx="0" cy="0"/>
+          <a:chOff x="0" y="0"/>
+          <a:chExt cx="0" cy="0"/>
+        </a:xfrm>
+      </p:grpSpPr>
+      <p:sp>
+        <p:nvSpPr>
+          <p:cNvPr id="2" name="Titre 1">
+            <a:extLst>
+              <a:ext uri="{FF2B5EF4-FFF2-40B4-BE49-F238E27FC236}">
+                <a16:creationId xmlns:a16="http://schemas.microsoft.com/office/drawing/2014/main" xmlns="" id="{3E47E298-DD99-424B-840E-4FAFBEED9743}"/>
+              </a:ext>
+            </a:extLst>
+          </p:cNvPr>
+          <p:cNvSpPr>
+            <a:spLocks noGrp="1"/>
+          </p:cNvSpPr>
+          <p:nvPr>
+            <p:ph type="title"/>
+          </p:nvPr>
+        </p:nvSpPr>
+        <p:spPr>
+          <a:xfrm>
+            <a:off x="646111" y="0"/>
+            <a:ext cx="9404723" cy="790156"/>
+          </a:xfrm>
+        </p:spPr>
+        <p:txBody>
+          <a:bodyPr/>
+          <a:lstStyle/>
+          <a:p>
+            <a:pPr algn="ctr"/>
+            <a:r>
+              <a:rPr lang="fr-FR" b="1" dirty="0"/>
+              <a:t>Questions</a:t>
+            </a:r>
+          </a:p>
+        </p:txBody>
+      </p:sp>
+      <p:pic>
+        <p:nvPicPr>
+          <p:cNvPr id="7" name="Espace réservé du contenu 6">
+            <a:extLst>
+              <a:ext uri="{FF2B5EF4-FFF2-40B4-BE49-F238E27FC236}">
+                <a16:creationId xmlns:a16="http://schemas.microsoft.com/office/drawing/2014/main" xmlns="" id="{03E8DA0E-BF57-4EE0-A458-09B3B4F2ACED}"/>
+              </a:ext>
+            </a:extLst>
+          </p:cNvPr>
+          <p:cNvPicPr>
+            <a:picLocks noGrp="1" noChangeAspect="1"/>
+          </p:cNvPicPr>
+          <p:nvPr>
+            <p:ph idx="1"/>
+          </p:nvPr>
+        </p:nvPicPr>
+        <p:blipFill>
+          <a:blip r:embed="rId2" cstate="print">
+            <a:extLst>
+              <a:ext uri="{28A0092B-C50C-407E-A947-70E740481C1C}">
+                <a14:useLocalDpi xmlns:a14="http://schemas.microsoft.com/office/drawing/2010/main" val="0"/>
+              </a:ext>
+            </a:extLst>
+          </a:blip>
+          <a:stretch>
+            <a:fillRect/>
+          </a:stretch>
+        </p:blipFill>
+        <p:spPr>
+          <a:xfrm>
+            <a:off x="2729707" y="1243013"/>
+            <a:ext cx="5237162" cy="5237162"/>
+          </a:xfrm>
+        </p:spPr>
+      </p:pic>
+      <p:sp>
+        <p:nvSpPr>
+          <p:cNvPr id="3" name="Espace réservé du numéro de diapositive 2">
+            <a:extLst>
+              <a:ext uri="{FF2B5EF4-FFF2-40B4-BE49-F238E27FC236}">
+                <a16:creationId xmlns:a16="http://schemas.microsoft.com/office/drawing/2014/main" xmlns="" id="{2A8BF67F-C94A-420D-AF29-DFD155B69BAF}"/>
+              </a:ext>
+            </a:extLst>
+          </p:cNvPr>
+          <p:cNvSpPr>
+            <a:spLocks noGrp="1"/>
+          </p:cNvSpPr>
+          <p:nvPr>
+            <p:ph type="sldNum" sz="quarter" idx="12"/>
+          </p:nvPr>
+        </p:nvSpPr>
+        <p:spPr/>
+        <p:txBody>
+          <a:bodyPr/>
+          <a:lstStyle/>
+          <a:p>
+            <a:fld id="{127B63D7-A8CB-4105-87F4-60707FA10D94}" type="slidenum">
+              <a:rPr lang="en-GB" smtClean="0"/>
+              <a:t>20</a:t>
+            </a:fld>
+            <a:endParaRPr lang="en-GB"/>
+          </a:p>
+        </p:txBody>
+      </p:sp>
+    </p:spTree>
+    <p:extLst>
+      <p:ext uri="{BB962C8B-B14F-4D97-AF65-F5344CB8AC3E}">
+        <p14:creationId xmlns:p14="http://schemas.microsoft.com/office/powerpoint/2010/main" val="2551737681"/>
       </p:ext>
     </p:extLst>
   </p:cSld>
@@ -8579,7 +9411,7 @@
           <p:cNvPr id="2" name="Titre 1">
             <a:extLst>
               <a:ext uri="{FF2B5EF4-FFF2-40B4-BE49-F238E27FC236}">
-                <a16:creationId xmlns:a16="http://schemas.microsoft.com/office/drawing/2014/main" id="{3E47E298-DD99-424B-840E-4FAFBEED9743}"/>
+                <a16:creationId xmlns:a16="http://schemas.microsoft.com/office/drawing/2014/main" xmlns="" id="{3E47E298-DD99-424B-840E-4FAFBEED9743}"/>
               </a:ext>
             </a:extLst>
           </p:cNvPr>
@@ -8602,6 +9434,188 @@
           <a:p>
             <a:pPr algn="ctr"/>
             <a:r>
+              <a:rPr lang="fr-FR" b="1" dirty="0" smtClean="0"/>
+              <a:t>Sommaire : Partie 3</a:t>
+            </a:r>
+            <a:endParaRPr lang="fr-FR" b="1" dirty="0"/>
+          </a:p>
+        </p:txBody>
+      </p:sp>
+      <p:sp>
+        <p:nvSpPr>
+          <p:cNvPr id="3" name="Espace réservé du contenu 2">
+            <a:extLst>
+              <a:ext uri="{FF2B5EF4-FFF2-40B4-BE49-F238E27FC236}">
+                <a16:creationId xmlns:a16="http://schemas.microsoft.com/office/drawing/2014/main" xmlns="" id="{37F25BD2-9027-45FC-9136-D69CC9700F4E}"/>
+              </a:ext>
+            </a:extLst>
+          </p:cNvPr>
+          <p:cNvSpPr>
+            <a:spLocks noGrp="1"/>
+          </p:cNvSpPr>
+          <p:nvPr>
+            <p:ph idx="1"/>
+          </p:nvPr>
+        </p:nvSpPr>
+        <p:spPr>
+          <a:xfrm>
+            <a:off x="646111" y="1242875"/>
+            <a:ext cx="9404723" cy="5237824"/>
+          </a:xfrm>
+        </p:spPr>
+        <p:txBody>
+          <a:bodyPr>
+            <a:normAutofit/>
+          </a:bodyPr>
+          <a:lstStyle/>
+          <a:p>
+            <a:r>
+              <a:rPr lang="fr-FR" dirty="0" smtClean="0"/>
+              <a:t>SI de demain</a:t>
+            </a:r>
+            <a:endParaRPr lang="fr-FR" dirty="0"/>
+          </a:p>
+          <a:p>
+            <a:pPr lvl="1"/>
+            <a:r>
+              <a:rPr lang="fr-FR" dirty="0"/>
+              <a:t>Vue </a:t>
+            </a:r>
+            <a:r>
+              <a:rPr lang="fr-FR" dirty="0" smtClean="0"/>
+              <a:t>globale des projets</a:t>
+            </a:r>
+            <a:endParaRPr lang="fr-FR" dirty="0"/>
+          </a:p>
+          <a:p>
+            <a:pPr lvl="1"/>
+            <a:r>
+              <a:rPr lang="fr-FR" dirty="0"/>
+              <a:t>AéroNet</a:t>
+            </a:r>
+          </a:p>
+          <a:p>
+            <a:pPr lvl="1"/>
+            <a:r>
+              <a:rPr lang="fr-FR" dirty="0" smtClean="0"/>
+              <a:t>O3</a:t>
+            </a:r>
+          </a:p>
+          <a:p>
+            <a:r>
+              <a:rPr lang="fr-FR" dirty="0" smtClean="0"/>
+              <a:t>Projet de migration</a:t>
+            </a:r>
+            <a:endParaRPr lang="fr-FR" dirty="0"/>
+          </a:p>
+          <a:p>
+            <a:r>
+              <a:rPr lang="fr-FR" dirty="0"/>
+              <a:t>Conclusion</a:t>
+            </a:r>
+          </a:p>
+          <a:p>
+            <a:r>
+              <a:rPr lang="fr-FR" dirty="0"/>
+              <a:t>Questions</a:t>
+            </a:r>
+          </a:p>
+        </p:txBody>
+      </p:sp>
+      <p:sp>
+        <p:nvSpPr>
+          <p:cNvPr id="6" name="Espace réservé du numéro de diapositive 5">
+            <a:extLst>
+              <a:ext uri="{FF2B5EF4-FFF2-40B4-BE49-F238E27FC236}">
+                <a16:creationId xmlns:a16="http://schemas.microsoft.com/office/drawing/2014/main" xmlns="" id="{00A2632D-E28D-422C-9EC8-5D8134E89D85}"/>
+              </a:ext>
+            </a:extLst>
+          </p:cNvPr>
+          <p:cNvSpPr>
+            <a:spLocks noGrp="1"/>
+          </p:cNvSpPr>
+          <p:nvPr>
+            <p:ph type="sldNum" sz="quarter" idx="12"/>
+          </p:nvPr>
+        </p:nvSpPr>
+        <p:spPr/>
+        <p:txBody>
+          <a:bodyPr/>
+          <a:lstStyle/>
+          <a:p>
+            <a:fld id="{127B63D7-A8CB-4105-87F4-60707FA10D94}" type="slidenum">
+              <a:rPr lang="en-GB" smtClean="0"/>
+              <a:t>3</a:t>
+            </a:fld>
+            <a:endParaRPr lang="en-GB" dirty="0"/>
+          </a:p>
+        </p:txBody>
+      </p:sp>
+    </p:spTree>
+    <p:extLst>
+      <p:ext uri="{BB962C8B-B14F-4D97-AF65-F5344CB8AC3E}">
+        <p14:creationId xmlns:p14="http://schemas.microsoft.com/office/powerpoint/2010/main" val="1964142999"/>
+      </p:ext>
+    </p:extLst>
+  </p:cSld>
+  <p:clrMapOvr>
+    <a:masterClrMapping/>
+  </p:clrMapOvr>
+  <p:timing>
+    <p:tnLst>
+      <p:par>
+        <p:cTn id="1" dur="indefinite" restart="never" nodeType="tmRoot"/>
+      </p:par>
+    </p:tnLst>
+  </p:timing>
+</p:sld>
+</file>
+
+<file path=ppt/slides/slide4.xml><?xml version="1.0" encoding="utf-8"?>
+<p:sld xmlns:a="http://schemas.openxmlformats.org/drawingml/2006/main" xmlns:r="http://schemas.openxmlformats.org/officeDocument/2006/relationships" xmlns:p="http://schemas.openxmlformats.org/presentationml/2006/main">
+  <p:cSld>
+    <p:spTree>
+      <p:nvGrpSpPr>
+        <p:cNvPr id="1" name=""/>
+        <p:cNvGrpSpPr/>
+        <p:nvPr/>
+      </p:nvGrpSpPr>
+      <p:grpSpPr>
+        <a:xfrm>
+          <a:off x="0" y="0"/>
+          <a:ext cx="0" cy="0"/>
+          <a:chOff x="0" y="0"/>
+          <a:chExt cx="0" cy="0"/>
+        </a:xfrm>
+      </p:grpSpPr>
+      <p:sp>
+        <p:nvSpPr>
+          <p:cNvPr id="2" name="Titre 1">
+            <a:extLst>
+              <a:ext uri="{FF2B5EF4-FFF2-40B4-BE49-F238E27FC236}">
+                <a16:creationId xmlns:a16="http://schemas.microsoft.com/office/drawing/2014/main" xmlns="" id="{3E47E298-DD99-424B-840E-4FAFBEED9743}"/>
+              </a:ext>
+            </a:extLst>
+          </p:cNvPr>
+          <p:cNvSpPr>
+            <a:spLocks noGrp="1"/>
+          </p:cNvSpPr>
+          <p:nvPr>
+            <p:ph type="title"/>
+          </p:nvPr>
+        </p:nvSpPr>
+        <p:spPr>
+          <a:xfrm>
+            <a:off x="646111" y="452719"/>
+            <a:ext cx="9404723" cy="790156"/>
+          </a:xfrm>
+        </p:spPr>
+        <p:txBody>
+          <a:bodyPr/>
+          <a:lstStyle/>
+          <a:p>
+            <a:pPr algn="ctr"/>
+            <a:r>
               <a:rPr lang="fr-FR" b="1" dirty="0"/>
               <a:t>Présentation Aero-Breizh</a:t>
             </a:r>
@@ -8613,7 +9627,7 @@
           <p:cNvPr id="6" name="Espace réservé du contenu 5">
             <a:extLst>
               <a:ext uri="{FF2B5EF4-FFF2-40B4-BE49-F238E27FC236}">
-                <a16:creationId xmlns:a16="http://schemas.microsoft.com/office/drawing/2014/main" id="{4E1680A2-0040-4531-B209-0BA9D4ED4284}"/>
+                <a16:creationId xmlns:a16="http://schemas.microsoft.com/office/drawing/2014/main" xmlns="" id="{4E1680A2-0040-4531-B209-0BA9D4ED4284}"/>
               </a:ext>
             </a:extLst>
           </p:cNvPr>
@@ -8648,7 +9662,7 @@
           <p:cNvPr id="4" name="Espace réservé du numéro de diapositive 3">
             <a:extLst>
               <a:ext uri="{FF2B5EF4-FFF2-40B4-BE49-F238E27FC236}">
-                <a16:creationId xmlns:a16="http://schemas.microsoft.com/office/drawing/2014/main" id="{917F6769-927A-43AA-A939-EF5241566688}"/>
+                <a16:creationId xmlns:a16="http://schemas.microsoft.com/office/drawing/2014/main" xmlns="" id="{917F6769-927A-43AA-A939-EF5241566688}"/>
               </a:ext>
             </a:extLst>
           </p:cNvPr>
@@ -8666,7 +9680,7 @@
           <a:p>
             <a:fld id="{127B63D7-A8CB-4105-87F4-60707FA10D94}" type="slidenum">
               <a:rPr lang="en-GB" smtClean="0"/>
-              <a:t>3</a:t>
+              <a:t>4</a:t>
             </a:fld>
             <a:endParaRPr lang="en-GB"/>
           </a:p>
@@ -8677,7 +9691,7 @@
           <p:cNvPr id="7" name="ZoneTexte 6">
             <a:extLst>
               <a:ext uri="{FF2B5EF4-FFF2-40B4-BE49-F238E27FC236}">
-                <a16:creationId xmlns:a16="http://schemas.microsoft.com/office/drawing/2014/main" id="{DF50E693-45C7-48F5-B970-80C6CA5F4C6F}"/>
+                <a16:creationId xmlns:a16="http://schemas.microsoft.com/office/drawing/2014/main" xmlns="" id="{DF50E693-45C7-48F5-B970-80C6CA5F4C6F}"/>
               </a:ext>
             </a:extLst>
           </p:cNvPr>
@@ -8725,7 +9739,7 @@
           <p:cNvPr id="9" name="Objet 8">
             <a:extLst>
               <a:ext uri="{FF2B5EF4-FFF2-40B4-BE49-F238E27FC236}">
-                <a16:creationId xmlns:a16="http://schemas.microsoft.com/office/drawing/2014/main" id="{F2D8465B-37F3-4CAE-8C36-1348FAB0E502}"/>
+                <a16:creationId xmlns:a16="http://schemas.microsoft.com/office/drawing/2014/main" xmlns="" id="{F2D8465B-37F3-4CAE-8C36-1348FAB0E502}"/>
               </a:ext>
             </a:extLst>
           </p:cNvPr>
@@ -8748,7 +9762,7 @@
           <a:graphicData uri="http://schemas.openxmlformats.org/presentationml/2006/ole">
             <mc:AlternateContent xmlns:mc="http://schemas.openxmlformats.org/markup-compatibility/2006">
               <mc:Choice xmlns:v="urn:schemas-microsoft-com:vml" Requires="v">
-                <p:oleObj spid="_x0000_s1040" name="Packager Shell Object" showAsIcon="1" r:id="rId4" imgW="1128600" imgH="349200" progId="Package">
+                <p:oleObj spid="_x0000_s1065" name="Packager Shell Object" showAsIcon="1" r:id="rId4" imgW="1128600" imgH="349200" progId="Package">
                   <p:embed/>
                 </p:oleObj>
               </mc:Choice>
@@ -8799,118 +9813,6 @@
 </p:sld>
 </file>
 
-<file path=ppt/slides/slide4.xml><?xml version="1.0" encoding="utf-8"?>
-<p:sld xmlns:a="http://schemas.openxmlformats.org/drawingml/2006/main" xmlns:r="http://schemas.openxmlformats.org/officeDocument/2006/relationships" xmlns:p="http://schemas.openxmlformats.org/presentationml/2006/main">
-  <p:cSld>
-    <p:spTree>
-      <p:nvGrpSpPr>
-        <p:cNvPr id="1" name=""/>
-        <p:cNvGrpSpPr/>
-        <p:nvPr/>
-      </p:nvGrpSpPr>
-      <p:grpSpPr>
-        <a:xfrm>
-          <a:off x="0" y="0"/>
-          <a:ext cx="0" cy="0"/>
-          <a:chOff x="0" y="0"/>
-          <a:chExt cx="0" cy="0"/>
-        </a:xfrm>
-      </p:grpSpPr>
-      <p:sp>
-        <p:nvSpPr>
-          <p:cNvPr id="4" name="Titre 3">
-            <a:extLst>
-              <a:ext uri="{FF2B5EF4-FFF2-40B4-BE49-F238E27FC236}">
-                <a16:creationId xmlns:a16="http://schemas.microsoft.com/office/drawing/2014/main" id="{F93902C4-F6C7-436F-B4F3-5924B28A4C32}"/>
-              </a:ext>
-            </a:extLst>
-          </p:cNvPr>
-          <p:cNvSpPr>
-            <a:spLocks noGrp="1"/>
-          </p:cNvSpPr>
-          <p:nvPr>
-            <p:ph type="title"/>
-          </p:nvPr>
-        </p:nvSpPr>
-        <p:spPr/>
-        <p:txBody>
-          <a:bodyPr/>
-          <a:lstStyle/>
-          <a:p>
-            <a:r>
-              <a:rPr lang="fr-FR" b="1" dirty="0"/>
-              <a:t>Analyse métier et fonctionnelle</a:t>
-            </a:r>
-          </a:p>
-        </p:txBody>
-      </p:sp>
-      <p:sp>
-        <p:nvSpPr>
-          <p:cNvPr id="5" name="Espace réservé du texte 4">
-            <a:extLst>
-              <a:ext uri="{FF2B5EF4-FFF2-40B4-BE49-F238E27FC236}">
-                <a16:creationId xmlns:a16="http://schemas.microsoft.com/office/drawing/2014/main" id="{DEDA8C52-4803-48B8-9E38-1F7A36DEA2B6}"/>
-              </a:ext>
-            </a:extLst>
-          </p:cNvPr>
-          <p:cNvSpPr>
-            <a:spLocks noGrp="1"/>
-          </p:cNvSpPr>
-          <p:nvPr>
-            <p:ph type="body" idx="1"/>
-          </p:nvPr>
-        </p:nvSpPr>
-        <p:spPr/>
-        <p:txBody>
-          <a:bodyPr/>
-          <a:lstStyle/>
-          <a:p>
-            <a:endParaRPr lang="fr-FR"/>
-          </a:p>
-        </p:txBody>
-      </p:sp>
-      <p:sp>
-        <p:nvSpPr>
-          <p:cNvPr id="2" name="Espace réservé du numéro de diapositive 1">
-            <a:extLst>
-              <a:ext uri="{FF2B5EF4-FFF2-40B4-BE49-F238E27FC236}">
-                <a16:creationId xmlns:a16="http://schemas.microsoft.com/office/drawing/2014/main" id="{86B960F3-747A-4106-851F-9BDBDCEC4B4F}"/>
-              </a:ext>
-            </a:extLst>
-          </p:cNvPr>
-          <p:cNvSpPr>
-            <a:spLocks noGrp="1"/>
-          </p:cNvSpPr>
-          <p:nvPr>
-            <p:ph type="sldNum" sz="quarter" idx="12"/>
-          </p:nvPr>
-        </p:nvSpPr>
-        <p:spPr/>
-        <p:txBody>
-          <a:bodyPr/>
-          <a:lstStyle/>
-          <a:p>
-            <a:fld id="{127B63D7-A8CB-4105-87F4-60707FA10D94}" type="slidenum">
-              <a:rPr lang="en-GB" smtClean="0"/>
-              <a:t>4</a:t>
-            </a:fld>
-            <a:endParaRPr lang="en-GB"/>
-          </a:p>
-        </p:txBody>
-      </p:sp>
-    </p:spTree>
-    <p:extLst>
-      <p:ext uri="{BB962C8B-B14F-4D97-AF65-F5344CB8AC3E}">
-        <p14:creationId xmlns:p14="http://schemas.microsoft.com/office/powerpoint/2010/main" val="2709151767"/>
-      </p:ext>
-    </p:extLst>
-  </p:cSld>
-  <p:clrMapOvr>
-    <a:masterClrMapping/>
-  </p:clrMapOvr>
-</p:sld>
-</file>
-
 <file path=ppt/slides/slide5.xml><?xml version="1.0" encoding="utf-8"?>
 <p:sld xmlns:a="http://schemas.openxmlformats.org/drawingml/2006/main" xmlns:r="http://schemas.openxmlformats.org/officeDocument/2006/relationships" xmlns:p="http://schemas.openxmlformats.org/presentationml/2006/main">
   <p:cSld>
@@ -8930,10 +9832,10 @@
       </p:grpSpPr>
       <p:sp>
         <p:nvSpPr>
-          <p:cNvPr id="2" name="Titre 1">
+          <p:cNvPr id="4" name="Titre 3">
             <a:extLst>
               <a:ext uri="{FF2B5EF4-FFF2-40B4-BE49-F238E27FC236}">
-                <a16:creationId xmlns:a16="http://schemas.microsoft.com/office/drawing/2014/main" id="{3E47E298-DD99-424B-840E-4FAFBEED9743}"/>
+                <a16:creationId xmlns:a16="http://schemas.microsoft.com/office/drawing/2014/main" xmlns="" id="{F93902C4-F6C7-436F-B4F3-5924B28A4C32}"/>
               </a:ext>
             </a:extLst>
           </p:cNvPr>
@@ -8944,30 +9846,24 @@
             <p:ph type="title"/>
           </p:nvPr>
         </p:nvSpPr>
-        <p:spPr>
-          <a:xfrm>
-            <a:off x="646111" y="452719"/>
-            <a:ext cx="9404723" cy="790156"/>
-          </a:xfrm>
-        </p:spPr>
+        <p:spPr/>
         <p:txBody>
           <a:bodyPr/>
           <a:lstStyle/>
           <a:p>
-            <a:pPr algn="ctr"/>
             <a:r>
               <a:rPr lang="fr-FR" b="1" dirty="0"/>
-              <a:t>Organisation</a:t>
-            </a:r>
-          </a:p>
-        </p:txBody>
-      </p:sp>
-      <p:sp>
-        <p:nvSpPr>
-          <p:cNvPr id="3" name="Espace réservé du contenu 2">
+              <a:t>Analyse métier et fonctionnelle</a:t>
+            </a:r>
+          </a:p>
+        </p:txBody>
+      </p:sp>
+      <p:sp>
+        <p:nvSpPr>
+          <p:cNvPr id="5" name="Espace réservé du texte 4">
             <a:extLst>
               <a:ext uri="{FF2B5EF4-FFF2-40B4-BE49-F238E27FC236}">
-                <a16:creationId xmlns:a16="http://schemas.microsoft.com/office/drawing/2014/main" id="{37F25BD2-9027-45FC-9136-D69CC9700F4E}"/>
+                <a16:creationId xmlns:a16="http://schemas.microsoft.com/office/drawing/2014/main" xmlns="" id="{DEDA8C52-4803-48B8-9E38-1F7A36DEA2B6}"/>
               </a:ext>
             </a:extLst>
           </p:cNvPr>
@@ -8975,29 +9871,24 @@
             <a:spLocks noGrp="1"/>
           </p:cNvSpPr>
           <p:nvPr>
-            <p:ph idx="1"/>
-          </p:nvPr>
-        </p:nvSpPr>
-        <p:spPr>
-          <a:xfrm>
-            <a:off x="646111" y="1242875"/>
-            <a:ext cx="9404723" cy="5237824"/>
-          </a:xfrm>
-        </p:spPr>
+            <p:ph type="body" idx="1"/>
+          </p:nvPr>
+        </p:nvSpPr>
+        <p:spPr/>
         <p:txBody>
           <a:bodyPr/>
           <a:lstStyle/>
           <a:p>
-            <a:endParaRPr lang="en-GB" dirty="0"/>
-          </a:p>
-        </p:txBody>
-      </p:sp>
-      <p:sp>
-        <p:nvSpPr>
-          <p:cNvPr id="4" name="Espace réservé du numéro de diapositive 3">
+            <a:endParaRPr lang="fr-FR"/>
+          </a:p>
+        </p:txBody>
+      </p:sp>
+      <p:sp>
+        <p:nvSpPr>
+          <p:cNvPr id="2" name="Espace réservé du numéro de diapositive 1">
             <a:extLst>
               <a:ext uri="{FF2B5EF4-FFF2-40B4-BE49-F238E27FC236}">
-                <a16:creationId xmlns:a16="http://schemas.microsoft.com/office/drawing/2014/main" id="{917F6769-927A-43AA-A939-EF5241566688}"/>
+                <a16:creationId xmlns:a16="http://schemas.microsoft.com/office/drawing/2014/main" xmlns="" id="{86B960F3-747A-4106-851F-9BDBDCEC4B4F}"/>
               </a:ext>
             </a:extLst>
           </p:cNvPr>
@@ -9024,13 +9915,20 @@
     </p:spTree>
     <p:extLst>
       <p:ext uri="{BB962C8B-B14F-4D97-AF65-F5344CB8AC3E}">
-        <p14:creationId xmlns:p14="http://schemas.microsoft.com/office/powerpoint/2010/main" val="1100456823"/>
+        <p14:creationId xmlns:p14="http://schemas.microsoft.com/office/powerpoint/2010/main" val="2709151767"/>
       </p:ext>
     </p:extLst>
   </p:cSld>
   <p:clrMapOvr>
     <a:masterClrMapping/>
   </p:clrMapOvr>
+  <p:timing>
+    <p:tnLst>
+      <p:par>
+        <p:cTn id="1" dur="indefinite" restart="never" nodeType="tmRoot"/>
+      </p:par>
+    </p:tnLst>
+  </p:timing>
 </p:sld>
 </file>
 
@@ -9056,7 +9954,7 @@
           <p:cNvPr id="2" name="Titre 1">
             <a:extLst>
               <a:ext uri="{FF2B5EF4-FFF2-40B4-BE49-F238E27FC236}">
-                <a16:creationId xmlns:a16="http://schemas.microsoft.com/office/drawing/2014/main" id="{3E47E298-DD99-424B-840E-4FAFBEED9743}"/>
+                <a16:creationId xmlns:a16="http://schemas.microsoft.com/office/drawing/2014/main" xmlns="" id="{3E47E298-DD99-424B-840E-4FAFBEED9743}"/>
               </a:ext>
             </a:extLst>
           </p:cNvPr>
@@ -9069,7 +9967,7 @@
         </p:nvSpPr>
         <p:spPr>
           <a:xfrm>
-            <a:off x="646111" y="452719"/>
+            <a:off x="646111" y="0"/>
             <a:ext cx="9404723" cy="790156"/>
           </a:xfrm>
         </p:spPr>
@@ -9080,42 +9978,8 @@
             <a:pPr algn="ctr"/>
             <a:r>
               <a:rPr lang="fr-FR" b="1" dirty="0"/>
-              <a:t>Organisation géographique</a:t>
-            </a:r>
-            <a:br>
-              <a:rPr lang="fr-FR" b="1" dirty="0"/>
-            </a:br>
-            <a:endParaRPr lang="fr-FR" b="1" dirty="0"/>
-          </a:p>
-        </p:txBody>
-      </p:sp>
-      <p:sp>
-        <p:nvSpPr>
-          <p:cNvPr id="3" name="Espace réservé du contenu 2">
-            <a:extLst>
-              <a:ext uri="{FF2B5EF4-FFF2-40B4-BE49-F238E27FC236}">
-                <a16:creationId xmlns:a16="http://schemas.microsoft.com/office/drawing/2014/main" id="{37F25BD2-9027-45FC-9136-D69CC9700F4E}"/>
-              </a:ext>
-            </a:extLst>
-          </p:cNvPr>
-          <p:cNvSpPr>
-            <a:spLocks noGrp="1"/>
-          </p:cNvSpPr>
-          <p:nvPr>
-            <p:ph idx="1"/>
-          </p:nvPr>
-        </p:nvSpPr>
-        <p:spPr>
-          <a:xfrm>
-            <a:off x="646111" y="1242875"/>
-            <a:ext cx="9404723" cy="5237824"/>
-          </a:xfrm>
-        </p:spPr>
-        <p:txBody>
-          <a:bodyPr/>
-          <a:lstStyle/>
-          <a:p>
-            <a:endParaRPr lang="en-GB" dirty="0"/>
+              <a:t>Organisation</a:t>
+            </a:r>
           </a:p>
         </p:txBody>
       </p:sp>
@@ -9124,7 +9988,7 @@
           <p:cNvPr id="4" name="Espace réservé du numéro de diapositive 3">
             <a:extLst>
               <a:ext uri="{FF2B5EF4-FFF2-40B4-BE49-F238E27FC236}">
-                <a16:creationId xmlns:a16="http://schemas.microsoft.com/office/drawing/2014/main" id="{21395FBB-47FF-471B-A611-00E4D605E6E2}"/>
+                <a16:creationId xmlns:a16="http://schemas.microsoft.com/office/drawing/2014/main" xmlns="" id="{917F6769-927A-43AA-A939-EF5241566688}"/>
               </a:ext>
             </a:extLst>
           </p:cNvPr>
@@ -9148,16 +10012,89 @@
           </a:p>
         </p:txBody>
       </p:sp>
+      <p:pic>
+        <p:nvPicPr>
+          <p:cNvPr id="2050" name="Picture 2"/>
+          <p:cNvPicPr>
+            <a:picLocks noGrp="1" noChangeAspect="1" noChangeArrowheads="1"/>
+          </p:cNvPicPr>
+          <p:nvPr>
+            <p:ph idx="1"/>
+          </p:nvPr>
+        </p:nvPicPr>
+        <p:blipFill>
+          <a:blip r:embed="rId2">
+            <a:extLst>
+              <a:ext uri="{28A0092B-C50C-407E-A947-70E740481C1C}">
+                <a14:useLocalDpi xmlns:a14="http://schemas.microsoft.com/office/drawing/2010/main" val="0"/>
+              </a:ext>
+            </a:extLst>
+          </a:blip>
+          <a:srcRect/>
+          <a:stretch>
+            <a:fillRect/>
+          </a:stretch>
+        </p:blipFill>
+        <p:spPr bwMode="auto">
+          <a:xfrm>
+            <a:off x="2018426" y="1359225"/>
+            <a:ext cx="6660092" cy="5004738"/>
+          </a:xfrm>
+          <a:prstGeom prst="rect">
+            <a:avLst/>
+          </a:prstGeom>
+          <a:noFill/>
+          <a:ln>
+            <a:noFill/>
+          </a:ln>
+          <a:effectLst/>
+          <a:extLst>
+            <a:ext uri="{909E8E84-426E-40DD-AFC4-6F175D3DCCD1}">
+              <a14:hiddenFill xmlns:a14="http://schemas.microsoft.com/office/drawing/2010/main">
+                <a:solidFill>
+                  <a:schemeClr val="accent1"/>
+                </a:solidFill>
+              </a14:hiddenFill>
+            </a:ext>
+            <a:ext uri="{91240B29-F687-4F45-9708-019B960494DF}">
+              <a14:hiddenLine xmlns:a14="http://schemas.microsoft.com/office/drawing/2010/main" w="9525">
+                <a:solidFill>
+                  <a:schemeClr val="tx1"/>
+                </a:solidFill>
+                <a:miter lim="800000"/>
+                <a:headEnd/>
+                <a:tailEnd/>
+              </a14:hiddenLine>
+            </a:ext>
+            <a:ext uri="{AF507438-7753-43E0-B8FC-AC1667EBCBE1}">
+              <a14:hiddenEffects xmlns:a14="http://schemas.microsoft.com/office/drawing/2010/main">
+                <a:effectLst>
+                  <a:outerShdw dist="35921" dir="2700000" algn="ctr" rotWithShape="0">
+                    <a:schemeClr val="bg2"/>
+                  </a:outerShdw>
+                </a:effectLst>
+              </a14:hiddenEffects>
+            </a:ext>
+          </a:extLst>
+        </p:spPr>
+      </p:pic>
     </p:spTree>
     <p:extLst>
       <p:ext uri="{BB962C8B-B14F-4D97-AF65-F5344CB8AC3E}">
-        <p14:creationId xmlns:p14="http://schemas.microsoft.com/office/powerpoint/2010/main" val="2840040405"/>
+        <p14:creationId xmlns:p14="http://schemas.microsoft.com/office/powerpoint/2010/main" val="1100456823"/>
       </p:ext>
     </p:extLst>
   </p:cSld>
   <p:clrMapOvr>
     <a:masterClrMapping/>
   </p:clrMapOvr>
+  <p:timing>
+    <p:tnLst>
+      <p:par>
+        <p:cTn id="1" dur="indefinite" restart="never" nodeType="tmRoot"/>
+      </p:par>
+    </p:tnLst>
+  </p:timing>
 </p:sld>
 </file>
 
@@ -9183,7 +10120,7 @@
           <p:cNvPr id="2" name="Titre 1">
             <a:extLst>
               <a:ext uri="{FF2B5EF4-FFF2-40B4-BE49-F238E27FC236}">
-                <a16:creationId xmlns:a16="http://schemas.microsoft.com/office/drawing/2014/main" id="{3E47E298-DD99-424B-840E-4FAFBEED9743}"/>
+                <a16:creationId xmlns:a16="http://schemas.microsoft.com/office/drawing/2014/main" xmlns="" id="{3E47E298-DD99-424B-840E-4FAFBEED9743}"/>
               </a:ext>
             </a:extLst>
           </p:cNvPr>
@@ -9196,7 +10133,7 @@
         </p:nvSpPr>
         <p:spPr>
           <a:xfrm>
-            <a:off x="646111" y="452719"/>
+            <a:off x="646111" y="0"/>
             <a:ext cx="9404723" cy="790156"/>
           </a:xfrm>
         </p:spPr>
@@ -9207,7 +10144,7 @@
             <a:pPr algn="ctr"/>
             <a:r>
               <a:rPr lang="fr-FR" b="1" dirty="0"/>
-              <a:t>Organisation fonctionnelle</a:t>
+              <a:t>Organisation géographique</a:t>
             </a:r>
             <a:br>
               <a:rPr lang="fr-FR" b="1" dirty="0"/>
@@ -9218,40 +10155,10 @@
       </p:sp>
       <p:sp>
         <p:nvSpPr>
-          <p:cNvPr id="3" name="Espace réservé du contenu 2">
-            <a:extLst>
-              <a:ext uri="{FF2B5EF4-FFF2-40B4-BE49-F238E27FC236}">
-                <a16:creationId xmlns:a16="http://schemas.microsoft.com/office/drawing/2014/main" id="{37F25BD2-9027-45FC-9136-D69CC9700F4E}"/>
-              </a:ext>
-            </a:extLst>
-          </p:cNvPr>
-          <p:cNvSpPr>
-            <a:spLocks noGrp="1"/>
-          </p:cNvSpPr>
-          <p:nvPr>
-            <p:ph idx="1"/>
-          </p:nvPr>
-        </p:nvSpPr>
-        <p:spPr>
-          <a:xfrm>
-            <a:off x="646111" y="1242875"/>
-            <a:ext cx="9404723" cy="5237824"/>
-          </a:xfrm>
-        </p:spPr>
-        <p:txBody>
-          <a:bodyPr/>
-          <a:lstStyle/>
-          <a:p>
-            <a:endParaRPr lang="en-GB" dirty="0"/>
-          </a:p>
-        </p:txBody>
-      </p:sp>
-      <p:sp>
-        <p:nvSpPr>
           <p:cNvPr id="4" name="Espace réservé du numéro de diapositive 3">
             <a:extLst>
               <a:ext uri="{FF2B5EF4-FFF2-40B4-BE49-F238E27FC236}">
-                <a16:creationId xmlns:a16="http://schemas.microsoft.com/office/drawing/2014/main" id="{D99255AB-0EA8-4D12-8914-DA5EEBF54499}"/>
+                <a16:creationId xmlns:a16="http://schemas.microsoft.com/office/drawing/2014/main" xmlns="" id="{21395FBB-47FF-471B-A611-00E4D605E6E2}"/>
               </a:ext>
             </a:extLst>
           </p:cNvPr>
@@ -9275,16 +10182,89 @@
           </a:p>
         </p:txBody>
       </p:sp>
+      <p:pic>
+        <p:nvPicPr>
+          <p:cNvPr id="3074" name="Picture 2"/>
+          <p:cNvPicPr>
+            <a:picLocks noGrp="1" noChangeAspect="1" noChangeArrowheads="1"/>
+          </p:cNvPicPr>
+          <p:nvPr>
+            <p:ph idx="1"/>
+          </p:nvPr>
+        </p:nvPicPr>
+        <p:blipFill>
+          <a:blip r:embed="rId2">
+            <a:extLst>
+              <a:ext uri="{28A0092B-C50C-407E-A947-70E740481C1C}">
+                <a14:useLocalDpi xmlns:a14="http://schemas.microsoft.com/office/drawing/2010/main" val="0"/>
+              </a:ext>
+            </a:extLst>
+          </a:blip>
+          <a:srcRect/>
+          <a:stretch>
+            <a:fillRect/>
+          </a:stretch>
+        </p:blipFill>
+        <p:spPr bwMode="auto">
+          <a:xfrm>
+            <a:off x="1493309" y="1511708"/>
+            <a:ext cx="7709958" cy="4699772"/>
+          </a:xfrm>
+          <a:prstGeom prst="rect">
+            <a:avLst/>
+          </a:prstGeom>
+          <a:noFill/>
+          <a:ln>
+            <a:noFill/>
+          </a:ln>
+          <a:effectLst/>
+          <a:extLst>
+            <a:ext uri="{909E8E84-426E-40DD-AFC4-6F175D3DCCD1}">
+              <a14:hiddenFill xmlns:a14="http://schemas.microsoft.com/office/drawing/2010/main">
+                <a:solidFill>
+                  <a:schemeClr val="accent1"/>
+                </a:solidFill>
+              </a14:hiddenFill>
+            </a:ext>
+            <a:ext uri="{91240B29-F687-4F45-9708-019B960494DF}">
+              <a14:hiddenLine xmlns:a14="http://schemas.microsoft.com/office/drawing/2010/main" w="9525">
+                <a:solidFill>
+                  <a:schemeClr val="tx1"/>
+                </a:solidFill>
+                <a:miter lim="800000"/>
+                <a:headEnd/>
+                <a:tailEnd/>
+              </a14:hiddenLine>
+            </a:ext>
+            <a:ext uri="{AF507438-7753-43E0-B8FC-AC1667EBCBE1}">
+              <a14:hiddenEffects xmlns:a14="http://schemas.microsoft.com/office/drawing/2010/main">
+                <a:effectLst>
+                  <a:outerShdw dist="35921" dir="2700000" algn="ctr" rotWithShape="0">
+                    <a:schemeClr val="bg2"/>
+                  </a:outerShdw>
+                </a:effectLst>
+              </a14:hiddenEffects>
+            </a:ext>
+          </a:extLst>
+        </p:spPr>
+      </p:pic>
     </p:spTree>
     <p:extLst>
       <p:ext uri="{BB962C8B-B14F-4D97-AF65-F5344CB8AC3E}">
-        <p14:creationId xmlns:p14="http://schemas.microsoft.com/office/powerpoint/2010/main" val="2985061759"/>
+        <p14:creationId xmlns:p14="http://schemas.microsoft.com/office/powerpoint/2010/main" val="2840040405"/>
       </p:ext>
     </p:extLst>
   </p:cSld>
   <p:clrMapOvr>
     <a:masterClrMapping/>
   </p:clrMapOvr>
+  <p:timing>
+    <p:tnLst>
+      <p:par>
+        <p:cTn id="1" dur="indefinite" restart="never" nodeType="tmRoot"/>
+      </p:par>
+    </p:tnLst>
+  </p:timing>
 </p:sld>
 </file>
 
@@ -9307,10 +10287,10 @@
       </p:grpSpPr>
       <p:sp>
         <p:nvSpPr>
-          <p:cNvPr id="4" name="Titre 3">
+          <p:cNvPr id="2" name="Titre 1">
             <a:extLst>
               <a:ext uri="{FF2B5EF4-FFF2-40B4-BE49-F238E27FC236}">
-                <a16:creationId xmlns:a16="http://schemas.microsoft.com/office/drawing/2014/main" id="{F93902C4-F6C7-436F-B4F3-5924B28A4C32}"/>
+                <a16:creationId xmlns:a16="http://schemas.microsoft.com/office/drawing/2014/main" xmlns="" id="{3E47E298-DD99-424B-840E-4FAFBEED9743}"/>
               </a:ext>
             </a:extLst>
           </p:cNvPr>
@@ -9321,49 +10301,34 @@
             <p:ph type="title"/>
           </p:nvPr>
         </p:nvSpPr>
-        <p:spPr/>
+        <p:spPr>
+          <a:xfrm>
+            <a:off x="646111" y="0"/>
+            <a:ext cx="9404723" cy="790156"/>
+          </a:xfrm>
+        </p:spPr>
         <p:txBody>
           <a:bodyPr/>
           <a:lstStyle/>
           <a:p>
+            <a:pPr algn="ctr"/>
             <a:r>
               <a:rPr lang="fr-FR" b="1" dirty="0"/>
-              <a:t>Projets retenus</a:t>
-            </a:r>
-          </a:p>
-        </p:txBody>
-      </p:sp>
-      <p:sp>
-        <p:nvSpPr>
-          <p:cNvPr id="5" name="Espace réservé du texte 4">
+              <a:t>Organisation fonctionnelle</a:t>
+            </a:r>
+            <a:br>
+              <a:rPr lang="fr-FR" b="1" dirty="0"/>
+            </a:br>
+            <a:endParaRPr lang="fr-FR" b="1" dirty="0"/>
+          </a:p>
+        </p:txBody>
+      </p:sp>
+      <p:sp>
+        <p:nvSpPr>
+          <p:cNvPr id="4" name="Espace réservé du numéro de diapositive 3">
             <a:extLst>
               <a:ext uri="{FF2B5EF4-FFF2-40B4-BE49-F238E27FC236}">
-                <a16:creationId xmlns:a16="http://schemas.microsoft.com/office/drawing/2014/main" id="{DEDA8C52-4803-48B8-9E38-1F7A36DEA2B6}"/>
-              </a:ext>
-            </a:extLst>
-          </p:cNvPr>
-          <p:cNvSpPr>
-            <a:spLocks noGrp="1"/>
-          </p:cNvSpPr>
-          <p:nvPr>
-            <p:ph type="body" idx="1"/>
-          </p:nvPr>
-        </p:nvSpPr>
-        <p:spPr/>
-        <p:txBody>
-          <a:bodyPr/>
-          <a:lstStyle/>
-          <a:p>
-            <a:endParaRPr lang="fr-FR"/>
-          </a:p>
-        </p:txBody>
-      </p:sp>
-      <p:sp>
-        <p:nvSpPr>
-          <p:cNvPr id="2" name="Espace réservé du numéro de diapositive 1">
-            <a:extLst>
-              <a:ext uri="{FF2B5EF4-FFF2-40B4-BE49-F238E27FC236}">
-                <a16:creationId xmlns:a16="http://schemas.microsoft.com/office/drawing/2014/main" id="{F6DD80EB-A190-4809-9CB4-45F4C0592A99}"/>
+                <a16:creationId xmlns:a16="http://schemas.microsoft.com/office/drawing/2014/main" xmlns="" id="{D99255AB-0EA8-4D12-8914-DA5EEBF54499}"/>
               </a:ext>
             </a:extLst>
           </p:cNvPr>
@@ -9387,16 +10352,89 @@
           </a:p>
         </p:txBody>
       </p:sp>
+      <p:pic>
+        <p:nvPicPr>
+          <p:cNvPr id="4098" name="Picture 2"/>
+          <p:cNvPicPr>
+            <a:picLocks noGrp="1" noChangeAspect="1" noChangeArrowheads="1"/>
+          </p:cNvPicPr>
+          <p:nvPr>
+            <p:ph idx="1"/>
+          </p:nvPr>
+        </p:nvPicPr>
+        <p:blipFill>
+          <a:blip r:embed="rId2">
+            <a:extLst>
+              <a:ext uri="{28A0092B-C50C-407E-A947-70E740481C1C}">
+                <a14:useLocalDpi xmlns:a14="http://schemas.microsoft.com/office/drawing/2010/main" val="0"/>
+              </a:ext>
+            </a:extLst>
+          </a:blip>
+          <a:srcRect/>
+          <a:stretch>
+            <a:fillRect/>
+          </a:stretch>
+        </p:blipFill>
+        <p:spPr bwMode="auto">
+          <a:xfrm>
+            <a:off x="1434042" y="1326419"/>
+            <a:ext cx="7828492" cy="5070350"/>
+          </a:xfrm>
+          <a:prstGeom prst="rect">
+            <a:avLst/>
+          </a:prstGeom>
+          <a:noFill/>
+          <a:ln>
+            <a:noFill/>
+          </a:ln>
+          <a:effectLst/>
+          <a:extLst>
+            <a:ext uri="{909E8E84-426E-40DD-AFC4-6F175D3DCCD1}">
+              <a14:hiddenFill xmlns:a14="http://schemas.microsoft.com/office/drawing/2010/main">
+                <a:solidFill>
+                  <a:schemeClr val="accent1"/>
+                </a:solidFill>
+              </a14:hiddenFill>
+            </a:ext>
+            <a:ext uri="{91240B29-F687-4F45-9708-019B960494DF}">
+              <a14:hiddenLine xmlns:a14="http://schemas.microsoft.com/office/drawing/2010/main" w="9525">
+                <a:solidFill>
+                  <a:schemeClr val="tx1"/>
+                </a:solidFill>
+                <a:miter lim="800000"/>
+                <a:headEnd/>
+                <a:tailEnd/>
+              </a14:hiddenLine>
+            </a:ext>
+            <a:ext uri="{AF507438-7753-43E0-B8FC-AC1667EBCBE1}">
+              <a14:hiddenEffects xmlns:a14="http://schemas.microsoft.com/office/drawing/2010/main">
+                <a:effectLst>
+                  <a:outerShdw dist="35921" dir="2700000" algn="ctr" rotWithShape="0">
+                    <a:schemeClr val="bg2"/>
+                  </a:outerShdw>
+                </a:effectLst>
+              </a14:hiddenEffects>
+            </a:ext>
+          </a:extLst>
+        </p:spPr>
+      </p:pic>
     </p:spTree>
     <p:extLst>
       <p:ext uri="{BB962C8B-B14F-4D97-AF65-F5344CB8AC3E}">
-        <p14:creationId xmlns:p14="http://schemas.microsoft.com/office/powerpoint/2010/main" val="4038036019"/>
+        <p14:creationId xmlns:p14="http://schemas.microsoft.com/office/powerpoint/2010/main" val="2985061759"/>
       </p:ext>
     </p:extLst>
   </p:cSld>
   <p:clrMapOvr>
     <a:masterClrMapping/>
   </p:clrMapOvr>
+  <p:timing>
+    <p:tnLst>
+      <p:par>
+        <p:cTn id="1" dur="indefinite" restart="never" nodeType="tmRoot"/>
+      </p:par>
+    </p:tnLst>
+  </p:timing>
 </p:sld>
 </file>
 
@@ -9422,7 +10460,7 @@
           <p:cNvPr id="2" name="Titre 1">
             <a:extLst>
               <a:ext uri="{FF2B5EF4-FFF2-40B4-BE49-F238E27FC236}">
-                <a16:creationId xmlns:a16="http://schemas.microsoft.com/office/drawing/2014/main" id="{3E47E298-DD99-424B-840E-4FAFBEED9743}"/>
+                <a16:creationId xmlns:a16="http://schemas.microsoft.com/office/drawing/2014/main" xmlns="" id="{3E47E298-DD99-424B-840E-4FAFBEED9743}"/>
               </a:ext>
             </a:extLst>
           </p:cNvPr>
@@ -9435,7 +10473,7 @@
         </p:nvSpPr>
         <p:spPr>
           <a:xfrm>
-            <a:off x="646111" y="452719"/>
+            <a:off x="629178" y="0"/>
             <a:ext cx="9404723" cy="790156"/>
           </a:xfrm>
         </p:spPr>
@@ -9446,38 +10484,19 @@
             <a:pPr algn="ctr"/>
             <a:r>
               <a:rPr lang="fr-FR" b="1" dirty="0"/>
-              <a:t>Anis</a:t>
-            </a:r>
-          </a:p>
-        </p:txBody>
-      </p:sp>
-      <p:sp>
-        <p:nvSpPr>
-          <p:cNvPr id="3" name="Espace réservé du contenu 2">
-            <a:extLst>
-              <a:ext uri="{FF2B5EF4-FFF2-40B4-BE49-F238E27FC236}">
-                <a16:creationId xmlns:a16="http://schemas.microsoft.com/office/drawing/2014/main" id="{37F25BD2-9027-45FC-9136-D69CC9700F4E}"/>
-              </a:ext>
-            </a:extLst>
-          </p:cNvPr>
-          <p:cNvSpPr>
-            <a:spLocks noGrp="1"/>
-          </p:cNvSpPr>
-          <p:nvPr>
-            <p:ph idx="1"/>
-          </p:nvPr>
-        </p:nvSpPr>
-        <p:spPr>
-          <a:xfrm>
-            <a:off x="646111" y="1242875"/>
-            <a:ext cx="9404723" cy="5237824"/>
-          </a:xfrm>
-        </p:spPr>
-        <p:txBody>
-          <a:bodyPr/>
-          <a:lstStyle/>
-          <a:p>
-            <a:endParaRPr lang="en-GB" dirty="0"/>
+              <a:t>Projection organisation cible</a:t>
+            </a:r>
+            <a:br>
+              <a:rPr lang="fr-FR" b="1" dirty="0"/>
+            </a:br>
+            <a:r>
+              <a:rPr lang="fr-FR" b="1" dirty="0"/>
+              <a:t/>
+            </a:r>
+            <a:br>
+              <a:rPr lang="fr-FR" b="1" dirty="0"/>
+            </a:br>
+            <a:endParaRPr lang="fr-FR" b="1" dirty="0"/>
           </a:p>
         </p:txBody>
       </p:sp>
@@ -9486,7 +10505,7 @@
           <p:cNvPr id="4" name="Espace réservé du numéro de diapositive 3">
             <a:extLst>
               <a:ext uri="{FF2B5EF4-FFF2-40B4-BE49-F238E27FC236}">
-                <a16:creationId xmlns:a16="http://schemas.microsoft.com/office/drawing/2014/main" id="{189BB3FE-3B4D-4510-9CC2-33C0DE23EC5A}"/>
+                <a16:creationId xmlns:a16="http://schemas.microsoft.com/office/drawing/2014/main" xmlns="" id="{D99255AB-0EA8-4D12-8914-DA5EEBF54499}"/>
               </a:ext>
             </a:extLst>
           </p:cNvPr>
@@ -9510,16 +10529,89 @@
           </a:p>
         </p:txBody>
       </p:sp>
+      <p:pic>
+        <p:nvPicPr>
+          <p:cNvPr id="5124" name="Picture 4"/>
+          <p:cNvPicPr>
+            <a:picLocks noGrp="1" noChangeAspect="1" noChangeArrowheads="1"/>
+          </p:cNvPicPr>
+          <p:nvPr>
+            <p:ph idx="1"/>
+          </p:nvPr>
+        </p:nvPicPr>
+        <p:blipFill>
+          <a:blip r:embed="rId2">
+            <a:extLst>
+              <a:ext uri="{28A0092B-C50C-407E-A947-70E740481C1C}">
+                <a14:useLocalDpi xmlns:a14="http://schemas.microsoft.com/office/drawing/2010/main" val="0"/>
+              </a:ext>
+            </a:extLst>
+          </a:blip>
+          <a:srcRect/>
+          <a:stretch>
+            <a:fillRect/>
+          </a:stretch>
+        </p:blipFill>
+        <p:spPr bwMode="auto">
+          <a:xfrm>
+            <a:off x="2244352" y="842960"/>
+            <a:ext cx="6208240" cy="6015040"/>
+          </a:xfrm>
+          <a:prstGeom prst="rect">
+            <a:avLst/>
+          </a:prstGeom>
+          <a:noFill/>
+          <a:ln>
+            <a:noFill/>
+          </a:ln>
+          <a:effectLst/>
+          <a:extLst>
+            <a:ext uri="{909E8E84-426E-40DD-AFC4-6F175D3DCCD1}">
+              <a14:hiddenFill xmlns:a14="http://schemas.microsoft.com/office/drawing/2010/main">
+                <a:solidFill>
+                  <a:schemeClr val="accent1"/>
+                </a:solidFill>
+              </a14:hiddenFill>
+            </a:ext>
+            <a:ext uri="{91240B29-F687-4F45-9708-019B960494DF}">
+              <a14:hiddenLine xmlns:a14="http://schemas.microsoft.com/office/drawing/2010/main" w="9525">
+                <a:solidFill>
+                  <a:schemeClr val="tx1"/>
+                </a:solidFill>
+                <a:miter lim="800000"/>
+                <a:headEnd/>
+                <a:tailEnd/>
+              </a14:hiddenLine>
+            </a:ext>
+            <a:ext uri="{AF507438-7753-43E0-B8FC-AC1667EBCBE1}">
+              <a14:hiddenEffects xmlns:a14="http://schemas.microsoft.com/office/drawing/2010/main">
+                <a:effectLst>
+                  <a:outerShdw dist="35921" dir="2700000" algn="ctr" rotWithShape="0">
+                    <a:schemeClr val="bg2"/>
+                  </a:outerShdw>
+                </a:effectLst>
+              </a14:hiddenEffects>
+            </a:ext>
+          </a:extLst>
+        </p:spPr>
+      </p:pic>
     </p:spTree>
     <p:extLst>
       <p:ext uri="{BB962C8B-B14F-4D97-AF65-F5344CB8AC3E}">
-        <p14:creationId xmlns:p14="http://schemas.microsoft.com/office/powerpoint/2010/main" val="691430565"/>
+        <p14:creationId xmlns:p14="http://schemas.microsoft.com/office/powerpoint/2010/main" val="1849151514"/>
       </p:ext>
     </p:extLst>
   </p:cSld>
   <p:clrMapOvr>
     <a:masterClrMapping/>
   </p:clrMapOvr>
+  <p:timing>
+    <p:tnLst>
+      <p:par>
+        <p:cTn id="1" dur="indefinite" restart="never" nodeType="tmRoot"/>
+      </p:par>
+    </p:tnLst>
+  </p:timing>
 </p:sld>
 </file>
 
@@ -9783,7 +10875,7 @@
   <a:extraClrSchemeLst/>
   <a:extLst>
     <a:ext uri="{05A4C25C-085E-4340-85A3-A5531E510DB2}">
-      <thm15:themeFamily xmlns:thm15="http://schemas.microsoft.com/office/thememl/2012/main" name="Ion" id="{B8441ADB-2E43-4AF7-B97A-BD870242C6A8}" vid="{292E63A9-BB86-4E3D-B92A-7223C6510D2E}"/>
+      <thm15:themeFamily xmlns:thm15="http://schemas.microsoft.com/office/thememl/2012/main" xmlns="" name="Ion" id="{B8441ADB-2E43-4AF7-B97A-BD870242C6A8}" vid="{292E63A9-BB86-4E3D-B92A-7223C6510D2E}"/>
     </a:ext>
   </a:extLst>
 </a:theme>
@@ -10078,7 +11170,7 @@
   <a:extraClrSchemeLst/>
   <a:extLst>
     <a:ext uri="{05A4C25C-085E-4340-85A3-A5531E510DB2}">
-      <thm15:themeFamily xmlns:thm15="http://schemas.microsoft.com/office/thememl/2012/main" name="Office Theme" id="{62F939B6-93AF-4DB8-9C6B-D6C7DFDC589F}" vid="{4A3C46E8-61CC-4603-A589-7422A47A8E4A}"/>
+      <thm15:themeFamily xmlns:thm15="http://schemas.microsoft.com/office/thememl/2012/main" xmlns="" name="Office Theme" id="{62F939B6-93AF-4DB8-9C6B-D6C7DFDC589F}" vid="{4A3C46E8-61CC-4603-A589-7422A47A8E4A}"/>
     </a:ext>
   </a:extLst>
 </a:theme>
@@ -10373,7 +11465,7 @@
   <a:extraClrSchemeLst/>
   <a:extLst>
     <a:ext uri="{05A4C25C-085E-4340-85A3-A5531E510DB2}">
-      <thm15:themeFamily xmlns:thm15="http://schemas.microsoft.com/office/thememl/2012/main" name="Office Theme" id="{62F939B6-93AF-4DB8-9C6B-D6C7DFDC589F}" vid="{4A3C46E8-61CC-4603-A589-7422A47A8E4A}"/>
+      <thm15:themeFamily xmlns:thm15="http://schemas.microsoft.com/office/thememl/2012/main" xmlns="" name="Office Theme" id="{62F939B6-93AF-4DB8-9C6B-D6C7DFDC589F}" vid="{4A3C46E8-61CC-4603-A589-7422A47A8E4A}"/>
     </a:ext>
   </a:extLst>
 </a:theme>

</xml_diff>

<commit_message>
Version finale du travail pour relecture
</commit_message>
<xml_diff>
--- a/Project/MPI_NPE_Presentation NFE210.pptx
+++ b/Project/MPI_NPE_Presentation NFE210.pptx
@@ -134,7 +134,18 @@
   </p:defaultTextStyle>
   <p:extLst>
     <p:ext uri="{EFAFB233-063F-42B5-8137-9DF3F51BA10A}">
-      <p15:sldGuideLst xmlns="" xmlns:p15="http://schemas.microsoft.com/office/powerpoint/2012/main"/>
+      <p15:sldGuideLst xmlns:p15="http://schemas.microsoft.com/office/powerpoint/2012/main">
+        <p15:guide id="1" orient="horz" pos="2160">
+          <p15:clr>
+            <a:srgbClr val="A4A3A4"/>
+          </p15:clr>
+        </p15:guide>
+        <p15:guide id="2" pos="3840">
+          <p15:clr>
+            <a:srgbClr val="A4A3A4"/>
+          </p15:clr>
+        </p15:guide>
+      </p15:sldGuideLst>
     </p:ext>
   </p:extLst>
 </p:presentation>
@@ -167,7 +178,7 @@
           <p:cNvPr id="2" name="Espace réservé de l'en-tête 1">
             <a:extLst>
               <a:ext uri="{FF2B5EF4-FFF2-40B4-BE49-F238E27FC236}">
-                <a16:creationId xmlns="" xmlns:a16="http://schemas.microsoft.com/office/drawing/2014/main" id="{B256A708-5AC1-45D6-99D2-370CDDEC9DD6}"/>
+                <a16:creationId xmlns:a16="http://schemas.microsoft.com/office/drawing/2014/main" id="{B256A708-5AC1-45D6-99D2-370CDDEC9DD6}"/>
               </a:ext>
             </a:extLst>
           </p:cNvPr>
@@ -204,7 +215,7 @@
           <p:cNvPr id="3" name="Espace réservé de la date 2">
             <a:extLst>
               <a:ext uri="{FF2B5EF4-FFF2-40B4-BE49-F238E27FC236}">
-                <a16:creationId xmlns="" xmlns:a16="http://schemas.microsoft.com/office/drawing/2014/main" id="{51D25BC3-EB04-4D9A-B084-403A0CC00025}"/>
+                <a16:creationId xmlns:a16="http://schemas.microsoft.com/office/drawing/2014/main" id="{51D25BC3-EB04-4D9A-B084-403A0CC00025}"/>
               </a:ext>
             </a:extLst>
           </p:cNvPr>
@@ -234,7 +245,7 @@
           <a:p>
             <a:fld id="{D67FF10B-49A3-47F0-97A4-40CFA1E6A290}" type="datetimeFigureOut">
               <a:rPr lang="en-GB" smtClean="0"/>
-              <a:t>15/06/2018</a:t>
+              <a:t>16/06/2018</a:t>
             </a:fld>
             <a:endParaRPr lang="en-GB"/>
           </a:p>
@@ -245,7 +256,7 @@
           <p:cNvPr id="4" name="Espace réservé du pied de page 3">
             <a:extLst>
               <a:ext uri="{FF2B5EF4-FFF2-40B4-BE49-F238E27FC236}">
-                <a16:creationId xmlns="" xmlns:a16="http://schemas.microsoft.com/office/drawing/2014/main" id="{E92170BA-C24F-4AFE-85EC-188150036829}"/>
+                <a16:creationId xmlns:a16="http://schemas.microsoft.com/office/drawing/2014/main" id="{E92170BA-C24F-4AFE-85EC-188150036829}"/>
               </a:ext>
             </a:extLst>
           </p:cNvPr>
@@ -282,7 +293,7 @@
           <p:cNvPr id="5" name="Espace réservé du numéro de diapositive 4">
             <a:extLst>
               <a:ext uri="{FF2B5EF4-FFF2-40B4-BE49-F238E27FC236}">
-                <a16:creationId xmlns="" xmlns:a16="http://schemas.microsoft.com/office/drawing/2014/main" id="{92592474-78D3-41D7-8930-C77C2E1AD071}"/>
+                <a16:creationId xmlns:a16="http://schemas.microsoft.com/office/drawing/2014/main" id="{92592474-78D3-41D7-8930-C77C2E1AD071}"/>
               </a:ext>
             </a:extLst>
           </p:cNvPr>
@@ -412,7 +423,7 @@
           <a:p>
             <a:fld id="{0672BD84-068F-4711-9548-95846F635E8F}" type="datetimeFigureOut">
               <a:rPr lang="en-GB" smtClean="0"/>
-              <a:t>15/06/2018</a:t>
+              <a:t>16/06/2018</a:t>
             </a:fld>
             <a:endParaRPr lang="en-GB"/>
           </a:p>
@@ -867,7 +878,7 @@
           <a:p>
             <a:fld id="{D3F8A352-7D6F-42CE-8661-E5131235BF66}" type="datetime1">
               <a:rPr lang="en-GB" smtClean="0"/>
-              <a:t>15/06/2018</a:t>
+              <a:t>16/06/2018</a:t>
             </a:fld>
             <a:endParaRPr lang="en-GB"/>
           </a:p>
@@ -1142,7 +1153,7 @@
           <a:p>
             <a:fld id="{737DF7A2-D041-4336-AA3E-BC558500F365}" type="datetime1">
               <a:rPr lang="en-GB" smtClean="0"/>
-              <a:t>15/06/2018</a:t>
+              <a:t>16/06/2018</a:t>
             </a:fld>
             <a:endParaRPr lang="en-GB"/>
           </a:p>
@@ -1336,7 +1347,7 @@
           <a:p>
             <a:fld id="{2F0FE0E5-BE83-4864-8C9B-04EDD65BD4B6}" type="datetime1">
               <a:rPr lang="en-GB" smtClean="0"/>
-              <a:t>15/06/2018</a:t>
+              <a:t>16/06/2018</a:t>
             </a:fld>
             <a:endParaRPr lang="en-GB"/>
           </a:p>
@@ -1609,7 +1620,7 @@
           <a:p>
             <a:fld id="{79FBD189-42AE-47A2-8621-C858C528542C}" type="datetime1">
               <a:rPr lang="en-GB" smtClean="0"/>
-              <a:t>15/06/2018</a:t>
+              <a:t>16/06/2018</a:t>
             </a:fld>
             <a:endParaRPr lang="en-GB"/>
           </a:p>
@@ -1950,7 +1961,7 @@
           <a:p>
             <a:fld id="{DAA0C222-6505-498B-99E2-E23C861EC4B0}" type="datetime1">
               <a:rPr lang="en-GB" smtClean="0"/>
-              <a:t>15/06/2018</a:t>
+              <a:t>16/06/2018</a:t>
             </a:fld>
             <a:endParaRPr lang="en-GB"/>
           </a:p>
@@ -2573,7 +2584,7 @@
           <a:p>
             <a:fld id="{7C39C3F6-E6AE-4AD4-868E-81687961A7A0}" type="datetime1">
               <a:rPr lang="en-GB" smtClean="0"/>
-              <a:t>15/06/2018</a:t>
+              <a:t>16/06/2018</a:t>
             </a:fld>
             <a:endParaRPr lang="en-GB"/>
           </a:p>
@@ -3433,7 +3444,7 @@
           <a:p>
             <a:fld id="{E3F2F273-67B7-4E62-828A-6B2245ABCEF1}" type="datetime1">
               <a:rPr lang="en-GB" smtClean="0"/>
-              <a:t>15/06/2018</a:t>
+              <a:t>16/06/2018</a:t>
             </a:fld>
             <a:endParaRPr lang="en-GB"/>
           </a:p>
@@ -3603,7 +3614,7 @@
           <a:p>
             <a:fld id="{978BA116-B39F-46A2-B198-7692611A70E3}" type="datetime1">
               <a:rPr lang="en-GB" smtClean="0"/>
-              <a:t>15/06/2018</a:t>
+              <a:t>16/06/2018</a:t>
             </a:fld>
             <a:endParaRPr lang="en-GB"/>
           </a:p>
@@ -3783,7 +3794,7 @@
           <a:p>
             <a:fld id="{CB6FC1EB-9754-4FD9-834F-05FAC21D9E74}" type="datetime1">
               <a:rPr lang="en-GB" smtClean="0"/>
-              <a:t>15/06/2018</a:t>
+              <a:t>16/06/2018</a:t>
             </a:fld>
             <a:endParaRPr lang="en-GB"/>
           </a:p>
@@ -3953,7 +3964,7 @@
           <a:p>
             <a:fld id="{D47DACD9-42AD-489F-A028-44BF51632F48}" type="datetime1">
               <a:rPr lang="en-GB" smtClean="0"/>
-              <a:t>15/06/2018</a:t>
+              <a:t>16/06/2018</a:t>
             </a:fld>
             <a:endParaRPr lang="en-GB"/>
           </a:p>
@@ -4200,7 +4211,7 @@
           <a:p>
             <a:fld id="{716999AB-4BBE-421E-96D8-F77383334567}" type="datetime1">
               <a:rPr lang="en-GB" smtClean="0"/>
-              <a:t>15/06/2018</a:t>
+              <a:t>16/06/2018</a:t>
             </a:fld>
             <a:endParaRPr lang="en-GB"/>
           </a:p>
@@ -4492,7 +4503,7 @@
           <a:p>
             <a:fld id="{1E1B7FD6-8831-454A-BA17-78599D9F40E4}" type="datetime1">
               <a:rPr lang="en-GB" smtClean="0"/>
-              <a:t>15/06/2018</a:t>
+              <a:t>16/06/2018</a:t>
             </a:fld>
             <a:endParaRPr lang="en-GB"/>
           </a:p>
@@ -4936,7 +4947,7 @@
           <a:p>
             <a:fld id="{F1FF7740-8C1B-44B0-90A3-F61A245B4357}" type="datetime1">
               <a:rPr lang="en-GB" smtClean="0"/>
-              <a:t>15/06/2018</a:t>
+              <a:t>16/06/2018</a:t>
             </a:fld>
             <a:endParaRPr lang="en-GB"/>
           </a:p>
@@ -5054,7 +5065,7 @@
           <a:p>
             <a:fld id="{2210AB09-C69F-4882-BD36-28B0274D6B54}" type="datetime1">
               <a:rPr lang="en-GB" smtClean="0"/>
-              <a:t>15/06/2018</a:t>
+              <a:t>16/06/2018</a:t>
             </a:fld>
             <a:endParaRPr lang="en-GB"/>
           </a:p>
@@ -5149,7 +5160,7 @@
           <a:p>
             <a:fld id="{BCFFED70-E428-4A78-B9C5-CE51938ABDD2}" type="datetime1">
               <a:rPr lang="en-GB" smtClean="0"/>
-              <a:t>15/06/2018</a:t>
+              <a:t>16/06/2018</a:t>
             </a:fld>
             <a:endParaRPr lang="en-GB"/>
           </a:p>
@@ -5428,7 +5439,7 @@
           <a:p>
             <a:fld id="{03E8AFBE-FB91-4AAD-8303-18D4EF660008}" type="datetime1">
               <a:rPr lang="en-GB" smtClean="0"/>
-              <a:t>15/06/2018</a:t>
+              <a:t>16/06/2018</a:t>
             </a:fld>
             <a:endParaRPr lang="en-GB"/>
           </a:p>
@@ -5703,7 +5714,7 @@
           <a:p>
             <a:fld id="{ED8A7ACC-1AC7-45B5-B082-BCD311BAA20D}" type="datetime1">
               <a:rPr lang="en-GB" smtClean="0"/>
-              <a:t>15/06/2018</a:t>
+              <a:t>16/06/2018</a:t>
             </a:fld>
             <a:endParaRPr lang="en-GB"/>
           </a:p>
@@ -6132,7 +6143,7 @@
           <a:p>
             <a:fld id="{57D8A53F-BA63-449F-B271-6EFE62D8B86B}" type="datetime1">
               <a:rPr lang="en-GB" smtClean="0"/>
-              <a:t>15/06/2018</a:t>
+              <a:t>16/06/2018</a:t>
             </a:fld>
             <a:endParaRPr lang="en-GB"/>
           </a:p>
@@ -6674,7 +6685,7 @@
           <p:cNvPr id="17" name="Rectangle 8">
             <a:extLst>
               <a:ext uri="{FF2B5EF4-FFF2-40B4-BE49-F238E27FC236}">
-                <a16:creationId xmlns="" xmlns:a16="http://schemas.microsoft.com/office/drawing/2014/main" id="{F3F4807A-5068-4492-8025-D75F320E908D}"/>
+                <a16:creationId xmlns:a16="http://schemas.microsoft.com/office/drawing/2014/main" id="{F3F4807A-5068-4492-8025-D75F320E908D}"/>
               </a:ext>
             </a:extLst>
           </p:cNvPr>
@@ -6684,7 +6695,7 @@
           <p:nvPr>
             <p:extLst>
               <p:ext uri="{386F3935-93C4-4BCD-93E2-E3B085C9AB24}">
-                <p16:designElem xmlns="" xmlns:p16="http://schemas.microsoft.com/office/powerpoint/2015/main" val="1"/>
+                <p16:designElem xmlns:p16="http://schemas.microsoft.com/office/powerpoint/2015/main" val="1"/>
               </p:ext>
             </p:extLst>
           </p:nvPr>
@@ -6731,7 +6742,7 @@
           <p:cNvPr id="18" name="Freeform 36">
             <a:extLst>
               <a:ext uri="{FF2B5EF4-FFF2-40B4-BE49-F238E27FC236}">
-                <a16:creationId xmlns="" xmlns:a16="http://schemas.microsoft.com/office/drawing/2014/main" id="{B24996F8-180C-4DCB-8A26-DFA336CDEFBC}"/>
+                <a16:creationId xmlns:a16="http://schemas.microsoft.com/office/drawing/2014/main" id="{B24996F8-180C-4DCB-8A26-DFA336CDEFBC}"/>
               </a:ext>
             </a:extLst>
           </p:cNvPr>
@@ -6741,7 +6752,7 @@
           <p:nvPr>
             <p:extLst>
               <p:ext uri="{386F3935-93C4-4BCD-93E2-E3B085C9AB24}">
-                <p16:designElem xmlns="" xmlns:p16="http://schemas.microsoft.com/office/powerpoint/2015/main" val="1"/>
+                <p16:designElem xmlns:p16="http://schemas.microsoft.com/office/powerpoint/2015/main" val="1"/>
               </p:ext>
             </p:extLst>
           </p:nvPr>
@@ -7080,7 +7091,7 @@
           <p:cNvPr id="19" name="Rectangle 12">
             <a:extLst>
               <a:ext uri="{FF2B5EF4-FFF2-40B4-BE49-F238E27FC236}">
-                <a16:creationId xmlns="" xmlns:a16="http://schemas.microsoft.com/office/drawing/2014/main" id="{630182B0-3559-41D5-9EBC-0BD86BEDAD09}"/>
+                <a16:creationId xmlns:a16="http://schemas.microsoft.com/office/drawing/2014/main" id="{630182B0-3559-41D5-9EBC-0BD86BEDAD09}"/>
               </a:ext>
             </a:extLst>
           </p:cNvPr>
@@ -7090,7 +7101,7 @@
           <p:nvPr>
             <p:extLst>
               <p:ext uri="{386F3935-93C4-4BCD-93E2-E3B085C9AB24}">
-                <p16:designElem xmlns="" xmlns:p16="http://schemas.microsoft.com/office/powerpoint/2015/main" val="1"/>
+                <p16:designElem xmlns:p16="http://schemas.microsoft.com/office/powerpoint/2015/main" val="1"/>
               </p:ext>
             </p:extLst>
           </p:nvPr>
@@ -7130,7 +7141,7 @@
           <p:cNvPr id="20" name="Freeform: Shape 14">
             <a:extLst>
               <a:ext uri="{FF2B5EF4-FFF2-40B4-BE49-F238E27FC236}">
-                <a16:creationId xmlns="" xmlns:a16="http://schemas.microsoft.com/office/drawing/2014/main" id="{D8B22DE2-C518-4F77-BE90-E1B6B1909D91}"/>
+                <a16:creationId xmlns:a16="http://schemas.microsoft.com/office/drawing/2014/main" id="{D8B22DE2-C518-4F77-BE90-E1B6B1909D91}"/>
               </a:ext>
             </a:extLst>
           </p:cNvPr>
@@ -7140,7 +7151,7 @@
           <p:nvPr>
             <p:extLst>
               <p:ext uri="{386F3935-93C4-4BCD-93E2-E3B085C9AB24}">
-                <p16:designElem xmlns="" xmlns:p16="http://schemas.microsoft.com/office/powerpoint/2015/main" val="1"/>
+                <p16:designElem xmlns:p16="http://schemas.microsoft.com/office/powerpoint/2015/main" val="1"/>
               </p:ext>
             </p:extLst>
           </p:nvPr>
@@ -7590,7 +7601,7 @@
           <p:cNvPr id="4" name="Image 3" descr="https://upload.wikimedia.org/wikipedia/commons/thumb/4/42/CNAM_Logo.svg/1000px-CNAM_Logo.svg.png">
             <a:extLst>
               <a:ext uri="{FF2B5EF4-FFF2-40B4-BE49-F238E27FC236}">
-                <a16:creationId xmlns="" xmlns:a16="http://schemas.microsoft.com/office/drawing/2014/main" id="{8FC39933-9226-42C4-B02E-FEA6ABB5856C}"/>
+                <a16:creationId xmlns:a16="http://schemas.microsoft.com/office/drawing/2014/main" id="{8FC39933-9226-42C4-B02E-FEA6ABB5856C}"/>
               </a:ext>
             </a:extLst>
           </p:cNvPr>
@@ -7627,7 +7638,7 @@
           <p:cNvPr id="2" name="Titre 1">
             <a:extLst>
               <a:ext uri="{FF2B5EF4-FFF2-40B4-BE49-F238E27FC236}">
-                <a16:creationId xmlns="" xmlns:a16="http://schemas.microsoft.com/office/drawing/2014/main" id="{982FC87B-FCE2-4FFF-A2F5-9E6D6B9E1CC9}"/>
+                <a16:creationId xmlns:a16="http://schemas.microsoft.com/office/drawing/2014/main" id="{982FC87B-FCE2-4FFF-A2F5-9E6D6B9E1CC9}"/>
               </a:ext>
             </a:extLst>
           </p:cNvPr>
@@ -7681,7 +7692,7 @@
           <p:cNvPr id="3" name="Sous-titre 2">
             <a:extLst>
               <a:ext uri="{FF2B5EF4-FFF2-40B4-BE49-F238E27FC236}">
-                <a16:creationId xmlns="" xmlns:a16="http://schemas.microsoft.com/office/drawing/2014/main" id="{A7E29A82-524E-415D-B019-5C448BF061B3}"/>
+                <a16:creationId xmlns:a16="http://schemas.microsoft.com/office/drawing/2014/main" id="{A7E29A82-524E-415D-B019-5C448BF061B3}"/>
               </a:ext>
             </a:extLst>
           </p:cNvPr>
@@ -7743,13 +7754,6 @@
   <p:clrMapOvr>
     <a:overrideClrMapping bg1="lt1" tx1="dk1" bg2="lt2" tx2="dk2" accent1="accent1" accent2="accent2" accent3="accent3" accent4="accent4" accent5="accent5" accent6="accent6" hlink="hlink" folHlink="folHlink"/>
   </p:clrMapOvr>
-  <p:timing>
-    <p:tnLst>
-      <p:par>
-        <p:cTn id="1" dur="indefinite" restart="never" nodeType="tmRoot"/>
-      </p:par>
-    </p:tnLst>
-  </p:timing>
 </p:sld>
 </file>
 
@@ -7775,7 +7779,7 @@
           <p:cNvPr id="4" name="Titre 3">
             <a:extLst>
               <a:ext uri="{FF2B5EF4-FFF2-40B4-BE49-F238E27FC236}">
-                <a16:creationId xmlns="" xmlns:a16="http://schemas.microsoft.com/office/drawing/2014/main" id="{F93902C4-F6C7-436F-B4F3-5924B28A4C32}"/>
+                <a16:creationId xmlns:a16="http://schemas.microsoft.com/office/drawing/2014/main" id="{F93902C4-F6C7-436F-B4F3-5924B28A4C32}"/>
               </a:ext>
             </a:extLst>
           </p:cNvPr>
@@ -7793,13 +7797,8 @@
           <a:p>
             <a:r>
               <a:rPr lang="fr-FR" b="1" dirty="0"/>
-              <a:t>SI </a:t>
-            </a:r>
-            <a:r>
-              <a:rPr lang="fr-FR" b="1" dirty="0" smtClean="0"/>
-              <a:t>Actuel</a:t>
-            </a:r>
-            <a:endParaRPr lang="fr-FR" b="1" dirty="0"/>
+              <a:t>SI Actuel</a:t>
+            </a:r>
           </a:p>
         </p:txBody>
       </p:sp>
@@ -7808,7 +7807,7 @@
           <p:cNvPr id="5" name="Espace réservé du texte 4">
             <a:extLst>
               <a:ext uri="{FF2B5EF4-FFF2-40B4-BE49-F238E27FC236}">
-                <a16:creationId xmlns="" xmlns:a16="http://schemas.microsoft.com/office/drawing/2014/main" id="{DEDA8C52-4803-48B8-9E38-1F7A36DEA2B6}"/>
+                <a16:creationId xmlns:a16="http://schemas.microsoft.com/office/drawing/2014/main" id="{DEDA8C52-4803-48B8-9E38-1F7A36DEA2B6}"/>
               </a:ext>
             </a:extLst>
           </p:cNvPr>
@@ -7833,7 +7832,7 @@
           <p:cNvPr id="2" name="Espace réservé du numéro de diapositive 1">
             <a:extLst>
               <a:ext uri="{FF2B5EF4-FFF2-40B4-BE49-F238E27FC236}">
-                <a16:creationId xmlns="" xmlns:a16="http://schemas.microsoft.com/office/drawing/2014/main" id="{F6DD80EB-A190-4809-9CB4-45F4C0592A99}"/>
+                <a16:creationId xmlns:a16="http://schemas.microsoft.com/office/drawing/2014/main" id="{F6DD80EB-A190-4809-9CB4-45F4C0592A99}"/>
               </a:ext>
             </a:extLst>
           </p:cNvPr>
@@ -7853,7 +7852,17 @@
               <a:rPr lang="en-GB" smtClean="0"/>
               <a:t>10</a:t>
             </a:fld>
-            <a:endParaRPr lang="en-GB"/>
+            <a:r>
+              <a:rPr lang="en-GB" sz="1200" dirty="0">
+                <a:solidFill>
+                  <a:prstClr val="white">
+                    <a:tint val="75000"/>
+                  </a:prstClr>
+                </a:solidFill>
+              </a:rPr>
+              <a:t>/23</a:t>
+            </a:r>
+            <a:endParaRPr lang="en-GB" dirty="0"/>
           </a:p>
         </p:txBody>
       </p:sp>
@@ -7867,6 +7876,9 @@
   <p:clrMapOvr>
     <a:masterClrMapping/>
   </p:clrMapOvr>
+  <p:transition spd="med">
+    <p:pull/>
+  </p:transition>
 </p:sld>
 </file>
 
@@ -7892,7 +7904,7 @@
           <p:cNvPr id="2" name="Titre 1">
             <a:extLst>
               <a:ext uri="{FF2B5EF4-FFF2-40B4-BE49-F238E27FC236}">
-                <a16:creationId xmlns="" xmlns:a16="http://schemas.microsoft.com/office/drawing/2014/main" id="{3E47E298-DD99-424B-840E-4FAFBEED9743}"/>
+                <a16:creationId xmlns:a16="http://schemas.microsoft.com/office/drawing/2014/main" id="{3E47E298-DD99-424B-840E-4FAFBEED9743}"/>
               </a:ext>
             </a:extLst>
           </p:cNvPr>
@@ -7916,15 +7928,7 @@
             <a:pPr algn="ctr"/>
             <a:r>
               <a:rPr lang="fr-FR" b="1" dirty="0"/>
-              <a:t>SI Actuel </a:t>
-            </a:r>
-            <a:r>
-              <a:rPr lang="fr-FR" b="1" dirty="0" smtClean="0"/>
-              <a:t>: POS </a:t>
-            </a:r>
-            <a:r>
-              <a:rPr lang="fr-FR" b="1" dirty="0"/>
-              <a:t>applicatif</a:t>
+              <a:t>SI Actuel : POS applicatif</a:t>
             </a:r>
             <a:br>
               <a:rPr lang="fr-FR" b="1" dirty="0"/>
@@ -7938,7 +7942,7 @@
           <p:cNvPr id="4" name="Espace réservé du numéro de diapositive 3">
             <a:extLst>
               <a:ext uri="{FF2B5EF4-FFF2-40B4-BE49-F238E27FC236}">
-                <a16:creationId xmlns="" xmlns:a16="http://schemas.microsoft.com/office/drawing/2014/main" id="{189BB3FE-3B4D-4510-9CC2-33C0DE23EC5A}"/>
+                <a16:creationId xmlns:a16="http://schemas.microsoft.com/office/drawing/2014/main" id="{189BB3FE-3B4D-4510-9CC2-33C0DE23EC5A}"/>
               </a:ext>
             </a:extLst>
           </p:cNvPr>
@@ -7958,7 +7962,17 @@
               <a:rPr lang="en-GB" smtClean="0"/>
               <a:t>11</a:t>
             </a:fld>
-            <a:endParaRPr lang="en-GB"/>
+            <a:r>
+              <a:rPr lang="en-GB" sz="1200" dirty="0">
+                <a:solidFill>
+                  <a:prstClr val="white">
+                    <a:tint val="75000"/>
+                  </a:prstClr>
+                </a:solidFill>
+              </a:rPr>
+              <a:t>/23</a:t>
+            </a:r>
+            <a:endParaRPr lang="en-GB" dirty="0"/>
           </a:p>
         </p:txBody>
       </p:sp>
@@ -7998,6 +8012,9 @@
   <p:clrMapOvr>
     <a:masterClrMapping/>
   </p:clrMapOvr>
+  <p:transition spd="med">
+    <p:pull/>
+  </p:transition>
 </p:sld>
 </file>
 
@@ -8023,7 +8040,7 @@
           <p:cNvPr id="2" name="Titre 1">
             <a:extLst>
               <a:ext uri="{FF2B5EF4-FFF2-40B4-BE49-F238E27FC236}">
-                <a16:creationId xmlns="" xmlns:a16="http://schemas.microsoft.com/office/drawing/2014/main" id="{3E47E298-DD99-424B-840E-4FAFBEED9743}"/>
+                <a16:creationId xmlns:a16="http://schemas.microsoft.com/office/drawing/2014/main" id="{3E47E298-DD99-424B-840E-4FAFBEED9743}"/>
               </a:ext>
             </a:extLst>
           </p:cNvPr>
@@ -8047,13 +8064,8 @@
             <a:pPr algn="ctr"/>
             <a:r>
               <a:rPr lang="fr-FR" b="1" dirty="0"/>
-              <a:t>SI Actuel </a:t>
-            </a:r>
-            <a:r>
-              <a:rPr lang="fr-FR" b="1" dirty="0" smtClean="0"/>
-              <a:t>: Cartographie</a:t>
-            </a:r>
-            <a:endParaRPr lang="fr-FR" b="1" dirty="0"/>
+              <a:t>SI Actuel : Cartographie</a:t>
+            </a:r>
           </a:p>
         </p:txBody>
       </p:sp>
@@ -8062,7 +8074,7 @@
           <p:cNvPr id="4" name="Espace réservé du numéro de diapositive 3">
             <a:extLst>
               <a:ext uri="{FF2B5EF4-FFF2-40B4-BE49-F238E27FC236}">
-                <a16:creationId xmlns="" xmlns:a16="http://schemas.microsoft.com/office/drawing/2014/main" id="{83816142-F8D7-41CF-BB49-A6A61EF18AE9}"/>
+                <a16:creationId xmlns:a16="http://schemas.microsoft.com/office/drawing/2014/main" id="{83816142-F8D7-41CF-BB49-A6A61EF18AE9}"/>
               </a:ext>
             </a:extLst>
           </p:cNvPr>
@@ -8082,7 +8094,17 @@
               <a:rPr lang="en-GB" smtClean="0"/>
               <a:t>12</a:t>
             </a:fld>
-            <a:endParaRPr lang="en-GB"/>
+            <a:r>
+              <a:rPr lang="en-GB" sz="1200" dirty="0">
+                <a:solidFill>
+                  <a:prstClr val="white">
+                    <a:tint val="75000"/>
+                  </a:prstClr>
+                </a:solidFill>
+              </a:rPr>
+              <a:t>/23</a:t>
+            </a:r>
+            <a:endParaRPr lang="en-GB" dirty="0"/>
           </a:p>
         </p:txBody>
       </p:sp>
@@ -8162,6 +8184,9 @@
   <p:clrMapOvr>
     <a:masterClrMapping/>
   </p:clrMapOvr>
+  <p:transition spd="med">
+    <p:pull/>
+  </p:transition>
 </p:sld>
 </file>
 
@@ -8187,7 +8212,7 @@
           <p:cNvPr id="2" name="Titre 1">
             <a:extLst>
               <a:ext uri="{FF2B5EF4-FFF2-40B4-BE49-F238E27FC236}">
-                <a16:creationId xmlns="" xmlns:a16="http://schemas.microsoft.com/office/drawing/2014/main" id="{3E47E298-DD99-424B-840E-4FAFBEED9743}"/>
+                <a16:creationId xmlns:a16="http://schemas.microsoft.com/office/drawing/2014/main" id="{3E47E298-DD99-424B-840E-4FAFBEED9743}"/>
               </a:ext>
             </a:extLst>
           </p:cNvPr>
@@ -8211,13 +8236,8 @@
             <a:pPr algn="ctr"/>
             <a:r>
               <a:rPr lang="fr-FR" b="1" dirty="0"/>
-              <a:t>SI Actuel </a:t>
-            </a:r>
-            <a:r>
-              <a:rPr lang="fr-FR" b="1" dirty="0" smtClean="0"/>
-              <a:t>: Infrastructure</a:t>
-            </a:r>
-            <a:endParaRPr lang="fr-FR" b="1" dirty="0"/>
+              <a:t>SI Actuel : Infrastructure</a:t>
+            </a:r>
           </a:p>
         </p:txBody>
       </p:sp>
@@ -8226,7 +8246,7 @@
           <p:cNvPr id="4" name="Espace réservé du numéro de diapositive 3">
             <a:extLst>
               <a:ext uri="{FF2B5EF4-FFF2-40B4-BE49-F238E27FC236}">
-                <a16:creationId xmlns="" xmlns:a16="http://schemas.microsoft.com/office/drawing/2014/main" id="{ED7D5C1C-5A21-484C-8DEB-9155EEC45427}"/>
+                <a16:creationId xmlns:a16="http://schemas.microsoft.com/office/drawing/2014/main" id="{ED7D5C1C-5A21-484C-8DEB-9155EEC45427}"/>
               </a:ext>
             </a:extLst>
           </p:cNvPr>
@@ -8246,7 +8266,17 @@
               <a:rPr lang="en-GB" smtClean="0"/>
               <a:t>13</a:t>
             </a:fld>
-            <a:endParaRPr lang="en-GB"/>
+            <a:r>
+              <a:rPr lang="en-GB" sz="1200" dirty="0">
+                <a:solidFill>
+                  <a:prstClr val="white">
+                    <a:tint val="75000"/>
+                  </a:prstClr>
+                </a:solidFill>
+              </a:rPr>
+              <a:t>/23</a:t>
+            </a:r>
+            <a:endParaRPr lang="en-GB" dirty="0"/>
           </a:p>
         </p:txBody>
       </p:sp>
@@ -8326,6 +8356,9 @@
   <p:clrMapOvr>
     <a:masterClrMapping/>
   </p:clrMapOvr>
+  <p:transition spd="med">
+    <p:pull/>
+  </p:transition>
 </p:sld>
 </file>
 
@@ -8351,7 +8384,7 @@
           <p:cNvPr id="4" name="Titre 3">
             <a:extLst>
               <a:ext uri="{FF2B5EF4-FFF2-40B4-BE49-F238E27FC236}">
-                <a16:creationId xmlns="" xmlns:a16="http://schemas.microsoft.com/office/drawing/2014/main" id="{F93902C4-F6C7-436F-B4F3-5924B28A4C32}"/>
+                <a16:creationId xmlns:a16="http://schemas.microsoft.com/office/drawing/2014/main" id="{F93902C4-F6C7-436F-B4F3-5924B28A4C32}"/>
               </a:ext>
             </a:extLst>
           </p:cNvPr>
@@ -8379,7 +8412,7 @@
           <p:cNvPr id="5" name="Espace réservé du texte 4">
             <a:extLst>
               <a:ext uri="{FF2B5EF4-FFF2-40B4-BE49-F238E27FC236}">
-                <a16:creationId xmlns="" xmlns:a16="http://schemas.microsoft.com/office/drawing/2014/main" id="{DEDA8C52-4803-48B8-9E38-1F7A36DEA2B6}"/>
+                <a16:creationId xmlns:a16="http://schemas.microsoft.com/office/drawing/2014/main" id="{DEDA8C52-4803-48B8-9E38-1F7A36DEA2B6}"/>
               </a:ext>
             </a:extLst>
           </p:cNvPr>
@@ -8404,7 +8437,7 @@
           <p:cNvPr id="2" name="Espace réservé du numéro de diapositive 1">
             <a:extLst>
               <a:ext uri="{FF2B5EF4-FFF2-40B4-BE49-F238E27FC236}">
-                <a16:creationId xmlns="" xmlns:a16="http://schemas.microsoft.com/office/drawing/2014/main" id="{F6DD80EB-A190-4809-9CB4-45F4C0592A99}"/>
+                <a16:creationId xmlns:a16="http://schemas.microsoft.com/office/drawing/2014/main" id="{F6DD80EB-A190-4809-9CB4-45F4C0592A99}"/>
               </a:ext>
             </a:extLst>
           </p:cNvPr>
@@ -8424,7 +8457,17 @@
               <a:rPr lang="en-GB" smtClean="0"/>
               <a:t>14</a:t>
             </a:fld>
-            <a:endParaRPr lang="en-GB"/>
+            <a:r>
+              <a:rPr lang="en-GB" sz="1200" dirty="0">
+                <a:solidFill>
+                  <a:prstClr val="white">
+                    <a:tint val="75000"/>
+                  </a:prstClr>
+                </a:solidFill>
+              </a:rPr>
+              <a:t>/23</a:t>
+            </a:r>
+            <a:endParaRPr lang="en-GB" dirty="0"/>
           </a:p>
         </p:txBody>
       </p:sp>
@@ -8438,6 +8481,9 @@
   <p:clrMapOvr>
     <a:masterClrMapping/>
   </p:clrMapOvr>
+  <p:transition spd="med">
+    <p:pull/>
+  </p:transition>
 </p:sld>
 </file>
 
@@ -8463,7 +8509,7 @@
           <p:cNvPr id="2" name="Titre 1">
             <a:extLst>
               <a:ext uri="{FF2B5EF4-FFF2-40B4-BE49-F238E27FC236}">
-                <a16:creationId xmlns="" xmlns:a16="http://schemas.microsoft.com/office/drawing/2014/main" id="{3E47E298-DD99-424B-840E-4FAFBEED9743}"/>
+                <a16:creationId xmlns:a16="http://schemas.microsoft.com/office/drawing/2014/main" id="{3E47E298-DD99-424B-840E-4FAFBEED9743}"/>
               </a:ext>
             </a:extLst>
           </p:cNvPr>
@@ -8497,7 +8543,7 @@
           <p:cNvPr id="4" name="Espace réservé du numéro de diapositive 3">
             <a:extLst>
               <a:ext uri="{FF2B5EF4-FFF2-40B4-BE49-F238E27FC236}">
-                <a16:creationId xmlns="" xmlns:a16="http://schemas.microsoft.com/office/drawing/2014/main" id="{D08BFD3F-7C67-4120-B1D3-FF427EF49D65}"/>
+                <a16:creationId xmlns:a16="http://schemas.microsoft.com/office/drawing/2014/main" id="{D08BFD3F-7C67-4120-B1D3-FF427EF49D65}"/>
               </a:ext>
             </a:extLst>
           </p:cNvPr>
@@ -8517,7 +8563,17 @@
               <a:rPr lang="en-GB" smtClean="0"/>
               <a:t>15</a:t>
             </a:fld>
-            <a:endParaRPr lang="en-GB"/>
+            <a:r>
+              <a:rPr lang="en-GB" sz="1200" dirty="0">
+                <a:solidFill>
+                  <a:prstClr val="white">
+                    <a:tint val="75000"/>
+                  </a:prstClr>
+                </a:solidFill>
+              </a:rPr>
+              <a:t>/23</a:t>
+            </a:r>
+            <a:endParaRPr lang="en-GB" dirty="0"/>
           </a:p>
         </p:txBody>
       </p:sp>
@@ -8578,6 +8634,9 @@
   <p:clrMapOvr>
     <a:masterClrMapping/>
   </p:clrMapOvr>
+  <p:transition spd="med">
+    <p:pull/>
+  </p:transition>
 </p:sld>
 </file>
 
@@ -8603,7 +8662,7 @@
           <p:cNvPr id="2" name="Titre 1">
             <a:extLst>
               <a:ext uri="{FF2B5EF4-FFF2-40B4-BE49-F238E27FC236}">
-                <a16:creationId xmlns="" xmlns:a16="http://schemas.microsoft.com/office/drawing/2014/main" id="{3E47E298-DD99-424B-840E-4FAFBEED9743}"/>
+                <a16:creationId xmlns:a16="http://schemas.microsoft.com/office/drawing/2014/main" id="{3E47E298-DD99-424B-840E-4FAFBEED9743}"/>
               </a:ext>
             </a:extLst>
           </p:cNvPr>
@@ -8637,7 +8696,7 @@
           <p:cNvPr id="4" name="Espace réservé du numéro de diapositive 3">
             <a:extLst>
               <a:ext uri="{FF2B5EF4-FFF2-40B4-BE49-F238E27FC236}">
-                <a16:creationId xmlns="" xmlns:a16="http://schemas.microsoft.com/office/drawing/2014/main" id="{D08BFD3F-7C67-4120-B1D3-FF427EF49D65}"/>
+                <a16:creationId xmlns:a16="http://schemas.microsoft.com/office/drawing/2014/main" id="{D08BFD3F-7C67-4120-B1D3-FF427EF49D65}"/>
               </a:ext>
             </a:extLst>
           </p:cNvPr>
@@ -8657,7 +8716,17 @@
               <a:rPr lang="en-GB" smtClean="0"/>
               <a:t>16</a:t>
             </a:fld>
-            <a:endParaRPr lang="en-GB"/>
+            <a:r>
+              <a:rPr lang="en-GB" sz="1200" dirty="0">
+                <a:solidFill>
+                  <a:prstClr val="white">
+                    <a:tint val="75000"/>
+                  </a:prstClr>
+                </a:solidFill>
+              </a:rPr>
+              <a:t>/23</a:t>
+            </a:r>
+            <a:endParaRPr lang="en-GB" dirty="0"/>
           </a:p>
         </p:txBody>
       </p:sp>
@@ -8717,6 +8786,9 @@
   <p:clrMapOvr>
     <a:masterClrMapping/>
   </p:clrMapOvr>
+  <p:transition spd="med">
+    <p:pull/>
+  </p:transition>
 </p:sld>
 </file>
 
@@ -8742,7 +8814,7 @@
           <p:cNvPr id="2" name="Titre 1">
             <a:extLst>
               <a:ext uri="{FF2B5EF4-FFF2-40B4-BE49-F238E27FC236}">
-                <a16:creationId xmlns="" xmlns:a16="http://schemas.microsoft.com/office/drawing/2014/main" id="{3E47E298-DD99-424B-840E-4FAFBEED9743}"/>
+                <a16:creationId xmlns:a16="http://schemas.microsoft.com/office/drawing/2014/main" id="{3E47E298-DD99-424B-840E-4FAFBEED9743}"/>
               </a:ext>
             </a:extLst>
           </p:cNvPr>
@@ -8776,7 +8848,7 @@
           <p:cNvPr id="4" name="Espace réservé du numéro de diapositive 3">
             <a:extLst>
               <a:ext uri="{FF2B5EF4-FFF2-40B4-BE49-F238E27FC236}">
-                <a16:creationId xmlns="" xmlns:a16="http://schemas.microsoft.com/office/drawing/2014/main" id="{D08BFD3F-7C67-4120-B1D3-FF427EF49D65}"/>
+                <a16:creationId xmlns:a16="http://schemas.microsoft.com/office/drawing/2014/main" id="{D08BFD3F-7C67-4120-B1D3-FF427EF49D65}"/>
               </a:ext>
             </a:extLst>
           </p:cNvPr>
@@ -8796,7 +8868,17 @@
               <a:rPr lang="en-GB" smtClean="0"/>
               <a:t>17</a:t>
             </a:fld>
-            <a:endParaRPr lang="en-GB"/>
+            <a:r>
+              <a:rPr lang="en-GB" sz="1200" dirty="0">
+                <a:solidFill>
+                  <a:prstClr val="white">
+                    <a:tint val="75000"/>
+                  </a:prstClr>
+                </a:solidFill>
+              </a:rPr>
+              <a:t>/23</a:t>
+            </a:r>
+            <a:endParaRPr lang="en-GB" dirty="0"/>
           </a:p>
         </p:txBody>
       </p:sp>
@@ -8836,6 +8918,9 @@
   <p:clrMapOvr>
     <a:masterClrMapping/>
   </p:clrMapOvr>
+  <p:transition spd="med">
+    <p:pull/>
+  </p:transition>
 </p:sld>
 </file>
 
@@ -8861,7 +8946,7 @@
           <p:cNvPr id="2" name="Titre 1">
             <a:extLst>
               <a:ext uri="{FF2B5EF4-FFF2-40B4-BE49-F238E27FC236}">
-                <a16:creationId xmlns="" xmlns:a16="http://schemas.microsoft.com/office/drawing/2014/main" id="{3E47E298-DD99-424B-840E-4FAFBEED9743}"/>
+                <a16:creationId xmlns:a16="http://schemas.microsoft.com/office/drawing/2014/main" id="{3E47E298-DD99-424B-840E-4FAFBEED9743}"/>
               </a:ext>
             </a:extLst>
           </p:cNvPr>
@@ -8884,10 +8969,9 @@
           <a:p>
             <a:pPr algn="ctr"/>
             <a:r>
-              <a:rPr lang="fr-FR" b="1" dirty="0" smtClean="0"/>
+              <a:rPr lang="fr-FR" b="1" dirty="0"/>
               <a:t>POS Applicatif Cible</a:t>
             </a:r>
-            <a:endParaRPr lang="fr-FR" b="1" dirty="0"/>
           </a:p>
         </p:txBody>
       </p:sp>
@@ -8896,7 +8980,7 @@
           <p:cNvPr id="4" name="Espace réservé du numéro de diapositive 3">
             <a:extLst>
               <a:ext uri="{FF2B5EF4-FFF2-40B4-BE49-F238E27FC236}">
-                <a16:creationId xmlns="" xmlns:a16="http://schemas.microsoft.com/office/drawing/2014/main" id="{D08BFD3F-7C67-4120-B1D3-FF427EF49D65}"/>
+                <a16:creationId xmlns:a16="http://schemas.microsoft.com/office/drawing/2014/main" id="{D08BFD3F-7C67-4120-B1D3-FF427EF49D65}"/>
               </a:ext>
             </a:extLst>
           </p:cNvPr>
@@ -8916,7 +9000,17 @@
               <a:rPr lang="en-GB" smtClean="0"/>
               <a:t>18</a:t>
             </a:fld>
-            <a:endParaRPr lang="en-GB"/>
+            <a:r>
+              <a:rPr lang="en-GB" sz="1200" dirty="0">
+                <a:solidFill>
+                  <a:prstClr val="white">
+                    <a:tint val="75000"/>
+                  </a:prstClr>
+                </a:solidFill>
+              </a:rPr>
+              <a:t>/23</a:t>
+            </a:r>
+            <a:endParaRPr lang="en-GB" dirty="0"/>
           </a:p>
         </p:txBody>
       </p:sp>
@@ -8956,6 +9050,9 @@
   <p:clrMapOvr>
     <a:masterClrMapping/>
   </p:clrMapOvr>
+  <p:transition spd="med">
+    <p:pull/>
+  </p:transition>
 </p:sld>
 </file>
 
@@ -8981,7 +9078,7 @@
           <p:cNvPr id="2" name="Titre 1">
             <a:extLst>
               <a:ext uri="{FF2B5EF4-FFF2-40B4-BE49-F238E27FC236}">
-                <a16:creationId xmlns="" xmlns:a16="http://schemas.microsoft.com/office/drawing/2014/main" id="{3E47E298-DD99-424B-840E-4FAFBEED9743}"/>
+                <a16:creationId xmlns:a16="http://schemas.microsoft.com/office/drawing/2014/main" id="{3E47E298-DD99-424B-840E-4FAFBEED9743}"/>
               </a:ext>
             </a:extLst>
           </p:cNvPr>
@@ -9004,10 +9101,9 @@
           <a:p>
             <a:pPr algn="ctr"/>
             <a:r>
-              <a:rPr lang="fr-FR" b="1" dirty="0" smtClean="0"/>
+              <a:rPr lang="fr-FR" b="1" dirty="0"/>
               <a:t>Cartographie Cible</a:t>
             </a:r>
-            <a:endParaRPr lang="fr-FR" b="1" dirty="0"/>
           </a:p>
         </p:txBody>
       </p:sp>
@@ -9016,7 +9112,7 @@
           <p:cNvPr id="4" name="Espace réservé du numéro de diapositive 3">
             <a:extLst>
               <a:ext uri="{FF2B5EF4-FFF2-40B4-BE49-F238E27FC236}">
-                <a16:creationId xmlns="" xmlns:a16="http://schemas.microsoft.com/office/drawing/2014/main" id="{D08BFD3F-7C67-4120-B1D3-FF427EF49D65}"/>
+                <a16:creationId xmlns:a16="http://schemas.microsoft.com/office/drawing/2014/main" id="{D08BFD3F-7C67-4120-B1D3-FF427EF49D65}"/>
               </a:ext>
             </a:extLst>
           </p:cNvPr>
@@ -9036,7 +9132,17 @@
               <a:rPr lang="en-GB" smtClean="0"/>
               <a:t>19</a:t>
             </a:fld>
-            <a:endParaRPr lang="en-GB"/>
+            <a:r>
+              <a:rPr lang="en-GB" sz="1200" dirty="0">
+                <a:solidFill>
+                  <a:prstClr val="white">
+                    <a:tint val="75000"/>
+                  </a:prstClr>
+                </a:solidFill>
+              </a:rPr>
+              <a:t>/23</a:t>
+            </a:r>
+            <a:endParaRPr lang="en-GB" dirty="0"/>
           </a:p>
         </p:txBody>
       </p:sp>
@@ -9051,15 +9157,21 @@
           </p:nvPr>
         </p:nvPicPr>
         <p:blipFill>
-          <a:blip r:embed="rId2"/>
+          <a:blip r:embed="rId2">
+            <a:extLst>
+              <a:ext uri="{28A0092B-C50C-407E-A947-70E740481C1C}">
+                <a14:useLocalDpi xmlns:a14="http://schemas.microsoft.com/office/drawing/2010/main" val="0"/>
+              </a:ext>
+            </a:extLst>
+          </a:blip>
           <a:stretch>
             <a:fillRect/>
           </a:stretch>
         </p:blipFill>
         <p:spPr>
           <a:xfrm>
-            <a:off x="1815227" y="777346"/>
-            <a:ext cx="7066490" cy="6080654"/>
+            <a:off x="1898674" y="777346"/>
+            <a:ext cx="6899596" cy="6080654"/>
           </a:xfrm>
           <a:prstGeom prst="rect">
             <a:avLst/>
@@ -9076,6 +9188,9 @@
   <p:clrMapOvr>
     <a:masterClrMapping/>
   </p:clrMapOvr>
+  <p:transition spd="med">
+    <p:pull/>
+  </p:transition>
 </p:sld>
 </file>
 
@@ -9101,7 +9216,7 @@
           <p:cNvPr id="2" name="Titre 1">
             <a:extLst>
               <a:ext uri="{FF2B5EF4-FFF2-40B4-BE49-F238E27FC236}">
-                <a16:creationId xmlns="" xmlns:a16="http://schemas.microsoft.com/office/drawing/2014/main" id="{3E47E298-DD99-424B-840E-4FAFBEED9743}"/>
+                <a16:creationId xmlns:a16="http://schemas.microsoft.com/office/drawing/2014/main" id="{3E47E298-DD99-424B-840E-4FAFBEED9743}"/>
               </a:ext>
             </a:extLst>
           </p:cNvPr>
@@ -9124,10 +9239,9 @@
           <a:p>
             <a:pPr algn="ctr"/>
             <a:r>
-              <a:rPr lang="fr-FR" b="1" dirty="0" smtClean="0"/>
+              <a:rPr lang="fr-FR" b="1" dirty="0"/>
               <a:t>Sommaire : Partie 1 &amp; 2</a:t>
             </a:r>
-            <a:endParaRPr lang="fr-FR" b="1" dirty="0"/>
           </a:p>
         </p:txBody>
       </p:sp>
@@ -9136,7 +9250,7 @@
           <p:cNvPr id="3" name="Espace réservé du contenu 2">
             <a:extLst>
               <a:ext uri="{FF2B5EF4-FFF2-40B4-BE49-F238E27FC236}">
-                <a16:creationId xmlns="" xmlns:a16="http://schemas.microsoft.com/office/drawing/2014/main" id="{37F25BD2-9027-45FC-9136-D69CC9700F4E}"/>
+                <a16:creationId xmlns:a16="http://schemas.microsoft.com/office/drawing/2014/main" id="{37F25BD2-9027-45FC-9136-D69CC9700F4E}"/>
               </a:ext>
             </a:extLst>
           </p:cNvPr>
@@ -9188,11 +9302,7 @@
             <a:pPr lvl="1"/>
             <a:r>
               <a:rPr lang="fr-FR" dirty="0"/>
-              <a:t>Organisation </a:t>
-            </a:r>
-            <a:r>
-              <a:rPr lang="fr-FR" dirty="0" smtClean="0"/>
-              <a:t>fonctionnelle</a:t>
+              <a:t>Organisation fonctionnelle</a:t>
             </a:r>
           </a:p>
           <a:p>
@@ -9205,34 +9315,29 @@
           <a:p>
             <a:r>
               <a:rPr lang="fr-FR" dirty="0"/>
-              <a:t>SI </a:t>
-            </a:r>
-            <a:r>
-              <a:rPr lang="fr-FR" dirty="0" smtClean="0"/>
-              <a:t>Actuel</a:t>
+              <a:t>SI Actuel</a:t>
             </a:r>
           </a:p>
           <a:p>
             <a:pPr lvl="1"/>
             <a:r>
-              <a:rPr lang="fr-FR" dirty="0" smtClean="0"/>
+              <a:rPr lang="fr-FR" dirty="0"/>
               <a:t>POS applicatif</a:t>
             </a:r>
           </a:p>
           <a:p>
             <a:pPr lvl="1"/>
             <a:r>
-              <a:rPr lang="fr-FR" dirty="0" smtClean="0"/>
+              <a:rPr lang="fr-FR" dirty="0"/>
               <a:t>Cartographie</a:t>
             </a:r>
           </a:p>
           <a:p>
             <a:pPr lvl="1"/>
             <a:r>
-              <a:rPr lang="fr-FR" dirty="0" smtClean="0"/>
+              <a:rPr lang="fr-FR" dirty="0"/>
               <a:t>Infrastructure</a:t>
             </a:r>
-            <a:endParaRPr lang="fr-FR" dirty="0"/>
           </a:p>
         </p:txBody>
       </p:sp>
@@ -9241,7 +9346,7 @@
           <p:cNvPr id="6" name="Espace réservé du numéro de diapositive 5">
             <a:extLst>
               <a:ext uri="{FF2B5EF4-FFF2-40B4-BE49-F238E27FC236}">
-                <a16:creationId xmlns="" xmlns:a16="http://schemas.microsoft.com/office/drawing/2014/main" id="{00A2632D-E28D-422C-9EC8-5D8134E89D85}"/>
+                <a16:creationId xmlns:a16="http://schemas.microsoft.com/office/drawing/2014/main" id="{00A2632D-E28D-422C-9EC8-5D8134E89D85}"/>
               </a:ext>
             </a:extLst>
           </p:cNvPr>
@@ -9261,6 +9366,16 @@
               <a:rPr lang="en-GB" smtClean="0"/>
               <a:t>2</a:t>
             </a:fld>
+            <a:r>
+              <a:rPr lang="en-GB" sz="1200" dirty="0">
+                <a:solidFill>
+                  <a:prstClr val="white">
+                    <a:tint val="75000"/>
+                  </a:prstClr>
+                </a:solidFill>
+              </a:rPr>
+              <a:t>/23</a:t>
+            </a:r>
             <a:endParaRPr lang="en-GB" dirty="0"/>
           </a:p>
         </p:txBody>
@@ -9275,13 +9390,9 @@
   <p:clrMapOvr>
     <a:masterClrMapping/>
   </p:clrMapOvr>
-  <p:timing>
-    <p:tnLst>
-      <p:par>
-        <p:cTn id="1" dur="indefinite" restart="never" nodeType="tmRoot"/>
-      </p:par>
-    </p:tnLst>
-  </p:timing>
+  <p:transition spd="med">
+    <p:pull/>
+  </p:transition>
 </p:sld>
 </file>
 
@@ -9307,7 +9418,7 @@
           <p:cNvPr id="2" name="Titre 1">
             <a:extLst>
               <a:ext uri="{FF2B5EF4-FFF2-40B4-BE49-F238E27FC236}">
-                <a16:creationId xmlns="" xmlns:a16="http://schemas.microsoft.com/office/drawing/2014/main" id="{3E47E298-DD99-424B-840E-4FAFBEED9743}"/>
+                <a16:creationId xmlns:a16="http://schemas.microsoft.com/office/drawing/2014/main" id="{3E47E298-DD99-424B-840E-4FAFBEED9743}"/>
               </a:ext>
             </a:extLst>
           </p:cNvPr>
@@ -9330,10 +9441,9 @@
           <a:p>
             <a:pPr algn="ctr"/>
             <a:r>
-              <a:rPr lang="fr-FR" b="1" dirty="0" smtClean="0"/>
+              <a:rPr lang="fr-FR" b="1" dirty="0"/>
               <a:t>Infrastructure Cible</a:t>
             </a:r>
-            <a:endParaRPr lang="fr-FR" b="1" dirty="0"/>
           </a:p>
         </p:txBody>
       </p:sp>
@@ -9342,7 +9452,7 @@
           <p:cNvPr id="4" name="Espace réservé du numéro de diapositive 3">
             <a:extLst>
               <a:ext uri="{FF2B5EF4-FFF2-40B4-BE49-F238E27FC236}">
-                <a16:creationId xmlns="" xmlns:a16="http://schemas.microsoft.com/office/drawing/2014/main" id="{D08BFD3F-7C67-4120-B1D3-FF427EF49D65}"/>
+                <a16:creationId xmlns:a16="http://schemas.microsoft.com/office/drawing/2014/main" id="{D08BFD3F-7C67-4120-B1D3-FF427EF49D65}"/>
               </a:ext>
             </a:extLst>
           </p:cNvPr>
@@ -9362,7 +9472,17 @@
               <a:rPr lang="en-GB" smtClean="0"/>
               <a:t>20</a:t>
             </a:fld>
-            <a:endParaRPr lang="en-GB"/>
+            <a:r>
+              <a:rPr lang="en-GB" sz="1200" dirty="0">
+                <a:solidFill>
+                  <a:prstClr val="white">
+                    <a:tint val="75000"/>
+                  </a:prstClr>
+                </a:solidFill>
+              </a:rPr>
+              <a:t>/23</a:t>
+            </a:r>
+            <a:endParaRPr lang="en-GB" dirty="0"/>
           </a:p>
         </p:txBody>
       </p:sp>
@@ -9402,13 +9522,9 @@
   <p:clrMapOvr>
     <a:masterClrMapping/>
   </p:clrMapOvr>
-  <p:timing>
-    <p:tnLst>
-      <p:par>
-        <p:cTn id="1" dur="indefinite" restart="never" nodeType="tmRoot"/>
-      </p:par>
-    </p:tnLst>
-  </p:timing>
+  <p:transition spd="med">
+    <p:pull/>
+  </p:transition>
 </p:sld>
 </file>
 
@@ -9434,7 +9550,7 @@
           <p:cNvPr id="2" name="Titre 1">
             <a:extLst>
               <a:ext uri="{FF2B5EF4-FFF2-40B4-BE49-F238E27FC236}">
-                <a16:creationId xmlns="" xmlns:a16="http://schemas.microsoft.com/office/drawing/2014/main" id="{3E47E298-DD99-424B-840E-4FAFBEED9743}"/>
+                <a16:creationId xmlns:a16="http://schemas.microsoft.com/office/drawing/2014/main" id="{3E47E298-DD99-424B-840E-4FAFBEED9743}"/>
               </a:ext>
             </a:extLst>
           </p:cNvPr>
@@ -9468,7 +9584,7 @@
           <p:cNvPr id="4" name="Espace réservé du numéro de diapositive 3">
             <a:extLst>
               <a:ext uri="{FF2B5EF4-FFF2-40B4-BE49-F238E27FC236}">
-                <a16:creationId xmlns="" xmlns:a16="http://schemas.microsoft.com/office/drawing/2014/main" id="{D08BFD3F-7C67-4120-B1D3-FF427EF49D65}"/>
+                <a16:creationId xmlns:a16="http://schemas.microsoft.com/office/drawing/2014/main" id="{D08BFD3F-7C67-4120-B1D3-FF427EF49D65}"/>
               </a:ext>
             </a:extLst>
           </p:cNvPr>
@@ -9488,7 +9604,17 @@
               <a:rPr lang="en-GB" smtClean="0"/>
               <a:t>21</a:t>
             </a:fld>
-            <a:endParaRPr lang="en-GB"/>
+            <a:r>
+              <a:rPr lang="en-GB" sz="1200" dirty="0">
+                <a:solidFill>
+                  <a:prstClr val="white">
+                    <a:tint val="75000"/>
+                  </a:prstClr>
+                </a:solidFill>
+              </a:rPr>
+              <a:t>/23</a:t>
+            </a:r>
+            <a:endParaRPr lang="en-GB" dirty="0"/>
           </a:p>
         </p:txBody>
       </p:sp>
@@ -9528,13 +9654,9 @@
   <p:clrMapOvr>
     <a:masterClrMapping/>
   </p:clrMapOvr>
-  <p:timing>
-    <p:tnLst>
-      <p:par>
-        <p:cTn id="1" dur="indefinite" restart="never" nodeType="tmRoot"/>
-      </p:par>
-    </p:tnLst>
-  </p:timing>
+  <p:transition spd="med">
+    <p:pull/>
+  </p:transition>
 </p:sld>
 </file>
 
@@ -9560,7 +9682,7 @@
           <p:cNvPr id="2" name="Titre 1">
             <a:extLst>
               <a:ext uri="{FF2B5EF4-FFF2-40B4-BE49-F238E27FC236}">
-                <a16:creationId xmlns="" xmlns:a16="http://schemas.microsoft.com/office/drawing/2014/main" id="{3E47E298-DD99-424B-840E-4FAFBEED9743}"/>
+                <a16:creationId xmlns:a16="http://schemas.microsoft.com/office/drawing/2014/main" id="{3E47E298-DD99-424B-840E-4FAFBEED9743}"/>
               </a:ext>
             </a:extLst>
           </p:cNvPr>
@@ -9594,7 +9716,7 @@
           <p:cNvPr id="3" name="Espace réservé du contenu 2">
             <a:extLst>
               <a:ext uri="{FF2B5EF4-FFF2-40B4-BE49-F238E27FC236}">
-                <a16:creationId xmlns="" xmlns:a16="http://schemas.microsoft.com/office/drawing/2014/main" id="{37F25BD2-9027-45FC-9136-D69CC9700F4E}"/>
+                <a16:creationId xmlns:a16="http://schemas.microsoft.com/office/drawing/2014/main" id="{37F25BD2-9027-45FC-9136-D69CC9700F4E}"/>
               </a:ext>
             </a:extLst>
           </p:cNvPr>
@@ -9615,6 +9737,41 @@
           <a:bodyPr/>
           <a:lstStyle/>
           <a:p>
+            <a:r>
+              <a:rPr lang="fr-FR" sz="2800" b="1" dirty="0"/>
+              <a:t>Pourquoi urbaniser le SI ?</a:t>
+            </a:r>
+          </a:p>
+          <a:p>
+            <a:pPr lvl="1"/>
+            <a:r>
+              <a:rPr lang="fr-FR" dirty="0"/>
+              <a:t>Mieux répondre aux exigences du marché</a:t>
+            </a:r>
+          </a:p>
+          <a:p>
+            <a:pPr lvl="1"/>
+            <a:r>
+              <a:rPr lang="fr-FR" dirty="0"/>
+              <a:t>Optimiser le bénéfice du SI</a:t>
+            </a:r>
+          </a:p>
+          <a:p>
+            <a:pPr lvl="1"/>
+            <a:r>
+              <a:rPr lang="fr-FR" dirty="0"/>
+              <a:t>Améliorer la fluidité des processus d’Aero-Breizh</a:t>
+            </a:r>
+          </a:p>
+          <a:p>
+            <a:pPr lvl="1"/>
+            <a:r>
+              <a:rPr lang="fr-FR" dirty="0"/>
+              <a:t>Satisfaction des clients avec les nouvelles fonctionnalités fournies</a:t>
+            </a:r>
+          </a:p>
+          <a:p>
+            <a:pPr lvl="1"/>
             <a:endParaRPr lang="en-GB" dirty="0"/>
           </a:p>
         </p:txBody>
@@ -9624,7 +9781,7 @@
           <p:cNvPr id="4" name="Espace réservé du numéro de diapositive 3">
             <a:extLst>
               <a:ext uri="{FF2B5EF4-FFF2-40B4-BE49-F238E27FC236}">
-                <a16:creationId xmlns="" xmlns:a16="http://schemas.microsoft.com/office/drawing/2014/main" id="{E32F79F5-69CB-48A3-80A7-00B85042B396}"/>
+                <a16:creationId xmlns:a16="http://schemas.microsoft.com/office/drawing/2014/main" id="{E32F79F5-69CB-48A3-80A7-00B85042B396}"/>
               </a:ext>
             </a:extLst>
           </p:cNvPr>
@@ -9644,7 +9801,17 @@
               <a:rPr lang="en-GB" smtClean="0"/>
               <a:t>22</a:t>
             </a:fld>
-            <a:endParaRPr lang="en-GB"/>
+            <a:r>
+              <a:rPr lang="en-GB" sz="1200" dirty="0">
+                <a:solidFill>
+                  <a:prstClr val="white">
+                    <a:tint val="75000"/>
+                  </a:prstClr>
+                </a:solidFill>
+              </a:rPr>
+              <a:t>/23</a:t>
+            </a:r>
+            <a:endParaRPr lang="en-GB" dirty="0"/>
           </a:p>
         </p:txBody>
       </p:sp>
@@ -9658,13 +9825,9 @@
   <p:clrMapOvr>
     <a:masterClrMapping/>
   </p:clrMapOvr>
-  <p:timing>
-    <p:tnLst>
-      <p:par>
-        <p:cTn id="1" dur="indefinite" restart="never" nodeType="tmRoot"/>
-      </p:par>
-    </p:tnLst>
-  </p:timing>
+  <p:transition spd="med">
+    <p:pull/>
+  </p:transition>
 </p:sld>
 </file>
 
@@ -9690,7 +9853,7 @@
           <p:cNvPr id="2" name="Titre 1">
             <a:extLst>
               <a:ext uri="{FF2B5EF4-FFF2-40B4-BE49-F238E27FC236}">
-                <a16:creationId xmlns="" xmlns:a16="http://schemas.microsoft.com/office/drawing/2014/main" id="{3E47E298-DD99-424B-840E-4FAFBEED9743}"/>
+                <a16:creationId xmlns:a16="http://schemas.microsoft.com/office/drawing/2014/main" id="{3E47E298-DD99-424B-840E-4FAFBEED9743}"/>
               </a:ext>
             </a:extLst>
           </p:cNvPr>
@@ -9724,7 +9887,7 @@
           <p:cNvPr id="7" name="Espace réservé du contenu 6">
             <a:extLst>
               <a:ext uri="{FF2B5EF4-FFF2-40B4-BE49-F238E27FC236}">
-                <a16:creationId xmlns="" xmlns:a16="http://schemas.microsoft.com/office/drawing/2014/main" id="{03E8DA0E-BF57-4EE0-A458-09B3B4F2ACED}"/>
+                <a16:creationId xmlns:a16="http://schemas.microsoft.com/office/drawing/2014/main" id="{03E8DA0E-BF57-4EE0-A458-09B3B4F2ACED}"/>
               </a:ext>
             </a:extLst>
           </p:cNvPr>
@@ -9759,7 +9922,7 @@
           <p:cNvPr id="3" name="Espace réservé du numéro de diapositive 2">
             <a:extLst>
               <a:ext uri="{FF2B5EF4-FFF2-40B4-BE49-F238E27FC236}">
-                <a16:creationId xmlns="" xmlns:a16="http://schemas.microsoft.com/office/drawing/2014/main" id="{2A8BF67F-C94A-420D-AF29-DFD155B69BAF}"/>
+                <a16:creationId xmlns:a16="http://schemas.microsoft.com/office/drawing/2014/main" id="{2A8BF67F-C94A-420D-AF29-DFD155B69BAF}"/>
               </a:ext>
             </a:extLst>
           </p:cNvPr>
@@ -9779,7 +9942,17 @@
               <a:rPr lang="en-GB" smtClean="0"/>
               <a:t>23</a:t>
             </a:fld>
-            <a:endParaRPr lang="en-GB"/>
+            <a:r>
+              <a:rPr lang="en-GB" sz="1200" dirty="0">
+                <a:solidFill>
+                  <a:prstClr val="white">
+                    <a:tint val="75000"/>
+                  </a:prstClr>
+                </a:solidFill>
+              </a:rPr>
+              <a:t>/23</a:t>
+            </a:r>
+            <a:endParaRPr lang="en-GB" dirty="0"/>
           </a:p>
         </p:txBody>
       </p:sp>
@@ -9793,13 +9966,18 @@
   <p:clrMapOvr>
     <a:masterClrMapping/>
   </p:clrMapOvr>
-  <p:timing>
-    <p:tnLst>
-      <p:par>
-        <p:cTn id="1" dur="indefinite" restart="never" nodeType="tmRoot"/>
-      </p:par>
-    </p:tnLst>
-  </p:timing>
+  <mc:AlternateContent xmlns:mc="http://schemas.openxmlformats.org/markup-compatibility/2006">
+    <mc:Choice xmlns:p15="http://schemas.microsoft.com/office/powerpoint/2012/main" Requires="p15">
+      <p:transition xmlns:p14="http://schemas.microsoft.com/office/powerpoint/2010/main" spd="slow" p14:dur="2000">
+        <p15:prstTrans prst="drape"/>
+      </p:transition>
+    </mc:Choice>
+    <mc:Fallback>
+      <p:transition spd="slow">
+        <p:fade/>
+      </p:transition>
+    </mc:Fallback>
+  </mc:AlternateContent>
 </p:sld>
 </file>
 
@@ -9825,7 +10003,7 @@
           <p:cNvPr id="2" name="Titre 1">
             <a:extLst>
               <a:ext uri="{FF2B5EF4-FFF2-40B4-BE49-F238E27FC236}">
-                <a16:creationId xmlns="" xmlns:a16="http://schemas.microsoft.com/office/drawing/2014/main" id="{3E47E298-DD99-424B-840E-4FAFBEED9743}"/>
+                <a16:creationId xmlns:a16="http://schemas.microsoft.com/office/drawing/2014/main" id="{3E47E298-DD99-424B-840E-4FAFBEED9743}"/>
               </a:ext>
             </a:extLst>
           </p:cNvPr>
@@ -9848,10 +10026,9 @@
           <a:p>
             <a:pPr algn="ctr"/>
             <a:r>
-              <a:rPr lang="fr-FR" b="1" dirty="0" smtClean="0"/>
+              <a:rPr lang="fr-FR" b="1" dirty="0"/>
               <a:t>Sommaire : Partie 3</a:t>
             </a:r>
-            <a:endParaRPr lang="fr-FR" b="1" dirty="0"/>
           </a:p>
         </p:txBody>
       </p:sp>
@@ -9860,7 +10037,7 @@
           <p:cNvPr id="3" name="Espace réservé du contenu 2">
             <a:extLst>
               <a:ext uri="{FF2B5EF4-FFF2-40B4-BE49-F238E27FC236}">
-                <a16:creationId xmlns="" xmlns:a16="http://schemas.microsoft.com/office/drawing/2014/main" id="{37F25BD2-9027-45FC-9136-D69CC9700F4E}"/>
+                <a16:creationId xmlns:a16="http://schemas.microsoft.com/office/drawing/2014/main" id="{37F25BD2-9027-45FC-9136-D69CC9700F4E}"/>
               </a:ext>
             </a:extLst>
           </p:cNvPr>
@@ -9884,22 +10061,16 @@
           <a:lstStyle/>
           <a:p>
             <a:r>
-              <a:rPr lang="fr-FR" dirty="0" smtClean="0"/>
+              <a:rPr lang="fr-FR" dirty="0"/>
               <a:t>SI de demain</a:t>
             </a:r>
-            <a:endParaRPr lang="fr-FR" dirty="0"/>
           </a:p>
           <a:p>
             <a:pPr lvl="1"/>
             <a:r>
               <a:rPr lang="fr-FR" dirty="0"/>
-              <a:t>Vue </a:t>
-            </a:r>
-            <a:r>
-              <a:rPr lang="fr-FR" dirty="0" smtClean="0"/>
-              <a:t>globale des projets</a:t>
-            </a:r>
-            <a:endParaRPr lang="fr-FR" dirty="0"/>
+              <a:t>Vue globale des projets</a:t>
+            </a:r>
           </a:p>
           <a:p>
             <a:pPr lvl="1"/>
@@ -9911,16 +10082,15 @@
           <a:p>
             <a:pPr lvl="1"/>
             <a:r>
-              <a:rPr lang="fr-FR" dirty="0" smtClean="0"/>
+              <a:rPr lang="fr-FR" dirty="0"/>
               <a:t>O3</a:t>
             </a:r>
           </a:p>
           <a:p>
             <a:r>
-              <a:rPr lang="fr-FR" dirty="0" smtClean="0"/>
+              <a:rPr lang="fr-FR" dirty="0"/>
               <a:t>Projet de migration</a:t>
             </a:r>
-            <a:endParaRPr lang="fr-FR" dirty="0"/>
           </a:p>
           <a:p>
             <a:r>
@@ -9941,7 +10111,7 @@
           <p:cNvPr id="6" name="Espace réservé du numéro de diapositive 5">
             <a:extLst>
               <a:ext uri="{FF2B5EF4-FFF2-40B4-BE49-F238E27FC236}">
-                <a16:creationId xmlns="" xmlns:a16="http://schemas.microsoft.com/office/drawing/2014/main" id="{00A2632D-E28D-422C-9EC8-5D8134E89D85}"/>
+                <a16:creationId xmlns:a16="http://schemas.microsoft.com/office/drawing/2014/main" id="{00A2632D-E28D-422C-9EC8-5D8134E89D85}"/>
               </a:ext>
             </a:extLst>
           </p:cNvPr>
@@ -9961,6 +10131,16 @@
               <a:rPr lang="en-GB" smtClean="0"/>
               <a:t>3</a:t>
             </a:fld>
+            <a:r>
+              <a:rPr lang="en-GB" sz="1200" dirty="0">
+                <a:solidFill>
+                  <a:prstClr val="white">
+                    <a:tint val="75000"/>
+                  </a:prstClr>
+                </a:solidFill>
+              </a:rPr>
+              <a:t>/23</a:t>
+            </a:r>
             <a:endParaRPr lang="en-GB" dirty="0"/>
           </a:p>
         </p:txBody>
@@ -9975,13 +10155,9 @@
   <p:clrMapOvr>
     <a:masterClrMapping/>
   </p:clrMapOvr>
-  <p:timing>
-    <p:tnLst>
-      <p:par>
-        <p:cTn id="1" dur="indefinite" restart="never" nodeType="tmRoot"/>
-      </p:par>
-    </p:tnLst>
-  </p:timing>
+  <p:transition spd="med">
+    <p:pull/>
+  </p:transition>
 </p:sld>
 </file>
 
@@ -10007,7 +10183,7 @@
           <p:cNvPr id="2" name="Titre 1">
             <a:extLst>
               <a:ext uri="{FF2B5EF4-FFF2-40B4-BE49-F238E27FC236}">
-                <a16:creationId xmlns="" xmlns:a16="http://schemas.microsoft.com/office/drawing/2014/main" id="{3E47E298-DD99-424B-840E-4FAFBEED9743}"/>
+                <a16:creationId xmlns:a16="http://schemas.microsoft.com/office/drawing/2014/main" id="{3E47E298-DD99-424B-840E-4FAFBEED9743}"/>
               </a:ext>
             </a:extLst>
           </p:cNvPr>
@@ -10041,7 +10217,7 @@
           <p:cNvPr id="6" name="Espace réservé du contenu 5">
             <a:extLst>
               <a:ext uri="{FF2B5EF4-FFF2-40B4-BE49-F238E27FC236}">
-                <a16:creationId xmlns="" xmlns:a16="http://schemas.microsoft.com/office/drawing/2014/main" id="{4E1680A2-0040-4531-B209-0BA9D4ED4284}"/>
+                <a16:creationId xmlns:a16="http://schemas.microsoft.com/office/drawing/2014/main" id="{4E1680A2-0040-4531-B209-0BA9D4ED4284}"/>
               </a:ext>
             </a:extLst>
           </p:cNvPr>
@@ -10076,7 +10252,7 @@
           <p:cNvPr id="4" name="Espace réservé du numéro de diapositive 3">
             <a:extLst>
               <a:ext uri="{FF2B5EF4-FFF2-40B4-BE49-F238E27FC236}">
-                <a16:creationId xmlns="" xmlns:a16="http://schemas.microsoft.com/office/drawing/2014/main" id="{917F6769-927A-43AA-A939-EF5241566688}"/>
+                <a16:creationId xmlns:a16="http://schemas.microsoft.com/office/drawing/2014/main" id="{917F6769-927A-43AA-A939-EF5241566688}"/>
               </a:ext>
             </a:extLst>
           </p:cNvPr>
@@ -10096,7 +10272,17 @@
               <a:rPr lang="en-GB" smtClean="0"/>
               <a:t>4</a:t>
             </a:fld>
-            <a:endParaRPr lang="en-GB"/>
+            <a:r>
+              <a:rPr lang="en-GB" sz="1200" dirty="0">
+                <a:solidFill>
+                  <a:prstClr val="white">
+                    <a:tint val="75000"/>
+                  </a:prstClr>
+                </a:solidFill>
+              </a:rPr>
+              <a:t>/23</a:t>
+            </a:r>
+            <a:endParaRPr lang="en-GB" dirty="0"/>
           </a:p>
         </p:txBody>
       </p:sp>
@@ -10105,7 +10291,7 @@
           <p:cNvPr id="7" name="ZoneTexte 6">
             <a:extLst>
               <a:ext uri="{FF2B5EF4-FFF2-40B4-BE49-F238E27FC236}">
-                <a16:creationId xmlns="" xmlns:a16="http://schemas.microsoft.com/office/drawing/2014/main" id="{DF50E693-45C7-48F5-B970-80C6CA5F4C6F}"/>
+                <a16:creationId xmlns:a16="http://schemas.microsoft.com/office/drawing/2014/main" id="{DF50E693-45C7-48F5-B970-80C6CA5F4C6F}"/>
               </a:ext>
             </a:extLst>
           </p:cNvPr>
@@ -10153,7 +10339,7 @@
           <p:cNvPr id="9" name="Objet 8">
             <a:extLst>
               <a:ext uri="{FF2B5EF4-FFF2-40B4-BE49-F238E27FC236}">
-                <a16:creationId xmlns="" xmlns:a16="http://schemas.microsoft.com/office/drawing/2014/main" id="{F2D8465B-37F3-4CAE-8C36-1348FAB0E502}"/>
+                <a16:creationId xmlns:a16="http://schemas.microsoft.com/office/drawing/2014/main" id="{F2D8465B-37F3-4CAE-8C36-1348FAB0E502}"/>
               </a:ext>
             </a:extLst>
           </p:cNvPr>
@@ -10176,7 +10362,7 @@
           <a:graphicData uri="http://schemas.openxmlformats.org/presentationml/2006/ole">
             <mc:AlternateContent xmlns:mc="http://schemas.openxmlformats.org/markup-compatibility/2006">
               <mc:Choice xmlns:v="urn:schemas-microsoft-com:vml" Requires="v">
-                <p:oleObj spid="_x0000_s1091" name="Packager Shell Object" showAsIcon="1" r:id="rId4" imgW="1128600" imgH="349200" progId="Package">
+                <p:oleObj spid="_x0000_s1105" name="Packager Shell Object" showAsIcon="1" r:id="rId4" imgW="1128600" imgH="349200" progId="Package">
                   <p:embed/>
                 </p:oleObj>
               </mc:Choice>
@@ -10224,6 +10410,9 @@
   <p:clrMapOvr>
     <a:masterClrMapping/>
   </p:clrMapOvr>
+  <p:transition spd="med">
+    <p:pull/>
+  </p:transition>
 </p:sld>
 </file>
 
@@ -10249,7 +10438,7 @@
           <p:cNvPr id="4" name="Titre 3">
             <a:extLst>
               <a:ext uri="{FF2B5EF4-FFF2-40B4-BE49-F238E27FC236}">
-                <a16:creationId xmlns="" xmlns:a16="http://schemas.microsoft.com/office/drawing/2014/main" id="{F93902C4-F6C7-436F-B4F3-5924B28A4C32}"/>
+                <a16:creationId xmlns:a16="http://schemas.microsoft.com/office/drawing/2014/main" id="{F93902C4-F6C7-436F-B4F3-5924B28A4C32}"/>
               </a:ext>
             </a:extLst>
           </p:cNvPr>
@@ -10277,7 +10466,7 @@
           <p:cNvPr id="5" name="Espace réservé du texte 4">
             <a:extLst>
               <a:ext uri="{FF2B5EF4-FFF2-40B4-BE49-F238E27FC236}">
-                <a16:creationId xmlns="" xmlns:a16="http://schemas.microsoft.com/office/drawing/2014/main" id="{DEDA8C52-4803-48B8-9E38-1F7A36DEA2B6}"/>
+                <a16:creationId xmlns:a16="http://schemas.microsoft.com/office/drawing/2014/main" id="{DEDA8C52-4803-48B8-9E38-1F7A36DEA2B6}"/>
               </a:ext>
             </a:extLst>
           </p:cNvPr>
@@ -10302,7 +10491,7 @@
           <p:cNvPr id="2" name="Espace réservé du numéro de diapositive 1">
             <a:extLst>
               <a:ext uri="{FF2B5EF4-FFF2-40B4-BE49-F238E27FC236}">
-                <a16:creationId xmlns="" xmlns:a16="http://schemas.microsoft.com/office/drawing/2014/main" id="{86B960F3-747A-4106-851F-9BDBDCEC4B4F}"/>
+                <a16:creationId xmlns:a16="http://schemas.microsoft.com/office/drawing/2014/main" id="{86B960F3-747A-4106-851F-9BDBDCEC4B4F}"/>
               </a:ext>
             </a:extLst>
           </p:cNvPr>
@@ -10322,7 +10511,17 @@
               <a:rPr lang="en-GB" smtClean="0"/>
               <a:t>5</a:t>
             </a:fld>
-            <a:endParaRPr lang="en-GB"/>
+            <a:r>
+              <a:rPr lang="en-GB" sz="1200" dirty="0">
+                <a:solidFill>
+                  <a:prstClr val="white">
+                    <a:tint val="75000"/>
+                  </a:prstClr>
+                </a:solidFill>
+              </a:rPr>
+              <a:t>/23</a:t>
+            </a:r>
+            <a:endParaRPr lang="en-GB" dirty="0"/>
           </a:p>
         </p:txBody>
       </p:sp>
@@ -10336,13 +10535,9 @@
   <p:clrMapOvr>
     <a:masterClrMapping/>
   </p:clrMapOvr>
-  <p:timing>
-    <p:tnLst>
-      <p:par>
-        <p:cTn id="1" dur="indefinite" restart="never" nodeType="tmRoot"/>
-      </p:par>
-    </p:tnLst>
-  </p:timing>
+  <p:transition spd="med">
+    <p:pull/>
+  </p:transition>
 </p:sld>
 </file>
 
@@ -10368,7 +10563,7 @@
           <p:cNvPr id="2" name="Titre 1">
             <a:extLst>
               <a:ext uri="{FF2B5EF4-FFF2-40B4-BE49-F238E27FC236}">
-                <a16:creationId xmlns="" xmlns:a16="http://schemas.microsoft.com/office/drawing/2014/main" id="{3E47E298-DD99-424B-840E-4FAFBEED9743}"/>
+                <a16:creationId xmlns:a16="http://schemas.microsoft.com/office/drawing/2014/main" id="{3E47E298-DD99-424B-840E-4FAFBEED9743}"/>
               </a:ext>
             </a:extLst>
           </p:cNvPr>
@@ -10402,7 +10597,7 @@
           <p:cNvPr id="4" name="Espace réservé du numéro de diapositive 3">
             <a:extLst>
               <a:ext uri="{FF2B5EF4-FFF2-40B4-BE49-F238E27FC236}">
-                <a16:creationId xmlns="" xmlns:a16="http://schemas.microsoft.com/office/drawing/2014/main" id="{917F6769-927A-43AA-A939-EF5241566688}"/>
+                <a16:creationId xmlns:a16="http://schemas.microsoft.com/office/drawing/2014/main" id="{917F6769-927A-43AA-A939-EF5241566688}"/>
               </a:ext>
             </a:extLst>
           </p:cNvPr>
@@ -10422,7 +10617,17 @@
               <a:rPr lang="en-GB" smtClean="0"/>
               <a:t>6</a:t>
             </a:fld>
-            <a:endParaRPr lang="en-GB"/>
+            <a:r>
+              <a:rPr lang="en-GB" sz="1200" dirty="0">
+                <a:solidFill>
+                  <a:prstClr val="white">
+                    <a:tint val="75000"/>
+                  </a:prstClr>
+                </a:solidFill>
+              </a:rPr>
+              <a:t>/23</a:t>
+            </a:r>
+            <a:endParaRPr lang="en-GB" dirty="0"/>
           </a:p>
         </p:txBody>
       </p:sp>
@@ -10502,13 +10707,9 @@
   <p:clrMapOvr>
     <a:masterClrMapping/>
   </p:clrMapOvr>
-  <p:timing>
-    <p:tnLst>
-      <p:par>
-        <p:cTn id="1" dur="indefinite" restart="never" nodeType="tmRoot"/>
-      </p:par>
-    </p:tnLst>
-  </p:timing>
+  <p:transition spd="med">
+    <p:pull/>
+  </p:transition>
 </p:sld>
 </file>
 
@@ -10534,7 +10735,7 @@
           <p:cNvPr id="2" name="Titre 1">
             <a:extLst>
               <a:ext uri="{FF2B5EF4-FFF2-40B4-BE49-F238E27FC236}">
-                <a16:creationId xmlns="" xmlns:a16="http://schemas.microsoft.com/office/drawing/2014/main" id="{3E47E298-DD99-424B-840E-4FAFBEED9743}"/>
+                <a16:creationId xmlns:a16="http://schemas.microsoft.com/office/drawing/2014/main" id="{3E47E298-DD99-424B-840E-4FAFBEED9743}"/>
               </a:ext>
             </a:extLst>
           </p:cNvPr>
@@ -10572,7 +10773,7 @@
           <p:cNvPr id="4" name="Espace réservé du numéro de diapositive 3">
             <a:extLst>
               <a:ext uri="{FF2B5EF4-FFF2-40B4-BE49-F238E27FC236}">
-                <a16:creationId xmlns="" xmlns:a16="http://schemas.microsoft.com/office/drawing/2014/main" id="{21395FBB-47FF-471B-A611-00E4D605E6E2}"/>
+                <a16:creationId xmlns:a16="http://schemas.microsoft.com/office/drawing/2014/main" id="{21395FBB-47FF-471B-A611-00E4D605E6E2}"/>
               </a:ext>
             </a:extLst>
           </p:cNvPr>
@@ -10592,7 +10793,17 @@
               <a:rPr lang="en-GB" smtClean="0"/>
               <a:t>7</a:t>
             </a:fld>
-            <a:endParaRPr lang="en-GB"/>
+            <a:r>
+              <a:rPr lang="en-GB" sz="1200" dirty="0">
+                <a:solidFill>
+                  <a:prstClr val="white">
+                    <a:tint val="75000"/>
+                  </a:prstClr>
+                </a:solidFill>
+              </a:rPr>
+              <a:t>/23</a:t>
+            </a:r>
+            <a:endParaRPr lang="en-GB" dirty="0"/>
           </a:p>
         </p:txBody>
       </p:sp>
@@ -10672,13 +10883,9 @@
   <p:clrMapOvr>
     <a:masterClrMapping/>
   </p:clrMapOvr>
-  <p:timing>
-    <p:tnLst>
-      <p:par>
-        <p:cTn id="1" dur="indefinite" restart="never" nodeType="tmRoot"/>
-      </p:par>
-    </p:tnLst>
-  </p:timing>
+  <p:transition spd="med">
+    <p:pull/>
+  </p:transition>
 </p:sld>
 </file>
 
@@ -10704,7 +10911,7 @@
           <p:cNvPr id="2" name="Titre 1">
             <a:extLst>
               <a:ext uri="{FF2B5EF4-FFF2-40B4-BE49-F238E27FC236}">
-                <a16:creationId xmlns="" xmlns:a16="http://schemas.microsoft.com/office/drawing/2014/main" id="{3E47E298-DD99-424B-840E-4FAFBEED9743}"/>
+                <a16:creationId xmlns:a16="http://schemas.microsoft.com/office/drawing/2014/main" id="{3E47E298-DD99-424B-840E-4FAFBEED9743}"/>
               </a:ext>
             </a:extLst>
           </p:cNvPr>
@@ -10742,7 +10949,7 @@
           <p:cNvPr id="4" name="Espace réservé du numéro de diapositive 3">
             <a:extLst>
               <a:ext uri="{FF2B5EF4-FFF2-40B4-BE49-F238E27FC236}">
-                <a16:creationId xmlns="" xmlns:a16="http://schemas.microsoft.com/office/drawing/2014/main" id="{D99255AB-0EA8-4D12-8914-DA5EEBF54499}"/>
+                <a16:creationId xmlns:a16="http://schemas.microsoft.com/office/drawing/2014/main" id="{D99255AB-0EA8-4D12-8914-DA5EEBF54499}"/>
               </a:ext>
             </a:extLst>
           </p:cNvPr>
@@ -10762,7 +10969,17 @@
               <a:rPr lang="en-GB" smtClean="0"/>
               <a:t>8</a:t>
             </a:fld>
-            <a:endParaRPr lang="en-GB"/>
+            <a:r>
+              <a:rPr lang="en-GB" sz="1200" dirty="0">
+                <a:solidFill>
+                  <a:prstClr val="white">
+                    <a:tint val="75000"/>
+                  </a:prstClr>
+                </a:solidFill>
+              </a:rPr>
+              <a:t>/23</a:t>
+            </a:r>
+            <a:endParaRPr lang="en-GB" dirty="0"/>
           </a:p>
         </p:txBody>
       </p:sp>
@@ -10842,13 +11059,9 @@
   <p:clrMapOvr>
     <a:masterClrMapping/>
   </p:clrMapOvr>
-  <p:timing>
-    <p:tnLst>
-      <p:par>
-        <p:cTn id="1" dur="indefinite" restart="never" nodeType="tmRoot"/>
-      </p:par>
-    </p:tnLst>
-  </p:timing>
+  <p:transition spd="med">
+    <p:pull/>
+  </p:transition>
 </p:sld>
 </file>
 
@@ -10874,7 +11087,7 @@
           <p:cNvPr id="2" name="Titre 1">
             <a:extLst>
               <a:ext uri="{FF2B5EF4-FFF2-40B4-BE49-F238E27FC236}">
-                <a16:creationId xmlns="" xmlns:a16="http://schemas.microsoft.com/office/drawing/2014/main" id="{3E47E298-DD99-424B-840E-4FAFBEED9743}"/>
+                <a16:creationId xmlns:a16="http://schemas.microsoft.com/office/drawing/2014/main" id="{3E47E298-DD99-424B-840E-4FAFBEED9743}"/>
               </a:ext>
             </a:extLst>
           </p:cNvPr>
@@ -10903,10 +11116,6 @@
             <a:br>
               <a:rPr lang="fr-FR" b="1" dirty="0"/>
             </a:br>
-            <a:r>
-              <a:rPr lang="fr-FR" b="1" dirty="0"/>
-              <a:t/>
-            </a:r>
             <a:br>
               <a:rPr lang="fr-FR" b="1" dirty="0"/>
             </a:br>
@@ -10919,7 +11128,7 @@
           <p:cNvPr id="4" name="Espace réservé du numéro de diapositive 3">
             <a:extLst>
               <a:ext uri="{FF2B5EF4-FFF2-40B4-BE49-F238E27FC236}">
-                <a16:creationId xmlns="" xmlns:a16="http://schemas.microsoft.com/office/drawing/2014/main" id="{D99255AB-0EA8-4D12-8914-DA5EEBF54499}"/>
+                <a16:creationId xmlns:a16="http://schemas.microsoft.com/office/drawing/2014/main" id="{D99255AB-0EA8-4D12-8914-DA5EEBF54499}"/>
               </a:ext>
             </a:extLst>
           </p:cNvPr>
@@ -10939,7 +11148,17 @@
               <a:rPr lang="en-GB" smtClean="0"/>
               <a:t>9</a:t>
             </a:fld>
-            <a:endParaRPr lang="en-GB"/>
+            <a:r>
+              <a:rPr lang="en-GB" sz="1200" dirty="0">
+                <a:solidFill>
+                  <a:prstClr val="white">
+                    <a:tint val="75000"/>
+                  </a:prstClr>
+                </a:solidFill>
+              </a:rPr>
+              <a:t>/23</a:t>
+            </a:r>
+            <a:endParaRPr lang="en-GB" dirty="0"/>
           </a:p>
         </p:txBody>
       </p:sp>
@@ -11019,13 +11238,9 @@
   <p:clrMapOvr>
     <a:masterClrMapping/>
   </p:clrMapOvr>
-  <p:timing>
-    <p:tnLst>
-      <p:par>
-        <p:cTn id="1" dur="indefinite" restart="never" nodeType="tmRoot"/>
-      </p:par>
-    </p:tnLst>
-  </p:timing>
+  <p:transition spd="med">
+    <p:pull/>
+  </p:transition>
 </p:sld>
 </file>
 
@@ -11289,7 +11504,7 @@
   <a:extraClrSchemeLst/>
   <a:extLst>
     <a:ext uri="{05A4C25C-085E-4340-85A3-A5531E510DB2}">
-      <thm15:themeFamily xmlns="" xmlns:thm15="http://schemas.microsoft.com/office/thememl/2012/main" name="Ion" id="{B8441ADB-2E43-4AF7-B97A-BD870242C6A8}" vid="{292E63A9-BB86-4E3D-B92A-7223C6510D2E}"/>
+      <thm15:themeFamily xmlns:thm15="http://schemas.microsoft.com/office/thememl/2012/main" name="Ion" id="{B8441ADB-2E43-4AF7-B97A-BD870242C6A8}" vid="{292E63A9-BB86-4E3D-B92A-7223C6510D2E}"/>
     </a:ext>
   </a:extLst>
 </a:theme>
@@ -11584,7 +11799,7 @@
   <a:extraClrSchemeLst/>
   <a:extLst>
     <a:ext uri="{05A4C25C-085E-4340-85A3-A5531E510DB2}">
-      <thm15:themeFamily xmlns="" xmlns:thm15="http://schemas.microsoft.com/office/thememl/2012/main" name="Office Theme" id="{62F939B6-93AF-4DB8-9C6B-D6C7DFDC589F}" vid="{4A3C46E8-61CC-4603-A589-7422A47A8E4A}"/>
+      <thm15:themeFamily xmlns:thm15="http://schemas.microsoft.com/office/thememl/2012/main" name="Office Theme" id="{62F939B6-93AF-4DB8-9C6B-D6C7DFDC589F}" vid="{4A3C46E8-61CC-4603-A589-7422A47A8E4A}"/>
     </a:ext>
   </a:extLst>
 </a:theme>
@@ -11879,7 +12094,7 @@
   <a:extraClrSchemeLst/>
   <a:extLst>
     <a:ext uri="{05A4C25C-085E-4340-85A3-A5531E510DB2}">
-      <thm15:themeFamily xmlns="" xmlns:thm15="http://schemas.microsoft.com/office/thememl/2012/main" name="Office Theme" id="{62F939B6-93AF-4DB8-9C6B-D6C7DFDC589F}" vid="{4A3C46E8-61CC-4603-A589-7422A47A8E4A}"/>
+      <thm15:themeFamily xmlns:thm15="http://schemas.microsoft.com/office/thememl/2012/main" name="Office Theme" id="{62F939B6-93AF-4DB8-9C6B-D6C7DFDC589F}" vid="{4A3C46E8-61CC-4603-A589-7422A47A8E4A}"/>
     </a:ext>
   </a:extLst>
 </a:theme>

</xml_diff>